<commit_message>
revised the layout and Using Spark Side
</commit_message>
<xml_diff>
--- a/poster/cmsbigdataSCposter.pptx
+++ b/poster/cmsbigdataSCposter.pptx
@@ -141,7 +141,7 @@
   </p:defaultTextStyle>
   <p:extLst>
     <p:ext uri="{EFAFB233-063F-42B5-8137-9DF3F51BA10A}">
-      <p15:sldGuideLst xmlns="" xmlns:p15="http://schemas.microsoft.com/office/powerpoint/2012/main">
+      <p15:sldGuideLst xmlns:p15="http://schemas.microsoft.com/office/powerpoint/2012/main" xmlns="">
         <p15:guide id="1" orient="horz" pos="3552">
           <p15:clr>
             <a:srgbClr val="A4A3A4"/>
@@ -6164,7 +6164,7 @@
         <p:spPr bwMode="auto">
           <a:xfrm>
             <a:off x="21437600" y="5231886"/>
-            <a:ext cx="21548725" cy="20166277"/>
+            <a:ext cx="21548725" cy="18243459"/>
           </a:xfrm>
           <a:prstGeom prst="rect">
             <a:avLst/>
@@ -6315,8 +6315,8 @@
         </p:nvSpPr>
         <p:spPr bwMode="auto">
           <a:xfrm>
-            <a:off x="21508003" y="25834694"/>
-            <a:ext cx="10918004" cy="6407431"/>
+            <a:off x="21508003" y="24014124"/>
+            <a:ext cx="10918004" cy="8228002"/>
           </a:xfrm>
           <a:prstGeom prst="rect">
             <a:avLst/>
@@ -6353,8 +6353,8 @@
         </p:nvSpPr>
         <p:spPr bwMode="auto">
           <a:xfrm>
-            <a:off x="32743519" y="25834694"/>
-            <a:ext cx="10275651" cy="6407431"/>
+            <a:off x="32743519" y="24014124"/>
+            <a:ext cx="10275651" cy="8228001"/>
           </a:xfrm>
           <a:prstGeom prst="rect">
             <a:avLst/>
@@ -8681,8 +8681,8 @@
         </p:nvSpPr>
         <p:spPr bwMode="auto">
           <a:xfrm>
-            <a:off x="26230650" y="21826565"/>
-            <a:ext cx="6542809" cy="5993819"/>
+            <a:off x="37541201" y="15185084"/>
+            <a:ext cx="5196415" cy="7865309"/>
           </a:xfrm>
           <a:prstGeom prst="roundRect">
             <a:avLst>
@@ -8790,36 +8790,113 @@
           </a:p>
           <a:p>
             <a:pPr algn="ctr" defTabSz="3135313"/>
-            <a:r>
-              <a:rPr lang="en-US" sz="2000" dirty="0" smtClean="0">
+            <a:endParaRPr lang="en-US" sz="2000" dirty="0" smtClean="0">
+              <a:latin typeface="+mn-lt"/>
+              <a:cs typeface="Arial"/>
+            </a:endParaRPr>
+          </a:p>
+          <a:p>
+            <a:pPr algn="ctr" defTabSz="3135313"/>
+            <a:endParaRPr lang="en-US" sz="2000" dirty="0">
+              <a:latin typeface="+mn-lt"/>
+              <a:cs typeface="Arial"/>
+            </a:endParaRPr>
+          </a:p>
+          <a:p>
+            <a:pPr algn="ctr" defTabSz="3135313"/>
+            <a:endParaRPr lang="en-US" sz="2000" dirty="0" smtClean="0">
+              <a:latin typeface="+mn-lt"/>
+              <a:cs typeface="Arial"/>
+            </a:endParaRPr>
+          </a:p>
+          <a:p>
+            <a:pPr algn="ctr" defTabSz="3135313"/>
+            <a:endParaRPr lang="en-US" sz="2000" dirty="0">
+              <a:latin typeface="+mn-lt"/>
+              <a:cs typeface="Arial"/>
+            </a:endParaRPr>
+          </a:p>
+          <a:p>
+            <a:pPr algn="ctr" defTabSz="3135313"/>
+            <a:endParaRPr lang="en-US" sz="2000" dirty="0" smtClean="0">
+              <a:latin typeface="+mn-lt"/>
+              <a:cs typeface="Arial"/>
+            </a:endParaRPr>
+          </a:p>
+          <a:p>
+            <a:pPr algn="ctr" defTabSz="3135313"/>
+            <a:endParaRPr lang="en-US" sz="2000" dirty="0">
+              <a:latin typeface="+mn-lt"/>
+              <a:cs typeface="Arial"/>
+            </a:endParaRPr>
+          </a:p>
+          <a:p>
+            <a:pPr algn="ctr" defTabSz="3135313"/>
+            <a:endParaRPr lang="en-US" sz="2000" dirty="0" smtClean="0">
+              <a:latin typeface="+mn-lt"/>
+              <a:cs typeface="Arial"/>
+            </a:endParaRPr>
+          </a:p>
+          <a:p>
+            <a:pPr algn="ctr" defTabSz="3135313"/>
+            <a:endParaRPr lang="en-US" sz="1400" dirty="0" smtClean="0">
+              <a:latin typeface="+mn-lt"/>
+              <a:cs typeface="Arial"/>
+            </a:endParaRPr>
+          </a:p>
+          <a:p>
+            <a:pPr algn="ctr" defTabSz="3135313"/>
+            <a:r>
+              <a:rPr lang="en-US" sz="1400" dirty="0" smtClean="0">
                 <a:latin typeface="+mn-lt"/>
                 <a:cs typeface="Arial"/>
               </a:rPr>
-              <a:t>This figure shows the output of the use case workflow on the Hadoop ecosystem. It shows </a:t>
-            </a:r>
-            <a:r>
-              <a:rPr lang="en-US" sz="2000" dirty="0">
+              <a:t>This </a:t>
+            </a:r>
+            <a:r>
+              <a:rPr lang="en-US" sz="1400" dirty="0" smtClean="0">
                 <a:latin typeface="+mn-lt"/>
                 <a:cs typeface="Arial"/>
               </a:rPr>
+              <a:t>figure shows the output of the use case </a:t>
+            </a:r>
+            <a:r>
+              <a:rPr lang="en-US" sz="1400" dirty="0" smtClean="0">
+                <a:latin typeface="+mn-lt"/>
+                <a:cs typeface="Arial"/>
+              </a:rPr>
+              <a:t>workflow. </a:t>
+            </a:r>
+            <a:r>
+              <a:rPr lang="en-US" sz="1400" dirty="0" smtClean="0">
+                <a:latin typeface="+mn-lt"/>
+                <a:cs typeface="Arial"/>
+              </a:rPr>
+              <a:t>It shows </a:t>
+            </a:r>
+            <a:r>
+              <a:rPr lang="en-US" sz="1400" dirty="0">
+                <a:latin typeface="+mn-lt"/>
+                <a:cs typeface="Arial"/>
+              </a:rPr>
               <a:t>Muon </a:t>
             </a:r>
             <a:r>
-              <a:rPr lang="en-US" sz="2000" dirty="0" smtClean="0">
+              <a:rPr lang="en-US" sz="1400" dirty="0" smtClean="0">
                 <a:latin typeface="+mn-lt"/>
                 <a:cs typeface="Arial"/>
               </a:rPr>
               <a:t>transverse momentum </a:t>
             </a:r>
             <a:r>
-              <a:rPr lang="en-US" sz="2000" dirty="0">
+              <a:rPr lang="en-US" sz="1400" dirty="0">
                 <a:latin typeface="+mn-lt"/>
                 <a:cs typeface="Arial"/>
               </a:rPr>
               <a:t>distributions for di-boson </a:t>
             </a:r>
             <a:r>
-              <a:rPr lang="en-US" sz="2000" dirty="0" smtClean="0">
+              <a:rPr lang="en-US" sz="1400" dirty="0" smtClean="0">
                 <a:latin typeface="+mn-lt"/>
                 <a:cs typeface="Arial"/>
               </a:rPr>
@@ -9394,8 +9471,8 @@
         </p:nvSpPr>
         <p:spPr bwMode="auto">
           <a:xfrm>
-            <a:off x="21636957" y="5932851"/>
-            <a:ext cx="15726443" cy="7160182"/>
+            <a:off x="21636959" y="6349541"/>
+            <a:ext cx="15520906" cy="8287532"/>
           </a:xfrm>
           <a:prstGeom prst="roundRect">
             <a:avLst>
@@ -9429,48 +9506,49 @@
           </a:extLst>
         </p:spPr>
         <p:txBody>
-          <a:bodyPr wrap="none" anchor="ctr"/>
+          <a:bodyPr wrap="square" anchor="ctr">
+            <a:normAutofit/>
+          </a:bodyPr>
           <a:lstStyle/>
           <a:p>
             <a:pPr marL="0" indent="0">
               <a:buNone/>
             </a:pPr>
             <a:r>
-              <a:rPr lang="en-US" b="1" i="1" dirty="0">
-                <a:latin typeface="+mn-lt"/>
+              <a:rPr lang="en-US" b="1" i="1" dirty="0" smtClean="0">
+                <a:latin typeface="Arial"/>
+                <a:cs typeface="Arial"/>
+              </a:rPr>
+              <a:t>  </a:t>
+            </a:r>
+            <a:r>
+              <a:rPr lang="en-US" b="1" dirty="0" smtClean="0">
+                <a:latin typeface="Arial"/>
+                <a:cs typeface="Arial"/>
+              </a:rPr>
+              <a:t>Spark</a:t>
+            </a:r>
+            <a:r>
+              <a:rPr lang="en-US" b="1" i="1" dirty="0" smtClean="0">
+                <a:latin typeface="Arial"/>
+                <a:cs typeface="Arial"/>
+              </a:rPr>
+              <a:t> on </a:t>
+            </a:r>
+            <a:r>
+              <a:rPr lang="en-US" b="1" dirty="0" smtClean="0">
+                <a:latin typeface="Arial"/>
+                <a:cs typeface="Arial"/>
+              </a:rPr>
+              <a:t>Hadoop</a:t>
+            </a:r>
+            <a:r>
+              <a:rPr lang="en-US" b="1" i="1" dirty="0" smtClean="0">
+                <a:latin typeface="Arial"/>
+                <a:cs typeface="Arial"/>
               </a:rPr>
               <a:t> </a:t>
             </a:r>
-            <a:r>
-              <a:rPr lang="en-US" b="1" i="1" dirty="0" smtClean="0">
-                <a:latin typeface="+mn-lt"/>
-              </a:rPr>
-              <a:t>    </a:t>
-            </a:r>
-            <a:r>
-              <a:rPr lang="en-US" b="1" dirty="0" smtClean="0">
-                <a:latin typeface="+mn-lt"/>
-              </a:rPr>
-              <a:t>Spark</a:t>
-            </a:r>
-            <a:r>
-              <a:rPr lang="en-US" b="1" i="1" dirty="0" smtClean="0">
-                <a:latin typeface="+mn-lt"/>
-              </a:rPr>
-              <a:t> on </a:t>
-            </a:r>
-            <a:r>
-              <a:rPr lang="en-US" b="1" dirty="0" smtClean="0">
-                <a:latin typeface="+mn-lt"/>
-              </a:rPr>
-              <a:t>Hadoop</a:t>
-            </a:r>
-            <a:r>
-              <a:rPr lang="en-US" b="1" i="1" dirty="0" smtClean="0">
-                <a:latin typeface="+mn-lt"/>
-              </a:rPr>
-              <a:t> </a:t>
-            </a:r>
           </a:p>
           <a:p>
             <a:pPr marL="0" indent="0">
@@ -9478,106 +9556,124 @@
             </a:pPr>
             <a:r>
               <a:rPr lang="en-US" dirty="0" smtClean="0">
-                <a:latin typeface="+mn-lt"/>
+                <a:latin typeface="Arial"/>
+                <a:cs typeface="Arial"/>
               </a:rPr>
               <a:t>Apache </a:t>
             </a:r>
             <a:r>
               <a:rPr lang="en-US" dirty="0">
-                <a:latin typeface="+mn-lt"/>
+                <a:latin typeface="Arial"/>
+                <a:cs typeface="Arial"/>
               </a:rPr>
               <a:t>Spark on an SGI Hadoop Linux cluster consisting of 6 data nodes and 4 </a:t>
             </a:r>
             <a:r>
               <a:rPr lang="en-US" dirty="0" smtClean="0">
-                <a:latin typeface="+mn-lt"/>
+                <a:latin typeface="Arial"/>
+                <a:cs typeface="Arial"/>
               </a:rPr>
               <a:t>service </a:t>
             </a:r>
             <a:br>
               <a:rPr lang="en-US" dirty="0" smtClean="0">
-                <a:latin typeface="+mn-lt"/>
+                <a:latin typeface="Arial"/>
+                <a:cs typeface="Arial"/>
               </a:rPr>
             </a:br>
             <a:r>
               <a:rPr lang="en-US" dirty="0" smtClean="0">
-                <a:latin typeface="+mn-lt"/>
+                <a:latin typeface="Arial"/>
+                <a:cs typeface="Arial"/>
               </a:rPr>
               <a:t>nodes </a:t>
             </a:r>
             <a:r>
               <a:rPr lang="en-US" dirty="0">
-                <a:latin typeface="+mn-lt"/>
+                <a:latin typeface="Arial"/>
+                <a:cs typeface="Arial"/>
               </a:rPr>
               <a:t>all with Intel Xeon CPU E5-2680 v2 @ 2.80GHz, each CPU processor core </a:t>
             </a:r>
             <a:r>
               <a:rPr lang="en-US" dirty="0" smtClean="0">
-                <a:latin typeface="+mn-lt"/>
+                <a:latin typeface="Arial"/>
+                <a:cs typeface="Arial"/>
               </a:rPr>
               <a:t>on </a:t>
             </a:r>
             <a:r>
               <a:rPr lang="en-US" dirty="0">
-                <a:latin typeface="+mn-lt"/>
+                <a:latin typeface="Arial"/>
+                <a:cs typeface="Arial"/>
               </a:rPr>
               <a:t>a </a:t>
             </a:r>
             <a:r>
               <a:rPr lang="en-US" dirty="0" smtClean="0">
-                <a:latin typeface="+mn-lt"/>
+                <a:latin typeface="Arial"/>
+                <a:cs typeface="Arial"/>
               </a:rPr>
               <a:t/>
             </a:r>
             <a:br>
               <a:rPr lang="en-US" dirty="0" smtClean="0">
-                <a:latin typeface="+mn-lt"/>
+                <a:latin typeface="Arial"/>
+                <a:cs typeface="Arial"/>
               </a:rPr>
             </a:br>
             <a:r>
               <a:rPr lang="en-US" dirty="0" smtClean="0">
-                <a:latin typeface="+mn-lt"/>
+                <a:latin typeface="Arial"/>
+                <a:cs typeface="Arial"/>
               </a:rPr>
               <a:t>worker </a:t>
             </a:r>
             <a:r>
               <a:rPr lang="en-US" dirty="0">
-                <a:latin typeface="+mn-lt"/>
+                <a:latin typeface="Arial"/>
+                <a:cs typeface="Arial"/>
               </a:rPr>
               <a:t>node having 256 GB of memory. Configure the Hadoop cluster without single </a:t>
             </a:r>
             <a:endParaRPr lang="en-US" dirty="0" smtClean="0">
-              <a:latin typeface="+mn-lt"/>
+              <a:latin typeface="Arial"/>
+              <a:cs typeface="Arial"/>
             </a:endParaRPr>
           </a:p>
           <a:p>
             <a:r>
               <a:rPr lang="en-US" dirty="0" smtClean="0">
-                <a:latin typeface="+mn-lt"/>
+                <a:latin typeface="Arial"/>
+                <a:cs typeface="Arial"/>
               </a:rPr>
               <a:t>points </a:t>
             </a:r>
             <a:r>
               <a:rPr lang="en-US" dirty="0">
-                <a:latin typeface="+mn-lt"/>
+                <a:latin typeface="Arial"/>
+                <a:cs typeface="Arial"/>
               </a:rPr>
               <a:t>of failure using two separate machines as </a:t>
             </a:r>
             <a:r>
               <a:rPr lang="en-US" dirty="0" smtClean="0">
-                <a:latin typeface="+mn-lt"/>
+                <a:latin typeface="Arial"/>
+                <a:cs typeface="Arial"/>
               </a:rPr>
               <a:t>name nodes</a:t>
             </a:r>
             <a:r>
               <a:rPr lang="en-US" dirty="0">
-                <a:latin typeface="+mn-lt"/>
+                <a:latin typeface="Arial"/>
+                <a:cs typeface="Arial"/>
               </a:rPr>
               <a:t>. Deploy Spark </a:t>
             </a:r>
             <a:r>
               <a:rPr lang="en-US" dirty="0" smtClean="0">
-                <a:latin typeface="+mn-lt"/>
+                <a:latin typeface="Arial"/>
+                <a:cs typeface="Arial"/>
               </a:rPr>
               <a:t>applications</a:t>
             </a:r>
@@ -9585,252 +9681,315 @@
           <a:p>
             <a:r>
               <a:rPr lang="en-US" dirty="0" smtClean="0">
-                <a:latin typeface="+mn-lt"/>
+                <a:latin typeface="Arial"/>
+                <a:cs typeface="Arial"/>
               </a:rPr>
               <a:t>using </a:t>
             </a:r>
             <a:r>
               <a:rPr lang="en-US" dirty="0">
-                <a:latin typeface="+mn-lt"/>
+                <a:latin typeface="Arial"/>
+                <a:cs typeface="Arial"/>
               </a:rPr>
               <a:t>YARN resource manager, store data in HDFS</a:t>
             </a:r>
             <a:r>
               <a:rPr lang="en-US" dirty="0" smtClean="0">
-                <a:latin typeface="+mn-lt"/>
+                <a:latin typeface="Arial"/>
+                <a:cs typeface="Arial"/>
               </a:rPr>
               <a:t>.</a:t>
             </a:r>
             <a:endParaRPr lang="en-US" b="1" i="1" dirty="0" smtClean="0">
-              <a:latin typeface="+mn-lt"/>
+              <a:latin typeface="Arial"/>
+              <a:cs typeface="Arial"/>
             </a:endParaRPr>
           </a:p>
           <a:p>
-            <a:pPr marL="0" indent="0">
-              <a:buNone/>
-            </a:pPr>
-            <a:r>
-              <a:rPr lang="en-US" b="1" dirty="0" smtClean="0">
-                <a:latin typeface="+mn-lt"/>
-              </a:rPr>
-              <a:t>   Scala </a:t>
-            </a:r>
-            <a:r>
-              <a:rPr lang="en-US" b="1" dirty="0">
-                <a:latin typeface="+mn-lt"/>
-              </a:rPr>
-              <a:t>and Python based analysis workflows</a:t>
-            </a:r>
-          </a:p>
-          <a:p>
-            <a:pPr marL="457200" indent="-457200">
-              <a:buFont typeface="Arial"/>
-              <a:buChar char="•"/>
-            </a:pPr>
+            <a:r>
+              <a:rPr lang="en-US" dirty="0" smtClean="0">
+                <a:solidFill>
+                  <a:srgbClr val="0070C0"/>
+                </a:solidFill>
+                <a:latin typeface="Arial"/>
+                <a:cs typeface="Arial"/>
+              </a:rPr>
+              <a:t>Input </a:t>
+            </a:r>
             <a:r>
               <a:rPr lang="en-US" dirty="0">
                 <a:solidFill>
                   <a:srgbClr val="0070C0"/>
                 </a:solidFill>
-                <a:latin typeface="+mn-lt"/>
-              </a:rPr>
-              <a:t>Input data: </a:t>
+                <a:latin typeface="Arial"/>
+                <a:cs typeface="Arial"/>
+              </a:rPr>
+              <a:t>data: </a:t>
+            </a:r>
+            <a:r>
+              <a:rPr lang="en-US" dirty="0" smtClean="0">
+                <a:latin typeface="Arial"/>
+                <a:cs typeface="Arial"/>
+              </a:rPr>
+              <a:t>Develop </a:t>
             </a:r>
             <a:r>
               <a:rPr lang="en-US" dirty="0">
-                <a:latin typeface="+mn-lt"/>
-              </a:rPr>
-              <a:t>the most common format in HEP is ROOT TTrees. Develop a library to convert </a:t>
+                <a:latin typeface="Arial"/>
+                <a:cs typeface="Arial"/>
+              </a:rPr>
+              <a:t>a library to </a:t>
             </a:r>
             <a:r>
               <a:rPr lang="en-US" dirty="0" smtClean="0">
-                <a:latin typeface="+mn-lt"/>
-              </a:rPr>
-              <a:t/>
-            </a:r>
-            <a:br>
+                <a:latin typeface="Arial"/>
+                <a:cs typeface="Arial"/>
+              </a:rPr>
+              <a:t>convert ROOT </a:t>
+            </a:r>
+            <a:r>
+              <a:rPr lang="en-US" dirty="0" err="1" smtClean="0">
+                <a:latin typeface="Arial"/>
+                <a:cs typeface="Arial"/>
+              </a:rPr>
+              <a:t>Ttrees</a:t>
+            </a:r>
+            <a:r>
               <a:rPr lang="en-US" dirty="0" smtClean="0">
-                <a:latin typeface="+mn-lt"/>
-              </a:rPr>
-            </a:br>
+                <a:latin typeface="Arial"/>
+                <a:cs typeface="Arial"/>
+              </a:rPr>
+              <a:t> (</a:t>
+            </a:r>
+            <a:r>
+              <a:rPr lang="en-US" dirty="0">
+                <a:latin typeface="Arial"/>
+                <a:cs typeface="Arial"/>
+              </a:rPr>
+              <a:t>the most common format in HEP </a:t>
+            </a:r>
             <a:r>
               <a:rPr lang="en-US" dirty="0" smtClean="0">
-                <a:latin typeface="+mn-lt"/>
-              </a:rPr>
-              <a:t>ROOT </a:t>
+                <a:latin typeface="Arial"/>
+                <a:cs typeface="Arial"/>
+              </a:rPr>
+              <a:t>) </a:t>
             </a:r>
             <a:r>
               <a:rPr lang="en-US" dirty="0">
-                <a:latin typeface="+mn-lt"/>
-              </a:rPr>
-              <a:t>trees to Apache Avro row-based format readable by Spark  </a:t>
-            </a:r>
-          </a:p>
-          <a:p>
-            <a:pPr marL="457200" indent="-457200">
-              <a:buFont typeface="Arial"/>
-              <a:buChar char="•"/>
-            </a:pPr>
+                <a:latin typeface="Arial"/>
+                <a:cs typeface="Arial"/>
+              </a:rPr>
+              <a:t>to Apache Avro row-based format readable by </a:t>
+            </a:r>
+            <a:r>
+              <a:rPr lang="en-US" dirty="0" smtClean="0">
+                <a:latin typeface="Arial"/>
+                <a:cs typeface="Arial"/>
+              </a:rPr>
+              <a:t>Spark and stored in HDFS</a:t>
+            </a:r>
+            <a:endParaRPr lang="en-US" dirty="0">
+              <a:latin typeface="Arial"/>
+              <a:cs typeface="Arial"/>
+            </a:endParaRPr>
+          </a:p>
+          <a:p>
             <a:r>
               <a:rPr lang="en-US" dirty="0">
                 <a:solidFill>
                   <a:srgbClr val="0070C0"/>
                 </a:solidFill>
-                <a:latin typeface="+mn-lt"/>
+                <a:latin typeface="Arial"/>
+                <a:cs typeface="Arial"/>
               </a:rPr>
               <a:t>Spark operations and APIs: </a:t>
             </a:r>
             <a:r>
               <a:rPr lang="en-US" dirty="0">
-                <a:latin typeface="+mn-lt"/>
-              </a:rPr>
-              <a:t>perform skimming and slimming on the input data by means </a:t>
+                <a:latin typeface="Arial"/>
+                <a:cs typeface="Arial"/>
+              </a:rPr>
+              <a:t>perform skimming and slimming </a:t>
             </a:r>
             <a:r>
               <a:rPr lang="en-US" dirty="0" smtClean="0">
-                <a:latin typeface="+mn-lt"/>
-              </a:rPr>
-              <a:t/>
-            </a:r>
-            <a:br>
+                <a:latin typeface="Arial"/>
+                <a:cs typeface="Arial"/>
+              </a:rPr>
+              <a:t>on RDDs</a:t>
+            </a:r>
+          </a:p>
+          <a:p>
+            <a:pPr marL="914400" lvl="1" indent="-457200">
+              <a:buFont typeface="Wingdings" charset="2"/>
+              <a:buChar char="Ø"/>
+            </a:pPr>
+            <a:r>
               <a:rPr lang="en-US" dirty="0" smtClean="0">
-                <a:latin typeface="+mn-lt"/>
-              </a:rPr>
-            </a:br>
+                <a:latin typeface="Arial"/>
+                <a:cs typeface="Arial"/>
+              </a:rPr>
+              <a:t>Use </a:t>
+            </a:r>
+            <a:r>
+              <a:rPr lang="en-US" dirty="0">
+                <a:latin typeface="Arial"/>
+                <a:cs typeface="Arial"/>
+              </a:rPr>
+              <a:t>Spark’s map, flatMap and filter transformations. </a:t>
+            </a:r>
+            <a:endParaRPr lang="en-US" dirty="0" smtClean="0">
+              <a:latin typeface="Arial"/>
+              <a:cs typeface="Arial"/>
+            </a:endParaRPr>
+          </a:p>
+          <a:p>
+            <a:pPr marL="914400" lvl="1" indent="-457200">
+              <a:buFont typeface="Wingdings" charset="2"/>
+              <a:buChar char="Ø"/>
+            </a:pPr>
             <a:r>
               <a:rPr lang="en-US" dirty="0" smtClean="0">
-                <a:latin typeface="+mn-lt"/>
-              </a:rPr>
-              <a:t>of </a:t>
+                <a:latin typeface="Arial"/>
+                <a:cs typeface="Arial"/>
+              </a:rPr>
+              <a:t>Use </a:t>
             </a:r>
             <a:r>
               <a:rPr lang="en-US" dirty="0">
-                <a:latin typeface="+mn-lt"/>
-              </a:rPr>
-              <a:t>Spark’s map, flatMap and filter transformations. Use modern Dataset and Dataframe </a:t>
+                <a:latin typeface="Arial"/>
+                <a:cs typeface="Arial"/>
+              </a:rPr>
+              <a:t>modern Dataset and </a:t>
+            </a:r>
+            <a:r>
+              <a:rPr lang="en-US" dirty="0" err="1">
+                <a:latin typeface="Arial"/>
+                <a:cs typeface="Arial"/>
+              </a:rPr>
+              <a:t>Dataframe</a:t>
+            </a:r>
+            <a:r>
+              <a:rPr lang="en-US" dirty="0">
+                <a:latin typeface="Arial"/>
+                <a:cs typeface="Arial"/>
+              </a:rPr>
+              <a:t> </a:t>
             </a:r>
             <a:r>
               <a:rPr lang="en-US" dirty="0" smtClean="0">
-                <a:latin typeface="+mn-lt"/>
-              </a:rPr>
-              <a:t/>
-            </a:r>
-            <a:br>
+                <a:latin typeface="Arial"/>
+                <a:cs typeface="Arial"/>
+              </a:rPr>
+              <a:t>APIs </a:t>
+            </a:r>
+            <a:r>
+              <a:rPr lang="en-US" dirty="0">
+                <a:latin typeface="Arial"/>
+                <a:cs typeface="Arial"/>
+              </a:rPr>
+              <a:t>taking </a:t>
+            </a:r>
+            <a:r>
               <a:rPr lang="en-US" dirty="0" smtClean="0">
-                <a:latin typeface="+mn-lt"/>
-              </a:rPr>
-            </a:br>
+                <a:latin typeface="Arial"/>
+                <a:cs typeface="Arial"/>
+              </a:rPr>
+              <a:t>advantage </a:t>
+            </a:r>
+            <a:r>
+              <a:rPr lang="en-US" dirty="0">
+                <a:latin typeface="Arial"/>
+                <a:cs typeface="Arial"/>
+              </a:rPr>
+              <a:t>of advanced Catalyst query optimizer and direct operations on </a:t>
+            </a:r>
             <a:r>
               <a:rPr lang="en-US" dirty="0" smtClean="0">
-                <a:latin typeface="+mn-lt"/>
-              </a:rPr>
-              <a:t>APIs </a:t>
+                <a:latin typeface="Arial"/>
+                <a:cs typeface="Arial"/>
+              </a:rPr>
+              <a:t>serialized </a:t>
             </a:r>
             <a:r>
               <a:rPr lang="en-US" dirty="0">
-                <a:latin typeface="+mn-lt"/>
-              </a:rPr>
-              <a:t>taking advantage of advanced Catalyst query optimizer and direct operations on </a:t>
+                <a:latin typeface="Arial"/>
+                <a:cs typeface="Arial"/>
+              </a:rPr>
+              <a:t>data, available in Spark </a:t>
             </a:r>
             <a:r>
               <a:rPr lang="en-US" dirty="0" smtClean="0">
-                <a:latin typeface="+mn-lt"/>
-              </a:rPr>
-              <a:t/>
-            </a:r>
-            <a:br>
+                <a:latin typeface="Arial"/>
+                <a:cs typeface="Arial"/>
+              </a:rPr>
+              <a:t>2.0</a:t>
+            </a:r>
+            <a:r>
               <a:rPr lang="en-US" dirty="0" smtClean="0">
-                <a:latin typeface="+mn-lt"/>
-              </a:rPr>
-            </a:br>
+                <a:latin typeface="Arial"/>
+                <a:cs typeface="Arial"/>
+              </a:rPr>
+              <a:t>.</a:t>
+            </a:r>
+          </a:p>
+          <a:p>
+            <a:pPr marL="914400" lvl="1" indent="-457200">
+              <a:buFont typeface="Wingdings" charset="2"/>
+              <a:buChar char="Ø"/>
+            </a:pPr>
             <a:r>
               <a:rPr lang="en-US" dirty="0" smtClean="0">
-                <a:latin typeface="+mn-lt"/>
-              </a:rPr>
-              <a:t>serialized </a:t>
+                <a:latin typeface="Arial"/>
+                <a:cs typeface="Arial"/>
+              </a:rPr>
+              <a:t>Use </a:t>
             </a:r>
             <a:r>
               <a:rPr lang="en-US" dirty="0">
-                <a:latin typeface="+mn-lt"/>
-              </a:rPr>
-              <a:t>data, available in Spark </a:t>
+                <a:latin typeface="Arial"/>
+                <a:cs typeface="Arial"/>
+              </a:rPr>
+              <a:t>Apache Parquet columnar format to store </a:t>
             </a:r>
             <a:r>
               <a:rPr lang="en-US" dirty="0" smtClean="0">
-                <a:latin typeface="+mn-lt"/>
-              </a:rPr>
-              <a:t>2.0</a:t>
+                <a:latin typeface="Arial"/>
+                <a:cs typeface="Arial"/>
+              </a:rPr>
+              <a:t>intermediate </a:t>
+            </a:r>
+            <a:r>
+              <a:rPr lang="en-US" dirty="0">
+                <a:latin typeface="Arial"/>
+                <a:cs typeface="Arial"/>
+              </a:rPr>
+              <a:t>results between stages of the calculation in HDFS, allowing to easily ingest </a:t>
             </a:r>
             <a:r>
               <a:rPr lang="en-US" dirty="0" smtClean="0">
-                <a:latin typeface="+mn-lt"/>
-              </a:rPr>
-              <a:t>. </a:t>
+                <a:latin typeface="Arial"/>
+                <a:cs typeface="Arial"/>
+              </a:rPr>
+              <a:t>data </a:t>
             </a:r>
             <a:r>
               <a:rPr lang="en-US" dirty="0">
-                <a:latin typeface="+mn-lt"/>
-              </a:rPr>
-              <a:t>Use Apache Parquet columnar format to store </a:t>
-            </a:r>
-            <a:r>
-              <a:rPr lang="en-US" dirty="0" smtClean="0">
-                <a:latin typeface="+mn-lt"/>
-              </a:rPr>
-              <a:t/>
-            </a:r>
-            <a:br>
-              <a:rPr lang="en-US" dirty="0" smtClean="0">
-                <a:latin typeface="+mn-lt"/>
-              </a:rPr>
-            </a:br>
-            <a:r>
-              <a:rPr lang="en-US" dirty="0" smtClean="0">
-                <a:latin typeface="+mn-lt"/>
-              </a:rPr>
-              <a:t>intermediate </a:t>
-            </a:r>
-            <a:r>
-              <a:rPr lang="en-US" dirty="0">
-                <a:latin typeface="+mn-lt"/>
-              </a:rPr>
-              <a:t>results between stages of the calculation in HDFS, allowing to easily ingest </a:t>
-            </a:r>
-            <a:r>
-              <a:rPr lang="en-US" dirty="0" smtClean="0">
-                <a:latin typeface="+mn-lt"/>
-              </a:rPr>
-              <a:t/>
-            </a:r>
-            <a:br>
-              <a:rPr lang="en-US" dirty="0" smtClean="0">
-                <a:latin typeface="+mn-lt"/>
-              </a:rPr>
-            </a:br>
-            <a:r>
-              <a:rPr lang="en-US" dirty="0" smtClean="0">
-                <a:latin typeface="+mn-lt"/>
-              </a:rPr>
-              <a:t>data </a:t>
-            </a:r>
-            <a:r>
-              <a:rPr lang="en-US" dirty="0">
-                <a:latin typeface="+mn-lt"/>
+                <a:latin typeface="Arial"/>
+                <a:cs typeface="Arial"/>
               </a:rPr>
               <a:t>into Dataframes and Datasets  </a:t>
             </a:r>
           </a:p>
           <a:p>
-            <a:pPr marL="457200" indent="-457200">
-              <a:buFont typeface="Arial"/>
-              <a:buChar char="•"/>
-            </a:pPr>
             <a:r>
               <a:rPr lang="en-US" dirty="0">
                 <a:solidFill>
                   <a:srgbClr val="0070C0"/>
                 </a:solidFill>
-                <a:latin typeface="+mn-lt"/>
+                <a:latin typeface="Arial"/>
+                <a:cs typeface="Arial"/>
               </a:rPr>
               <a:t>Statistical analysis and plotting</a:t>
             </a:r>
@@ -9839,18 +9998,35 @@
                 <a:solidFill>
                   <a:srgbClr val="0070C0"/>
                 </a:solidFill>
-                <a:latin typeface="+mn-lt"/>
+                <a:latin typeface="Arial"/>
+                <a:cs typeface="Arial"/>
               </a:rPr>
               <a:t>: </a:t>
             </a:r>
             <a:r>
               <a:rPr lang="en-US" dirty="0" smtClean="0">
-                <a:latin typeface="+mn-lt"/>
-              </a:rPr>
-              <a:t>make plots using the distributed histogrammar package</a:t>
+                <a:latin typeface="Arial"/>
+                <a:cs typeface="Arial"/>
+              </a:rPr>
+              <a:t>Use</a:t>
+            </a:r>
+            <a:r>
+              <a:rPr lang="en-US" dirty="0" smtClean="0">
+                <a:latin typeface="Arial"/>
+                <a:cs typeface="Arial"/>
+              </a:rPr>
+              <a:t> </a:t>
+            </a:r>
+            <a:r>
+              <a:rPr lang="en-US" dirty="0" smtClean="0">
+                <a:latin typeface="Arial"/>
+                <a:cs typeface="Arial"/>
+              </a:rPr>
+              <a:t>the distributed histogrammar package</a:t>
             </a:r>
             <a:endParaRPr lang="en-US" dirty="0">
-              <a:latin typeface="+mn-lt"/>
+              <a:latin typeface="Arial"/>
+              <a:cs typeface="Arial"/>
             </a:endParaRPr>
           </a:p>
         </p:txBody>
@@ -9865,8 +10041,8 @@
         </p:nvSpPr>
         <p:spPr bwMode="auto">
           <a:xfrm>
-            <a:off x="21636957" y="13333054"/>
-            <a:ext cx="14288959" cy="7214333"/>
+            <a:off x="21636959" y="15048203"/>
+            <a:ext cx="15520906" cy="8002190"/>
           </a:xfrm>
           <a:prstGeom prst="roundRect">
             <a:avLst>
@@ -9900,7 +10076,9 @@
           </a:extLst>
         </p:spPr>
         <p:txBody>
-          <a:bodyPr wrap="none" anchor="ctr"/>
+          <a:bodyPr wrap="square" anchor="ctr">
+            <a:spAutoFit/>
+          </a:bodyPr>
           <a:lstStyle/>
           <a:p>
             <a:pPr defTabSz="3135313"/>
@@ -9917,16 +10095,34 @@
               <a:rPr lang="en-US" dirty="0" smtClean="0">
                 <a:latin typeface="+mn-lt"/>
               </a:rPr>
-              <a:t>Apache Spark setup is available on Cori and Edison at NERSC. </a:t>
-            </a:r>
-          </a:p>
-          <a:p>
-            <a:pPr defTabSz="3135313"/>
+              <a:t>Apache Spark </a:t>
+            </a:r>
             <a:r>
               <a:rPr lang="en-US" dirty="0" smtClean="0">
                 <a:latin typeface="+mn-lt"/>
               </a:rPr>
-              <a:t>Initial studies are done on Edison; a Cray </a:t>
+              <a:t>2.0 is </a:t>
+            </a:r>
+            <a:r>
+              <a:rPr lang="en-US" dirty="0" smtClean="0">
+                <a:latin typeface="+mn-lt"/>
+              </a:rPr>
+              <a:t>available on Cori and Edison at NERSC. </a:t>
+            </a:r>
+          </a:p>
+          <a:p>
+            <a:pPr defTabSz="3135313"/>
+            <a:r>
+              <a:rPr lang="en-US" dirty="0" smtClean="0">
+                <a:latin typeface="+mn-lt"/>
+              </a:rPr>
+              <a:t>Edison is used in the initial development and testing; </a:t>
+            </a:r>
+            <a:r>
+              <a:rPr lang="en-US" dirty="0" smtClean="0">
+                <a:latin typeface="+mn-lt"/>
+              </a:rPr>
+              <a:t>a Cray </a:t>
             </a:r>
             <a:r>
               <a:rPr lang="en-US" dirty="0">
@@ -9934,42 +10130,27 @@
               </a:rPr>
               <a:t>XC30, with a peak performance of 2.57 </a:t>
             </a:r>
-            <a:endParaRPr lang="en-US" dirty="0" smtClean="0">
-              <a:latin typeface="+mn-lt"/>
-            </a:endParaRPr>
-          </a:p>
-          <a:p>
-            <a:pPr defTabSz="3135313"/>
+            <a:r>
+              <a:rPr lang="en-US" dirty="0" err="1" smtClean="0">
+                <a:latin typeface="+mn-lt"/>
+              </a:rPr>
+              <a:t>petaflops</a:t>
+            </a:r>
+            <a:r>
+              <a:rPr lang="en-US" dirty="0">
+                <a:latin typeface="+mn-lt"/>
+              </a:rPr>
+              <a:t>/sec, 133,824 compute cores, 357 terabytes of memory, and 7.56 petabytes </a:t>
+            </a:r>
             <a:r>
               <a:rPr lang="en-US" dirty="0" smtClean="0">
                 <a:latin typeface="+mn-lt"/>
               </a:rPr>
-              <a:t>petaflops</a:t>
-            </a:r>
-            <a:r>
-              <a:rPr lang="en-US" dirty="0">
-                <a:latin typeface="+mn-lt"/>
-              </a:rPr>
-              <a:t>/sec, 133,824 compute cores, 357 terabytes of memory, and 7.56 petabytes </a:t>
-            </a:r>
-            <a:endParaRPr lang="en-US" dirty="0" smtClean="0">
-              <a:latin typeface="+mn-lt"/>
-            </a:endParaRPr>
+              <a:t>of disk. Store data in GPFS. </a:t>
+            </a:r>
           </a:p>
           <a:p>
             <a:pPr defTabSz="3135313"/>
-            <a:r>
-              <a:rPr lang="en-US" dirty="0" smtClean="0">
-                <a:latin typeface="+mn-lt"/>
-              </a:rPr>
-              <a:t>of disk. Input data files are are stored in GPFS. </a:t>
-            </a:r>
-          </a:p>
-          <a:p>
-            <a:pPr marL="342900" indent="-342900" defTabSz="3135313">
-              <a:buFont typeface="Arial"/>
-              <a:buChar char="•"/>
-            </a:pPr>
             <a:r>
               <a:rPr lang="en-US" dirty="0" smtClean="0">
                 <a:solidFill>
@@ -9992,64 +10173,137 @@
               <a:rPr lang="en-US" dirty="0" smtClean="0">
                 <a:latin typeface="+mn-lt"/>
               </a:rPr>
-              <a:t>Convert the n-tuple format (ROOT TTrees) to the HDF5 format</a:t>
-            </a:r>
-          </a:p>
-          <a:p>
-            <a:pPr marL="800100" lvl="1" indent="-342900" defTabSz="3135313">
-              <a:buFont typeface="Arial"/>
-              <a:buChar char="•"/>
-            </a:pPr>
+              <a:t>Convert the n-tuple format (ROOT TTrees) to the HDF5 </a:t>
+            </a:r>
             <a:r>
               <a:rPr lang="en-US" dirty="0" smtClean="0">
                 <a:latin typeface="+mn-lt"/>
               </a:rPr>
-              <a:t>Column-oriented data using multiple datasets per group per HDF5 file for </a:t>
-            </a:r>
-            <a:br>
+              <a:t>format</a:t>
+            </a:r>
+            <a:r>
               <a:rPr lang="en-US" dirty="0" smtClean="0">
                 <a:latin typeface="+mn-lt"/>
               </a:rPr>
-            </a:br>
-            <a:r>
-              <a:rPr lang="en-US" dirty="0" smtClean="0">
-                <a:latin typeface="+mn-lt"/>
-              </a:rPr>
-              <a:t>faster access for certain analysis </a:t>
-            </a:r>
-            <a:r>
-              <a:rPr lang="en-US" dirty="0" smtClean="0">
-                <a:latin typeface="+mn-lt"/>
-              </a:rPr>
-              <a:t> (one group per particle type)</a:t>
-            </a:r>
-          </a:p>
-          <a:p>
-            <a:pPr marL="800100" lvl="1" indent="-342900" defTabSz="3135313">
-              <a:buFont typeface="Arial"/>
-              <a:buChar char="•"/>
-            </a:pPr>
-            <a:r>
-              <a:rPr lang="en-US" dirty="0" smtClean="0">
-                <a:latin typeface="+mn-lt"/>
-              </a:rPr>
-              <a:t>Custom HDF5 reader to read in each group into a Spark </a:t>
-            </a:r>
-            <a:r>
-              <a:rPr lang="en-US" dirty="0" err="1" smtClean="0">
-                <a:latin typeface="+mn-lt"/>
-              </a:rPr>
-              <a:t>DataFrame</a:t>
+              <a:t>. </a:t>
             </a:r>
             <a:endParaRPr lang="en-US" dirty="0" smtClean="0">
               <a:latin typeface="+mn-lt"/>
             </a:endParaRPr>
           </a:p>
           <a:p>
-            <a:pPr marL="342900" indent="-342900" defTabSz="3135313">
-              <a:buFont typeface="Arial"/>
-              <a:buChar char="•"/>
+            <a:pPr marL="914400" lvl="1" indent="-457200" defTabSz="3135313">
+              <a:buFont typeface="Wingdings" charset="2"/>
+              <a:buChar char="Ø"/>
             </a:pPr>
+            <a:r>
+              <a:rPr lang="en-US" dirty="0" smtClean="0">
+                <a:latin typeface="+mn-lt"/>
+              </a:rPr>
+              <a:t>One HDF5 group per ROOT branch, i.e. particle type (e.g. Tau, electron, </a:t>
+            </a:r>
+            <a:r>
+              <a:rPr lang="en-US" dirty="0" err="1" smtClean="0">
+                <a:latin typeface="+mn-lt"/>
+              </a:rPr>
+              <a:t>Muon</a:t>
+            </a:r>
+            <a:r>
+              <a:rPr lang="en-US" dirty="0" smtClean="0">
+                <a:latin typeface="+mn-lt"/>
+              </a:rPr>
+              <a:t>, </a:t>
+            </a:r>
+            <a:r>
+              <a:rPr lang="en-US" dirty="0" err="1" smtClean="0">
+                <a:latin typeface="+mn-lt"/>
+              </a:rPr>
+              <a:t>etc</a:t>
+            </a:r>
+            <a:r>
+              <a:rPr lang="en-US" dirty="0" smtClean="0">
+                <a:latin typeface="+mn-lt"/>
+              </a:rPr>
+              <a:t>) </a:t>
+            </a:r>
+          </a:p>
+          <a:p>
+            <a:pPr marL="914400" lvl="1" indent="-457200" defTabSz="3135313">
+              <a:buFont typeface="Wingdings" charset="2"/>
+              <a:buChar char="Ø"/>
+            </a:pPr>
+            <a:r>
+              <a:rPr lang="en-US" dirty="0" smtClean="0">
+                <a:latin typeface="+mn-lt"/>
+              </a:rPr>
+              <a:t>One HDF5 dataset per ROOT leaf, i.e. particle property in each group </a:t>
+            </a:r>
+          </a:p>
+          <a:p>
+            <a:pPr marL="914400" lvl="1" indent="-457200" defTabSz="3135313">
+              <a:buFont typeface="Wingdings" charset="2"/>
+              <a:buChar char="Ø"/>
+            </a:pPr>
+            <a:r>
+              <a:rPr lang="en-US" dirty="0">
+                <a:latin typeface="+mn-lt"/>
+              </a:rPr>
+              <a:t>C</a:t>
+            </a:r>
+            <a:r>
+              <a:rPr lang="en-US" dirty="0" smtClean="0">
+                <a:latin typeface="+mn-lt"/>
+              </a:rPr>
+              <a:t>olumn</a:t>
+            </a:r>
+            <a:r>
+              <a:rPr lang="en-US" dirty="0" smtClean="0">
+                <a:latin typeface="+mn-lt"/>
+              </a:rPr>
+              <a:t>-oriented </a:t>
+            </a:r>
+            <a:r>
+              <a:rPr lang="en-US" dirty="0" smtClean="0">
+                <a:latin typeface="+mn-lt"/>
+              </a:rPr>
+              <a:t>data for faster access </a:t>
+            </a:r>
+          </a:p>
+          <a:p>
+            <a:pPr marL="914400" lvl="1" indent="-457200" defTabSz="3135313">
+              <a:buFont typeface="Wingdings" charset="2"/>
+              <a:buChar char="Ø"/>
+            </a:pPr>
+            <a:r>
+              <a:rPr lang="en-US" dirty="0" smtClean="0">
+                <a:latin typeface="+mn-lt"/>
+              </a:rPr>
+              <a:t>Custom </a:t>
+            </a:r>
+            <a:r>
+              <a:rPr lang="en-US" dirty="0" smtClean="0">
+                <a:latin typeface="+mn-lt"/>
+              </a:rPr>
+              <a:t>HDF5 reader to read in </a:t>
+            </a:r>
+            <a:r>
+              <a:rPr lang="en-US" dirty="0" smtClean="0">
+                <a:latin typeface="+mn-lt"/>
+              </a:rPr>
+              <a:t>a group with several 1D datasets into </a:t>
+            </a:r>
+            <a:r>
+              <a:rPr lang="en-US" dirty="0" err="1" smtClean="0">
+                <a:latin typeface="+mn-lt"/>
+              </a:rPr>
+              <a:t>DataFrame</a:t>
+            </a:r>
+            <a:endParaRPr lang="en-US" dirty="0" smtClean="0">
+              <a:latin typeface="+mn-lt"/>
+            </a:endParaRPr>
+          </a:p>
+          <a:p>
+            <a:pPr defTabSz="3135313"/>
             <a:r>
               <a:rPr lang="en-US" dirty="0">
                 <a:solidFill>
@@ -10072,7 +10326,25 @@
               <a:rPr lang="en-US" dirty="0" smtClean="0">
                 <a:latin typeface="+mn-lt"/>
               </a:rPr>
-              <a:t>Read </a:t>
+              <a:t>perform skimming </a:t>
+            </a:r>
+            <a:r>
+              <a:rPr lang="en-US" dirty="0" smtClean="0">
+                <a:latin typeface="+mn-lt"/>
+              </a:rPr>
+              <a:t>and </a:t>
+            </a:r>
+            <a:r>
+              <a:rPr lang="en-US" dirty="0" smtClean="0">
+                <a:latin typeface="+mn-lt"/>
+              </a:rPr>
+              <a:t>slimming </a:t>
+            </a:r>
+            <a:r>
+              <a:rPr lang="en-US" dirty="0" smtClean="0">
+                <a:latin typeface="+mn-lt"/>
+              </a:rPr>
+              <a:t>on Spark </a:t>
             </a:r>
             <a:r>
               <a:rPr lang="en-US" dirty="0" err="1" smtClean="0">
@@ -10084,24 +10356,25 @@
               <a:rPr lang="en-US" dirty="0" smtClean="0">
                 <a:latin typeface="+mn-lt"/>
               </a:rPr>
-              <a:t>, </a:t>
-            </a:r>
+              <a:t> </a:t>
+            </a:r>
+          </a:p>
+          <a:p>
+            <a:pPr marL="914400" lvl="1" indent="-457200" defTabSz="3135313">
+              <a:buFont typeface="Wingdings" charset="2"/>
+              <a:buChar char="Ø"/>
+            </a:pPr>
             <a:r>
               <a:rPr lang="en-US" dirty="0" smtClean="0">
                 <a:latin typeface="+mn-lt"/>
               </a:rPr>
-              <a:t>then perform </a:t>
-            </a:r>
-            <a:br>
+              <a:t>Use</a:t>
+            </a:r>
+            <a:r>
               <a:rPr lang="en-US" dirty="0" smtClean="0">
                 <a:latin typeface="+mn-lt"/>
               </a:rPr>
-            </a:br>
-            <a:r>
-              <a:rPr lang="en-US" dirty="0" smtClean="0">
-                <a:latin typeface="+mn-lt"/>
-              </a:rPr>
-              <a:t>skimming and slimming using </a:t>
+              <a:t> </a:t>
             </a:r>
             <a:r>
               <a:rPr lang="en-US" dirty="0" smtClean="0">
@@ -10129,36 +10402,39 @@
               </a:rPr>
               <a:t> transformations. </a:t>
             </a:r>
-          </a:p>
-          <a:p>
-            <a:pPr marL="800100" lvl="1" indent="-342900" defTabSz="3135313">
-              <a:buFont typeface="Arial"/>
-              <a:buChar char="•"/>
+            <a:endParaRPr lang="en-US" dirty="0" smtClean="0">
+              <a:latin typeface="+mn-lt"/>
+            </a:endParaRPr>
+          </a:p>
+          <a:p>
+            <a:pPr marL="914400" lvl="1" indent="-457200" defTabSz="3135313">
+              <a:buFont typeface="Wingdings" charset="2"/>
+              <a:buChar char="Ø"/>
             </a:pPr>
             <a:r>
               <a:rPr lang="en-US" dirty="0" smtClean="0">
                 <a:latin typeface="+mn-lt"/>
               </a:rPr>
-              <a:t>Intermediate results stored in </a:t>
-            </a:r>
+              <a:t>Use SQL queries and UDF </a:t>
+            </a:r>
+            <a:endParaRPr lang="en-US" dirty="0" smtClean="0">
+              <a:latin typeface="+mn-lt"/>
+            </a:endParaRPr>
+          </a:p>
+          <a:p>
+            <a:pPr marL="914400" lvl="1" indent="-457200" defTabSz="3135313">
+              <a:buFont typeface="Wingdings" charset="2"/>
+              <a:buChar char="Ø"/>
+            </a:pPr>
             <a:r>
               <a:rPr lang="en-US" dirty="0" smtClean="0">
                 <a:latin typeface="+mn-lt"/>
               </a:rPr>
-              <a:t>CSV </a:t>
-            </a:r>
-            <a:r>
-              <a:rPr lang="en-US" dirty="0" smtClean="0">
-                <a:latin typeface="+mn-lt"/>
-              </a:rPr>
-              <a:t>files (smaller dataset)</a:t>
-            </a:r>
-          </a:p>
-          <a:p>
-            <a:pPr marL="342900" indent="-342900" defTabSz="3135313">
-              <a:buFont typeface="Arial"/>
-              <a:buChar char="•"/>
-            </a:pPr>
+              <a:t>Intermediate results stored in CSV files (smaller dataset)</a:t>
+            </a:r>
+          </a:p>
+          <a:p>
+            <a:pPr defTabSz="3135313"/>
             <a:r>
               <a:rPr lang="en-US" dirty="0">
                 <a:solidFill>
@@ -10176,27 +10452,34 @@
               </a:rPr>
               <a:t>Read intermediate data into Spark Dataframes or </a:t>
             </a:r>
-            <a:br>
+            <a:r>
               <a:rPr lang="en-US" dirty="0" smtClean="0">
                 <a:latin typeface="+mn-lt"/>
                 <a:cs typeface="Arial"/>
               </a:rPr>
-            </a:br>
+              <a:t>Datasets</a:t>
+            </a:r>
             <a:r>
               <a:rPr lang="en-US" dirty="0" smtClean="0">
                 <a:latin typeface="+mn-lt"/>
                 <a:cs typeface="Arial"/>
               </a:rPr>
-              <a:t>Datasets, and make </a:t>
+              <a:t>, and make </a:t>
             </a:r>
             <a:r>
               <a:rPr lang="en-US" dirty="0" smtClean="0">
                 <a:latin typeface="+mn-lt"/>
               </a:rPr>
-              <a:t>plots using R and the distributed histogramming</a:t>
-            </a:r>
-            <a:r>
-              <a:rPr lang="en-US" dirty="0">
+              <a:t>plots using R and the distributed </a:t>
+            </a:r>
+            <a:r>
+              <a:rPr lang="en-US" dirty="0" err="1" smtClean="0">
+                <a:latin typeface="+mn-lt"/>
+              </a:rPr>
+              <a:t>histogrammar</a:t>
+            </a:r>
+            <a:r>
+              <a:rPr lang="en-US" dirty="0" smtClean="0">
                 <a:latin typeface="+mn-lt"/>
               </a:rPr>
               <a:t> </a:t>
@@ -10220,8 +10503,8 @@
         </p:nvSpPr>
         <p:spPr bwMode="auto">
           <a:xfrm>
-            <a:off x="21432122" y="25872391"/>
-            <a:ext cx="11033574" cy="584582"/>
+            <a:off x="21513800" y="24016684"/>
+            <a:ext cx="10921999" cy="584582"/>
           </a:xfrm>
           <a:prstGeom prst="rect">
             <a:avLst/>
@@ -10296,8 +10579,8 @@
         </p:nvSpPr>
         <p:spPr bwMode="auto">
           <a:xfrm>
-            <a:off x="32773459" y="25831589"/>
-            <a:ext cx="10115973" cy="584582"/>
+            <a:off x="32749068" y="24016684"/>
+            <a:ext cx="10244665" cy="584582"/>
           </a:xfrm>
           <a:prstGeom prst="rect">
             <a:avLst/>
@@ -10372,8 +10655,8 @@
         </p:nvSpPr>
         <p:spPr bwMode="auto">
           <a:xfrm>
-            <a:off x="21855953" y="26555699"/>
-            <a:ext cx="10173163" cy="5626099"/>
+            <a:off x="21855954" y="24719182"/>
+            <a:ext cx="10164979" cy="7425226"/>
           </a:xfrm>
           <a:prstGeom prst="roundRect">
             <a:avLst>
@@ -10407,146 +10690,302 @@
           </a:extLst>
         </p:spPr>
         <p:txBody>
-          <a:bodyPr wrap="none" anchor="ctr"/>
+          <a:bodyPr wrap="square" anchor="ctr">
+            <a:normAutofit lnSpcReduction="10000"/>
+          </a:bodyPr>
           <a:lstStyle/>
           <a:p>
             <a:pPr defTabSz="3135313"/>
             <a:r>
+              <a:rPr lang="en-US" b="1" dirty="0" smtClean="0">
+                <a:latin typeface="Arial"/>
+                <a:cs typeface="Arial"/>
+              </a:rPr>
+              <a:t>Ease of Use: </a:t>
+            </a:r>
+            <a:r>
               <a:rPr lang="en-US" dirty="0" smtClean="0">
-                <a:latin typeface="+mn-lt"/>
-              </a:rPr>
-              <a:t>Ease of Use: </a:t>
+                <a:latin typeface="Arial"/>
+                <a:cs typeface="Arial"/>
+              </a:rPr>
+              <a:t>A </a:t>
+            </a:r>
+            <a:r>
+              <a:rPr lang="en-US" dirty="0" smtClean="0">
+                <a:latin typeface="Arial"/>
+                <a:cs typeface="Arial"/>
+              </a:rPr>
+              <a:t>distributed processing environment with task and data </a:t>
+            </a:r>
+            <a:r>
+              <a:rPr lang="en-US" dirty="0" smtClean="0">
+                <a:latin typeface="Arial"/>
+                <a:cs typeface="Arial"/>
+              </a:rPr>
+              <a:t>distribution </a:t>
+            </a:r>
+            <a:r>
+              <a:rPr lang="en-US" dirty="0" smtClean="0">
+                <a:latin typeface="Arial"/>
+                <a:cs typeface="Arial"/>
+              </a:rPr>
+              <a:t>and assignment abstracted from </a:t>
+            </a:r>
+            <a:r>
+              <a:rPr lang="en-US" dirty="0" smtClean="0">
+                <a:latin typeface="Arial"/>
+                <a:cs typeface="Arial"/>
+              </a:rPr>
+              <a:t>end-user, minimal bookkeeping</a:t>
+            </a:r>
+            <a:r>
+              <a:rPr lang="en-US" dirty="0" smtClean="0">
+                <a:latin typeface="Arial"/>
+                <a:cs typeface="Arial"/>
+              </a:rPr>
+              <a:t>, </a:t>
+            </a:r>
+            <a:r>
+              <a:rPr lang="en-US" dirty="0" smtClean="0">
+                <a:latin typeface="Arial"/>
+                <a:cs typeface="Arial"/>
+              </a:rPr>
+              <a:t>high </a:t>
+            </a:r>
+            <a:r>
+              <a:rPr lang="en-US" dirty="0" smtClean="0">
+                <a:latin typeface="Arial"/>
+                <a:cs typeface="Arial"/>
+              </a:rPr>
+              <a:t>level API </a:t>
+            </a:r>
+            <a:r>
+              <a:rPr lang="en-US" dirty="0" smtClean="0">
+                <a:latin typeface="Arial"/>
+                <a:cs typeface="Arial"/>
+              </a:rPr>
+              <a:t>(SQL-like queries)</a:t>
+            </a:r>
+            <a:endParaRPr lang="en-US" dirty="0" smtClean="0">
+              <a:latin typeface="Arial"/>
+              <a:cs typeface="Arial"/>
+            </a:endParaRPr>
+          </a:p>
+          <a:p>
+            <a:pPr defTabSz="3135313"/>
+            <a:r>
+              <a:rPr lang="en-US" b="1" dirty="0" smtClean="0">
+                <a:latin typeface="Arial"/>
+                <a:cs typeface="Arial"/>
+              </a:rPr>
+              <a:t>Performance at NERSC </a:t>
+            </a:r>
+            <a:r>
+              <a:rPr lang="en-US" dirty="0" smtClean="0">
+                <a:latin typeface="Arial"/>
+                <a:cs typeface="Arial"/>
+              </a:rPr>
+              <a:t>using 140 </a:t>
+            </a:r>
+            <a:r>
+              <a:rPr lang="en-US" dirty="0" smtClean="0">
+                <a:latin typeface="Arial"/>
+                <a:cs typeface="Arial"/>
+              </a:rPr>
+              <a:t>cores, and total of 46 GB compressed data in 78 HDF5 files</a:t>
             </a:r>
           </a:p>
           <a:p>
             <a:pPr marL="457200" indent="-457200" defTabSz="3135313">
-              <a:buFont typeface="Arial"/>
-              <a:buChar char="•"/>
+              <a:buFont typeface="Wingdings" charset="2"/>
+              <a:buChar char="Ø"/>
             </a:pPr>
             <a:r>
               <a:rPr lang="en-US" dirty="0" smtClean="0">
-                <a:latin typeface="+mn-lt"/>
-              </a:rPr>
-              <a:t>A distributed processing environment with task and data </a:t>
-            </a:r>
-            <a:br>
+                <a:latin typeface="Arial"/>
+                <a:cs typeface="Arial"/>
+              </a:rPr>
+              <a:t>Count </a:t>
+            </a:r>
+            <a:r>
+              <a:rPr lang="en-US" dirty="0">
+                <a:latin typeface="Arial"/>
+                <a:cs typeface="Arial"/>
+              </a:rPr>
+              <a:t>the number of events =&gt; ~</a:t>
+            </a:r>
+            <a:r>
               <a:rPr lang="en-US" dirty="0" smtClean="0">
-                <a:latin typeface="+mn-lt"/>
-              </a:rPr>
-            </a:br>
+                <a:latin typeface="Arial"/>
+                <a:cs typeface="Arial"/>
+              </a:rPr>
+              <a:t>1sec, 37 million events</a:t>
+            </a:r>
+            <a:endParaRPr lang="en-US" dirty="0" smtClean="0">
+              <a:latin typeface="Arial"/>
+              <a:cs typeface="Arial"/>
+            </a:endParaRPr>
+          </a:p>
+          <a:p>
+            <a:pPr marL="457200" indent="-457200" defTabSz="3135313">
+              <a:buFont typeface="Wingdings" charset="2"/>
+              <a:buChar char="Ø"/>
+            </a:pPr>
             <a:r>
               <a:rPr lang="en-US" dirty="0" smtClean="0">
-                <a:latin typeface="+mn-lt"/>
-              </a:rPr>
-              <a:t>distribution and assignment abstracted from end user</a:t>
+                <a:latin typeface="Arial"/>
+                <a:cs typeface="Arial"/>
+              </a:rPr>
+              <a:t>Sum </a:t>
+            </a:r>
+            <a:r>
+              <a:rPr lang="en-US" dirty="0" smtClean="0">
+                <a:latin typeface="Arial"/>
+                <a:cs typeface="Arial"/>
+              </a:rPr>
+              <a:t>of weights </a:t>
+            </a:r>
+            <a:r>
+              <a:rPr lang="en-US" dirty="0" smtClean="0">
+                <a:latin typeface="Arial"/>
+                <a:cs typeface="Arial"/>
+              </a:rPr>
+              <a:t>for 37 million </a:t>
+            </a:r>
+            <a:r>
+              <a:rPr lang="en-US" dirty="0" smtClean="0">
+                <a:latin typeface="Arial"/>
+                <a:cs typeface="Arial"/>
+              </a:rPr>
+              <a:t>events =&gt; 2 sec </a:t>
             </a:r>
           </a:p>
           <a:p>
             <a:pPr marL="457200" indent="-457200" defTabSz="3135313">
-              <a:buFont typeface="Arial"/>
-              <a:buChar char="•"/>
+              <a:buFont typeface="Wingdings" charset="2"/>
+              <a:buChar char="Ø"/>
             </a:pPr>
             <a:r>
               <a:rPr lang="en-US" dirty="0" smtClean="0">
-                <a:latin typeface="+mn-lt"/>
-              </a:rPr>
-              <a:t>High level API </a:t>
+                <a:latin typeface="Arial"/>
+                <a:cs typeface="Arial"/>
+              </a:rPr>
+              <a:t>Creating </a:t>
+            </a:r>
+            <a:r>
+              <a:rPr lang="en-US" dirty="0" smtClean="0">
+                <a:latin typeface="Arial"/>
+                <a:cs typeface="Arial"/>
+              </a:rPr>
+              <a:t>and saving </a:t>
+            </a:r>
+            <a:r>
+              <a:rPr lang="en-US" dirty="0" smtClean="0">
+                <a:latin typeface="Arial"/>
+                <a:cs typeface="Arial"/>
+              </a:rPr>
+              <a:t>files after filtering/cuts =</a:t>
+            </a:r>
+            <a:r>
+              <a:rPr lang="en-US" dirty="0" smtClean="0">
+                <a:latin typeface="Arial"/>
+                <a:cs typeface="Arial"/>
+              </a:rPr>
+              <a:t>&gt; 1-6 </a:t>
+            </a:r>
+            <a:r>
+              <a:rPr lang="en-US" dirty="0" smtClean="0">
+                <a:latin typeface="Arial"/>
+                <a:cs typeface="Arial"/>
+              </a:rPr>
+              <a:t>min</a:t>
+            </a:r>
+          </a:p>
+          <a:p>
+            <a:pPr defTabSz="3135313"/>
+            <a:r>
+              <a:rPr lang="en-US" dirty="0" smtClean="0">
+                <a:latin typeface="Arial"/>
+                <a:cs typeface="Arial"/>
+              </a:rPr>
+              <a:t>Similar test was repeated with one uncompressed file with the same data, total 86 GB, initial reading and caching time is twice as more, however, rest of the tests have comparable outcome. </a:t>
             </a:r>
             <a:endParaRPr lang="en-US" dirty="0" smtClean="0">
-              <a:latin typeface="+mn-lt"/>
+              <a:latin typeface="Arial"/>
+              <a:cs typeface="Arial"/>
             </a:endParaRPr>
           </a:p>
           <a:p>
             <a:pPr defTabSz="3135313"/>
             <a:r>
+              <a:rPr lang="en-US" b="1" dirty="0" smtClean="0">
+                <a:latin typeface="Arial"/>
+                <a:cs typeface="Arial"/>
+              </a:rPr>
+              <a:t>Performance </a:t>
+            </a:r>
+            <a:r>
+              <a:rPr lang="en-US" b="1" dirty="0" smtClean="0">
+                <a:latin typeface="Arial"/>
+                <a:cs typeface="Arial"/>
+              </a:rPr>
+              <a:t>at </a:t>
+            </a:r>
+            <a:r>
+              <a:rPr lang="en-US" b="1" dirty="0" smtClean="0">
+                <a:latin typeface="Arial"/>
+                <a:cs typeface="Arial"/>
+              </a:rPr>
+              <a:t>Princeton BD cluster</a:t>
+            </a:r>
+            <a:r>
               <a:rPr lang="en-US" dirty="0" smtClean="0">
-                <a:latin typeface="+mn-lt"/>
-              </a:rPr>
-              <a:t>Performance at NERSC using 140 cores</a:t>
-            </a:r>
-          </a:p>
-          <a:p>
-            <a:pPr defTabSz="3135313"/>
+                <a:latin typeface="Arial"/>
+                <a:cs typeface="Arial"/>
+              </a:rPr>
+              <a:t> </a:t>
+            </a:r>
             <a:r>
               <a:rPr lang="en-US" dirty="0" smtClean="0">
-                <a:latin typeface="+mn-lt"/>
-              </a:rPr>
-              <a:t>Test 1: Sum </a:t>
-            </a:r>
+                <a:latin typeface="Arial"/>
+                <a:cs typeface="Arial"/>
+              </a:rPr>
+              <a:t>using 140 cores: </a:t>
+            </a:r>
+            <a:endParaRPr lang="en-US" dirty="0" smtClean="0">
+              <a:latin typeface="Arial"/>
+              <a:cs typeface="Arial"/>
+            </a:endParaRPr>
+          </a:p>
+          <a:p>
+            <a:pPr marL="457200" indent="-457200" defTabSz="3135313">
+              <a:buFont typeface="Wingdings" charset="2"/>
+              <a:buChar char="Ø"/>
+            </a:pPr>
             <a:r>
               <a:rPr lang="en-US" dirty="0" smtClean="0">
-                <a:latin typeface="+mn-lt"/>
-              </a:rPr>
-              <a:t>of weights for events =&gt; 2 sec </a:t>
-            </a:r>
-          </a:p>
-          <a:p>
-            <a:pPr defTabSz="3135313"/>
+                <a:latin typeface="Arial"/>
+                <a:cs typeface="Arial"/>
+              </a:rPr>
+              <a:t>Sum </a:t>
+            </a:r>
+            <a:r>
+              <a:rPr lang="en-US" dirty="0">
+                <a:latin typeface="Arial"/>
+                <a:cs typeface="Arial"/>
+              </a:rPr>
+              <a:t>of weights for </a:t>
+            </a:r>
             <a:r>
               <a:rPr lang="en-US" dirty="0" smtClean="0">
-                <a:latin typeface="+mn-lt"/>
-              </a:rPr>
-              <a:t>Test 2: count the number of events =&gt; ~1sec</a:t>
-            </a:r>
-          </a:p>
-          <a:p>
-            <a:pPr defTabSz="3135313"/>
-            <a:r>
-              <a:rPr lang="en-US" dirty="0" smtClean="0">
-                <a:latin typeface="+mn-lt"/>
-              </a:rPr>
-              <a:t>Test 3: creating and saving the skimmed/slimmed datasets</a:t>
-            </a:r>
-          </a:p>
-          <a:p>
-            <a:pPr defTabSz="3135313"/>
-            <a:r>
-              <a:rPr lang="en-US" dirty="0" smtClean="0">
-                <a:latin typeface="+mn-lt"/>
-              </a:rPr>
-              <a:t> =&gt; 1-6 min</a:t>
-            </a:r>
-            <a:endParaRPr lang="en-US" dirty="0" smtClean="0">
-              <a:latin typeface="+mn-lt"/>
-            </a:endParaRPr>
-          </a:p>
-          <a:p>
-            <a:pPr algn="ctr" defTabSz="3135313"/>
-            <a:r>
-              <a:rPr lang="en-US" dirty="0" smtClean="0">
-                <a:latin typeface="+mn-lt"/>
-              </a:rPr>
-              <a:t>Performance</a:t>
-            </a:r>
-            <a:r>
-              <a:rPr lang="en-US" dirty="0">
-                <a:latin typeface="+mn-lt"/>
-              </a:rPr>
-              <a:t> </a:t>
-            </a:r>
-            <a:r>
-              <a:rPr lang="en-US" dirty="0" smtClean="0">
-                <a:latin typeface="+mn-lt"/>
-              </a:rPr>
-              <a:t>at Princeton using 140 cores: </a:t>
-            </a:r>
-          </a:p>
-          <a:p>
-            <a:pPr algn="ctr" defTabSz="3135313"/>
-            <a:r>
-              <a:rPr lang="en-US" dirty="0">
-                <a:latin typeface="+mn-lt"/>
-              </a:rPr>
-              <a:t>Test 1: Sum of weights for </a:t>
-            </a:r>
-            <a:r>
-              <a:rPr lang="en-US" dirty="0" smtClean="0">
-                <a:latin typeface="+mn-lt"/>
+                <a:latin typeface="Arial"/>
+                <a:cs typeface="Arial"/>
               </a:rPr>
               <a:t>events  =&gt; 14 sec</a:t>
             </a:r>
             <a:endParaRPr lang="en-US" dirty="0">
-              <a:latin typeface="+mn-lt"/>
+              <a:latin typeface="Arial"/>
+              <a:cs typeface="Arial"/>
             </a:endParaRPr>
           </a:p>
         </p:txBody>
@@ -10561,8 +11000,8 @@
         </p:nvSpPr>
         <p:spPr bwMode="auto">
           <a:xfrm>
-            <a:off x="32981655" y="26456973"/>
-            <a:ext cx="9766522" cy="4177575"/>
+            <a:off x="32971094" y="24709972"/>
+            <a:ext cx="9766522" cy="5753095"/>
           </a:xfrm>
           <a:prstGeom prst="roundRect">
             <a:avLst>
@@ -10600,8 +11039,8 @@
           <a:lstStyle/>
           <a:p>
             <a:pPr marL="457200" indent="-457200" algn="just">
-              <a:buFont typeface="Arial"/>
-              <a:buChar char="•"/>
+              <a:buFont typeface="Wingdings" charset="2"/>
+              <a:buChar char="Ø"/>
             </a:pPr>
             <a:r>
               <a:rPr lang="en-US" sz="2800" dirty="0" smtClean="0">
@@ -10697,15 +11136,35 @@
           </a:p>
           <a:p>
             <a:pPr marL="457200" indent="-457200" algn="just">
-              <a:buFont typeface="Arial"/>
-              <a:buChar char="•"/>
+              <a:buFont typeface="Wingdings" charset="2"/>
+              <a:buChar char="Ø"/>
             </a:pPr>
             <a:r>
               <a:rPr lang="en-US" sz="2800" dirty="0" smtClean="0">
                 <a:latin typeface="Arial"/>
                 <a:cs typeface="Arial"/>
               </a:rPr>
-              <a:t>We have observed good scalability, data and task orchestration and support of high level API in Spark</a:t>
+              <a:t>We have observed good scalability, data and task orchestration and support of high level API in </a:t>
+            </a:r>
+            <a:r>
+              <a:rPr lang="en-US" sz="2800" dirty="0" smtClean="0">
+                <a:latin typeface="Arial"/>
+                <a:cs typeface="Arial"/>
+              </a:rPr>
+              <a:t>Spark </a:t>
+            </a:r>
+          </a:p>
+          <a:p>
+            <a:pPr marL="457200" indent="-457200" algn="just">
+              <a:buFont typeface="Wingdings" charset="2"/>
+              <a:buChar char="Ø"/>
+            </a:pPr>
+            <a:r>
+              <a:rPr lang="en-US" sz="2800" dirty="0" smtClean="0">
+                <a:latin typeface="Arial"/>
+                <a:cs typeface="Arial"/>
+              </a:rPr>
+              <a:t>Documentation, and support needs to be better</a:t>
             </a:r>
             <a:endParaRPr lang="en-US" sz="2800" dirty="0">
               <a:latin typeface="Arial"/>
@@ -10714,8 +11173,8 @@
           </a:p>
           <a:p>
             <a:pPr marL="457200" indent="-457200" algn="just">
-              <a:buFont typeface="Arial"/>
-              <a:buChar char="•"/>
+              <a:buFont typeface="Wingdings" charset="2"/>
+              <a:buChar char="Ø"/>
             </a:pPr>
             <a:r>
               <a:rPr lang="en-US" sz="2800" dirty="0" smtClean="0">
@@ -10748,8 +11207,8 @@
           </a:p>
           <a:p>
             <a:pPr marL="914400" lvl="1" indent="-457200" algn="just">
-              <a:buFont typeface="Arial"/>
-              <a:buChar char="•"/>
+              <a:buFont typeface="Wingdings" charset="2"/>
+              <a:buChar char="Ø"/>
             </a:pPr>
             <a:r>
               <a:rPr lang="en-US" sz="2800" dirty="0" smtClean="0">
@@ -10782,8 +11241,8 @@
           </a:p>
           <a:p>
             <a:pPr marL="914400" lvl="1" indent="-457200" algn="just">
-              <a:buFont typeface="Arial"/>
-              <a:buChar char="•"/>
+              <a:buFont typeface="Wingdings" charset="2"/>
+              <a:buChar char="Ø"/>
             </a:pPr>
             <a:r>
               <a:rPr lang="en-US" sz="2800" dirty="0" smtClean="0">
@@ -10819,7 +11278,7 @@
         </p:nvSpPr>
         <p:spPr bwMode="auto">
           <a:xfrm>
-            <a:off x="32971094" y="30675912"/>
+            <a:off x="32971094" y="30638520"/>
             <a:ext cx="9766522" cy="1505887"/>
           </a:xfrm>
           <a:prstGeom prst="roundRect">
@@ -10935,7 +11394,7 @@
         <p:spPr>
           <a:xfrm>
             <a:off x="1371600" y="22104337"/>
-            <a:ext cx="12809175" cy="10125849"/>
+            <a:ext cx="12809175" cy="10064291"/>
           </a:xfrm>
           <a:prstGeom prst="rect">
             <a:avLst/>
@@ -11049,7 +11508,190 @@
                 <a:latin typeface="Arial"/>
                 <a:cs typeface="Arial"/>
               </a:rPr>
-              <a:t>Recorded data and simulations are processed centrally and the output is analyzed by all physicists looking for a wealth of different physics signals</a:t>
+              <a:t>Recorded data and simulations are processed centrally and the output is analyzed by all physicists looking for a wealth of different physics </a:t>
+            </a:r>
+            <a:r>
+              <a:rPr lang="en-US" sz="2400" dirty="0" smtClean="0">
+                <a:latin typeface="Arial"/>
+                <a:cs typeface="Arial"/>
+              </a:rPr>
+              <a:t>signals</a:t>
+            </a:r>
+            <a:endParaRPr lang="en-US" sz="2800" dirty="0" smtClean="0">
+              <a:latin typeface="Arial"/>
+              <a:cs typeface="Arial"/>
+            </a:endParaRPr>
+          </a:p>
+          <a:p>
+            <a:pPr marL="457200" indent="-457200">
+              <a:buFont typeface="Arial"/>
+              <a:buChar char="•"/>
+            </a:pPr>
+            <a:r>
+              <a:rPr lang="en-US" sz="2800" dirty="0" smtClean="0">
+                <a:latin typeface="Arial"/>
+                <a:cs typeface="Arial"/>
+              </a:rPr>
+              <a:t>Dark </a:t>
+            </a:r>
+            <a:r>
+              <a:rPr lang="en-US" sz="2800" dirty="0">
+                <a:latin typeface="Arial"/>
+                <a:cs typeface="Arial"/>
+              </a:rPr>
+              <a:t>Matter analysis use case</a:t>
+            </a:r>
+          </a:p>
+          <a:p>
+            <a:pPr marL="914400" lvl="1" indent="-457200">
+              <a:buFont typeface="Arial"/>
+              <a:buChar char="•"/>
+            </a:pPr>
+            <a:r>
+              <a:rPr lang="en-US" sz="2800" dirty="0" smtClean="0">
+                <a:latin typeface="Arial"/>
+                <a:cs typeface="Arial"/>
+              </a:rPr>
+              <a:t>Step 1: Ntupling</a:t>
+            </a:r>
+          </a:p>
+          <a:p>
+            <a:pPr marL="1371600" lvl="2" indent="-457200">
+              <a:buFont typeface="Arial"/>
+              <a:buChar char="•"/>
+            </a:pPr>
+            <a:r>
+              <a:rPr lang="en-US" sz="2400" dirty="0" smtClean="0">
+                <a:latin typeface="Arial"/>
+                <a:cs typeface="Arial"/>
+              </a:rPr>
+              <a:t>Input</a:t>
+            </a:r>
+            <a:r>
+              <a:rPr lang="en-US" sz="2400" dirty="0">
+                <a:latin typeface="Arial"/>
+                <a:cs typeface="Arial"/>
+              </a:rPr>
+              <a:t>: </a:t>
+            </a:r>
+            <a:endParaRPr lang="en-US" sz="2400" dirty="0" smtClean="0">
+              <a:latin typeface="Arial"/>
+              <a:cs typeface="Arial"/>
+            </a:endParaRPr>
+          </a:p>
+          <a:p>
+            <a:pPr marL="1828800" lvl="3" indent="-457200">
+              <a:buFont typeface="Arial"/>
+              <a:buChar char="•"/>
+            </a:pPr>
+            <a:r>
+              <a:rPr lang="en-US" sz="2400" dirty="0" smtClean="0">
+                <a:latin typeface="Arial"/>
+                <a:cs typeface="Arial"/>
+              </a:rPr>
+              <a:t>Recorded events: Analysis </a:t>
+            </a:r>
+            <a:r>
+              <a:rPr lang="en-US" sz="2400" dirty="0">
+                <a:latin typeface="Arial"/>
+                <a:cs typeface="Arial"/>
+              </a:rPr>
+              <a:t>Object Data (AOD) event format (400kB/event)</a:t>
+            </a:r>
+          </a:p>
+          <a:p>
+            <a:pPr marL="2286000" lvl="4" indent="-457200">
+              <a:buFont typeface="Arial"/>
+              <a:buChar char="•"/>
+            </a:pPr>
+            <a:r>
+              <a:rPr lang="en-US" sz="2400" dirty="0">
+                <a:latin typeface="Arial"/>
+                <a:cs typeface="Arial"/>
+              </a:rPr>
+              <a:t>C++ objects describing the analysis products</a:t>
+            </a:r>
+          </a:p>
+          <a:p>
+            <a:pPr marL="1828800" lvl="3" indent="-457200">
+              <a:buFont typeface="Arial"/>
+              <a:buChar char="•"/>
+            </a:pPr>
+            <a:r>
+              <a:rPr lang="en-US" sz="2400" dirty="0" smtClean="0">
+                <a:latin typeface="Arial"/>
+                <a:cs typeface="Arial"/>
+              </a:rPr>
+              <a:t>500,000,000 </a:t>
+            </a:r>
+            <a:r>
+              <a:rPr lang="en-US" sz="2400" dirty="0">
+                <a:latin typeface="Arial"/>
+                <a:cs typeface="Arial"/>
+              </a:rPr>
+              <a:t>simulated </a:t>
+            </a:r>
+            <a:r>
+              <a:rPr lang="en-US" sz="2400" dirty="0" smtClean="0">
+                <a:latin typeface="Arial"/>
+                <a:cs typeface="Arial"/>
+              </a:rPr>
+              <a:t>events </a:t>
+            </a:r>
+            <a:r>
+              <a:rPr lang="en-US" sz="2400" dirty="0">
+                <a:latin typeface="Arial"/>
+                <a:cs typeface="Arial"/>
+              </a:rPr>
+              <a:t>for </a:t>
+            </a:r>
+            <a:r>
+              <a:rPr lang="en-US" sz="2400" dirty="0" smtClean="0">
+                <a:latin typeface="Arial"/>
+                <a:cs typeface="Arial"/>
+              </a:rPr>
+              <a:t>backgrounds </a:t>
+            </a:r>
+            <a:r>
+              <a:rPr lang="en-US" sz="2400" dirty="0">
+                <a:latin typeface="Arial"/>
+                <a:cs typeface="Arial"/>
+              </a:rPr>
+              <a:t>and signal (200 TB)</a:t>
+            </a:r>
+          </a:p>
+          <a:p>
+            <a:pPr marL="1371600" lvl="2" indent="-457200">
+              <a:buFont typeface="Arial"/>
+              <a:buChar char="•"/>
+            </a:pPr>
+            <a:r>
+              <a:rPr lang="en-US" sz="2400" dirty="0">
+                <a:latin typeface="Arial"/>
+                <a:cs typeface="Arial"/>
+              </a:rPr>
+              <a:t>Processing </a:t>
+            </a:r>
+            <a:r>
+              <a:rPr lang="en-US" sz="2400" dirty="0" smtClean="0">
+                <a:latin typeface="Arial"/>
+                <a:cs typeface="Arial"/>
+              </a:rPr>
+              <a:t>time: 27,777.7778 </a:t>
+            </a:r>
+            <a:r>
+              <a:rPr lang="en-US" sz="2400" dirty="0">
+                <a:latin typeface="Arial"/>
+                <a:cs typeface="Arial"/>
+              </a:rPr>
+              <a:t>CPU </a:t>
+            </a:r>
+            <a:r>
+              <a:rPr lang="en-US" sz="2400" dirty="0" smtClean="0">
+                <a:latin typeface="Arial"/>
+                <a:cs typeface="Arial"/>
+              </a:rPr>
+              <a:t>hours</a:t>
             </a:r>
             <a:endParaRPr lang="en-US" sz="2400" dirty="0">
               <a:latin typeface="Arial"/>
@@ -11057,66 +11699,16 @@
             </a:endParaRPr>
           </a:p>
           <a:p>
-            <a:pPr marL="457200" indent="-457200">
-              <a:buFont typeface="Arial"/>
-              <a:buChar char="•"/>
-            </a:pPr>
-            <a:endParaRPr lang="en-US" sz="2800" dirty="0" smtClean="0">
-              <a:latin typeface="Arial"/>
-              <a:cs typeface="Arial"/>
-            </a:endParaRPr>
-          </a:p>
-          <a:p>
-            <a:pPr marL="457200" indent="-457200">
-              <a:buFont typeface="Arial"/>
-              <a:buChar char="•"/>
-            </a:pPr>
-            <a:r>
-              <a:rPr lang="en-US" sz="2800" dirty="0" smtClean="0">
-                <a:latin typeface="Arial"/>
-                <a:cs typeface="Arial"/>
-              </a:rPr>
-              <a:t>Dark </a:t>
-            </a:r>
-            <a:r>
-              <a:rPr lang="en-US" sz="2800" dirty="0">
-                <a:latin typeface="Arial"/>
-                <a:cs typeface="Arial"/>
-              </a:rPr>
-              <a:t>Matter analysis use case</a:t>
-            </a:r>
-          </a:p>
-          <a:p>
-            <a:pPr marL="914400" lvl="1" indent="-457200">
-              <a:buFont typeface="Arial"/>
-              <a:buChar char="•"/>
-            </a:pPr>
-            <a:r>
-              <a:rPr lang="en-US" sz="2800" dirty="0" smtClean="0">
-                <a:latin typeface="Arial"/>
-                <a:cs typeface="Arial"/>
-              </a:rPr>
-              <a:t>Step 1: Ntupling</a:t>
-            </a:r>
-          </a:p>
-          <a:p>
             <a:pPr marL="1371600" lvl="2" indent="-457200">
               <a:buFont typeface="Arial"/>
               <a:buChar char="•"/>
             </a:pPr>
             <a:r>
-              <a:rPr lang="en-US" sz="2400" dirty="0" smtClean="0">
-                <a:latin typeface="Arial"/>
-                <a:cs typeface="Arial"/>
-              </a:rPr>
-              <a:t>Input</a:t>
-            </a:r>
-            <a:r>
               <a:rPr lang="en-US" sz="2400" dirty="0">
                 <a:latin typeface="Arial"/>
                 <a:cs typeface="Arial"/>
               </a:rPr>
-              <a:t>: </a:t>
+              <a:t>Output: </a:t>
             </a:r>
             <a:endParaRPr lang="en-US" sz="2400" dirty="0" smtClean="0">
               <a:latin typeface="Arial"/>
@@ -11133,14 +11725,28 @@
                 <a:latin typeface="Arial"/>
                 <a:cs typeface="Arial"/>
               </a:rPr>
-              <a:t>Recorded events: Analysis </a:t>
+              <a:t>ROOT </a:t>
             </a:r>
             <a:r>
               <a:rPr lang="en-US" sz="2400" dirty="0">
                 <a:latin typeface="Arial"/>
                 <a:cs typeface="Arial"/>
               </a:rPr>
-              <a:t>Object Data (AOD) event format (400kB/event)</a:t>
+              <a:t>files in </a:t>
+            </a:r>
+            <a:r>
+              <a:rPr lang="en-US" sz="2400" dirty="0" smtClean="0">
+                <a:latin typeface="Arial"/>
+                <a:cs typeface="Arial"/>
+              </a:rPr>
+              <a:t>custom ``</a:t>
+            </a:r>
+            <a:r>
+              <a:rPr lang="en-US" sz="2400" dirty="0">
+                <a:latin typeface="Arial"/>
+                <a:cs typeface="Arial"/>
+              </a:rPr>
+              <a:t>Bacon'' format (2 TB)</a:t>
             </a:r>
           </a:p>
           <a:p>
@@ -11153,11 +11759,18 @@
                 <a:latin typeface="Arial"/>
                 <a:cs typeface="Arial"/>
               </a:rPr>
-              <a:t>C++ objects describing the analysis products</a:t>
-            </a:r>
-          </a:p>
-          <a:p>
-            <a:pPr marL="1828800" lvl="3" indent="-457200">
+              <a:t>Event and physics objects information stored in vectors and float </a:t>
+            </a:r>
+            <a:r>
+              <a:rPr lang="en-US" sz="2400" dirty="0" smtClean="0">
+                <a:latin typeface="Arial"/>
+                <a:cs typeface="Arial"/>
+              </a:rPr>
+              <a:t>types</a:t>
+            </a:r>
+          </a:p>
+          <a:p>
+            <a:pPr marL="2743200" lvl="5" indent="-457200">
               <a:buFont typeface="Arial"/>
               <a:buChar char="•"/>
             </a:pPr>
@@ -11166,152 +11779,26 @@
                 <a:latin typeface="Arial"/>
                 <a:cs typeface="Arial"/>
               </a:rPr>
-              <a:t>500,000,000 </a:t>
-            </a:r>
-            <a:r>
-              <a:rPr lang="en-US" sz="2400" dirty="0">
-                <a:latin typeface="Arial"/>
-                <a:cs typeface="Arial"/>
-              </a:rPr>
-              <a:t>simulated </a:t>
+              <a:t>Fixed types of particles per event (Electron, </a:t>
+            </a:r>
+            <a:r>
+              <a:rPr lang="en-US" sz="2400" dirty="0" err="1" smtClean="0">
+                <a:latin typeface="Arial"/>
+                <a:cs typeface="Arial"/>
+              </a:rPr>
+              <a:t>Muon</a:t>
             </a:r>
             <a:r>
               <a:rPr lang="en-US" sz="2400" dirty="0" smtClean="0">
                 <a:latin typeface="Arial"/>
                 <a:cs typeface="Arial"/>
               </a:rPr>
-              <a:t>events </a:t>
-            </a:r>
-            <a:r>
-              <a:rPr lang="en-US" sz="2400" dirty="0">
-                <a:latin typeface="Arial"/>
-                <a:cs typeface="Arial"/>
-              </a:rPr>
-              <a:t>for </a:t>
-            </a:r>
-            <a:r>
-              <a:rPr lang="en-US" sz="2400" dirty="0" smtClean="0">
-                <a:latin typeface="Arial"/>
-                <a:cs typeface="Arial"/>
-              </a:rPr>
-              <a:t>backgrounds </a:t>
-            </a:r>
-            <a:r>
-              <a:rPr lang="en-US" sz="2400" dirty="0">
-                <a:latin typeface="Arial"/>
-                <a:cs typeface="Arial"/>
-              </a:rPr>
-              <a:t>and signal (200 TB)</a:t>
-            </a:r>
-          </a:p>
-          <a:p>
-            <a:pPr marL="1371600" lvl="2" indent="-457200">
-              <a:buFont typeface="Arial"/>
-              <a:buChar char="•"/>
-            </a:pPr>
-            <a:r>
-              <a:rPr lang="en-US" sz="2400" dirty="0">
-                <a:latin typeface="Arial"/>
-                <a:cs typeface="Arial"/>
-              </a:rPr>
-              <a:t>Processing </a:t>
-            </a:r>
-            <a:r>
-              <a:rPr lang="en-US" sz="2400" dirty="0" smtClean="0">
-                <a:latin typeface="Arial"/>
-                <a:cs typeface="Arial"/>
-              </a:rPr>
-              <a:t>time: 27,777.7778 </a:t>
-            </a:r>
-            <a:r>
-              <a:rPr lang="en-US" sz="2400" dirty="0">
-                <a:latin typeface="Arial"/>
-                <a:cs typeface="Arial"/>
-              </a:rPr>
-              <a:t>CPU </a:t>
-            </a:r>
-            <a:r>
-              <a:rPr lang="en-US" sz="2400" dirty="0" smtClean="0">
-                <a:latin typeface="Arial"/>
-                <a:cs typeface="Arial"/>
-              </a:rPr>
-              <a:t>hours</a:t>
-            </a:r>
-            <a:endParaRPr lang="en-US" sz="2400" dirty="0">
-              <a:latin typeface="Arial"/>
-              <a:cs typeface="Arial"/>
-            </a:endParaRPr>
-          </a:p>
-          <a:p>
-            <a:pPr marL="1371600" lvl="2" indent="-457200">
-              <a:buFont typeface="Arial"/>
-              <a:buChar char="•"/>
-            </a:pPr>
-            <a:r>
-              <a:rPr lang="en-US" sz="2400" dirty="0">
-                <a:latin typeface="Arial"/>
-                <a:cs typeface="Arial"/>
-              </a:rPr>
-              <a:t>Output: </a:t>
+              <a:t>, Tau, Photon, Jets)</a:t>
             </a:r>
             <a:endParaRPr lang="en-US" sz="2400" dirty="0" smtClean="0">
               <a:latin typeface="Arial"/>
               <a:cs typeface="Arial"/>
             </a:endParaRPr>
-          </a:p>
-          <a:p>
-            <a:pPr marL="1828800" lvl="3" indent="-457200">
-              <a:buFont typeface="Arial"/>
-              <a:buChar char="•"/>
-            </a:pPr>
-            <a:r>
-              <a:rPr lang="en-US" sz="2400" dirty="0" smtClean="0">
-                <a:latin typeface="Arial"/>
-                <a:cs typeface="Arial"/>
-              </a:rPr>
-              <a:t>ROOT </a:t>
-            </a:r>
-            <a:r>
-              <a:rPr lang="en-US" sz="2400" dirty="0">
-                <a:latin typeface="Arial"/>
-                <a:cs typeface="Arial"/>
-              </a:rPr>
-              <a:t>files in </a:t>
-            </a:r>
-            <a:r>
-              <a:rPr lang="en-US" sz="2400" dirty="0" smtClean="0">
-                <a:latin typeface="Arial"/>
-                <a:cs typeface="Arial"/>
-              </a:rPr>
-              <a:t>custom ``</a:t>
-            </a:r>
-            <a:r>
-              <a:rPr lang="en-US" sz="2400" dirty="0">
-                <a:latin typeface="Arial"/>
-                <a:cs typeface="Arial"/>
-              </a:rPr>
-              <a:t>Bacon'' format (2 TB)</a:t>
-            </a:r>
-          </a:p>
-          <a:p>
-            <a:pPr marL="2286000" lvl="4" indent="-457200">
-              <a:buFont typeface="Arial"/>
-              <a:buChar char="•"/>
-            </a:pPr>
-            <a:r>
-              <a:rPr lang="en-US" sz="2400" dirty="0">
-                <a:latin typeface="Arial"/>
-                <a:cs typeface="Arial"/>
-              </a:rPr>
-              <a:t>Event and physics objects information stored in vectors and float </a:t>
-            </a:r>
-            <a:r>
-              <a:rPr lang="en-US" sz="2400" dirty="0" smtClean="0">
-                <a:latin typeface="Arial"/>
-                <a:cs typeface="Arial"/>
-              </a:rPr>
-              <a:t>types</a:t>
-            </a:r>
           </a:p>
           <a:p>
             <a:pPr marL="914400" lvl="1" indent="-457200">
@@ -11575,30 +12062,6 @@
           </a:p>
         </p:txBody>
       </p:sp>
-      <p:pic>
-        <p:nvPicPr>
-          <p:cNvPr id="2049" name="Picture 2048"/>
-          <p:cNvPicPr>
-            <a:picLocks noChangeAspect="1"/>
-          </p:cNvPicPr>
-          <p:nvPr/>
-        </p:nvPicPr>
-        <p:blipFill>
-          <a:blip r:embed="rId5"/>
-          <a:stretch>
-            <a:fillRect/>
-          </a:stretch>
-        </p:blipFill>
-        <p:spPr>
-          <a:xfrm>
-            <a:off x="37157863" y="13589738"/>
-            <a:ext cx="3129329" cy="6957649"/>
-          </a:xfrm>
-          <a:prstGeom prst="rect">
-            <a:avLst/>
-          </a:prstGeom>
-        </p:spPr>
-      </p:pic>
       <p:sp>
         <p:nvSpPr>
           <p:cNvPr id="43" name="AutoShape 508"/>
@@ -11609,8 +12072,8 @@
         </p:nvSpPr>
         <p:spPr bwMode="auto">
           <a:xfrm>
-            <a:off x="37541201" y="4269728"/>
-            <a:ext cx="5206976" cy="10486428"/>
+            <a:off x="37530640" y="6350480"/>
+            <a:ext cx="5206976" cy="8303715"/>
           </a:xfrm>
           <a:prstGeom prst="roundRect">
             <a:avLst>
@@ -11649,146 +12112,189 @@
           </a:bodyPr>
           <a:lstStyle/>
           <a:p>
-            <a:r>
-              <a:rPr lang="en-US" sz="2800" dirty="0" err="1">
-                <a:latin typeface="+mn-lt"/>
-              </a:rPr>
-              <a:t>Histogrammar</a:t>
-            </a:r>
-            <a:r>
-              <a:rPr lang="en-US" sz="2800" dirty="0">
-                <a:latin typeface="+mn-lt"/>
-              </a:rPr>
-              <a:t> is a grammar of </a:t>
-            </a:r>
-            <a:r>
-              <a:rPr lang="en-US" sz="2800" dirty="0" err="1">
-                <a:latin typeface="+mn-lt"/>
-              </a:rPr>
-              <a:t>composable</a:t>
-            </a:r>
-            <a:r>
-              <a:rPr lang="en-US" sz="2800" dirty="0">
-                <a:latin typeface="+mn-lt"/>
-              </a:rPr>
-              <a:t> histogram pieces that together provide all of the capabilities expected in a HEP </a:t>
-            </a:r>
-            <a:br>
-              <a:rPr lang="en-US" sz="2800" dirty="0">
-                <a:latin typeface="+mn-lt"/>
-              </a:rPr>
-            </a:br>
-            <a:r>
-              <a:rPr lang="en-US" sz="2800" dirty="0">
-                <a:latin typeface="+mn-lt"/>
-              </a:rPr>
-              <a:t>histogram aggregation package. These pieces, called "primitive aggregators," are all commutative </a:t>
-            </a:r>
-            <a:r>
-              <a:rPr lang="en-US" sz="2800" dirty="0" err="1">
-                <a:latin typeface="+mn-lt"/>
-              </a:rPr>
-              <a:t>monoids</a:t>
-            </a:r>
-            <a:r>
-              <a:rPr lang="en-US" sz="2800" dirty="0">
-                <a:latin typeface="+mn-lt"/>
-              </a:rPr>
-              <a:t>, so any composition </a:t>
-            </a:r>
-            <a:br>
-              <a:rPr lang="en-US" sz="2800" dirty="0">
-                <a:latin typeface="+mn-lt"/>
-              </a:rPr>
-            </a:br>
-            <a:r>
-              <a:rPr lang="en-US" sz="2800" dirty="0">
-                <a:latin typeface="+mn-lt"/>
-              </a:rPr>
-              <a:t>of them can be filled in any order on any partitioning of the data. We can therefore use the entire Spark cluster for data exploration </a:t>
-            </a:r>
-            <a:br>
-              <a:rPr lang="en-US" sz="2800" dirty="0">
-                <a:latin typeface="+mn-lt"/>
-              </a:rPr>
-            </a:br>
-            <a:r>
-              <a:rPr lang="en-US" sz="2800" dirty="0">
-                <a:latin typeface="+mn-lt"/>
-              </a:rPr>
-              <a:t>and final plots without being limited to a few plot types. </a:t>
-            </a:r>
-          </a:p>
-          <a:p>
-            <a:r>
-              <a:rPr lang="en-US" sz="2800" dirty="0" err="1">
-                <a:latin typeface="+mn-lt"/>
-              </a:rPr>
-              <a:t>Histogrammar</a:t>
-            </a:r>
-            <a:r>
-              <a:rPr lang="en-US" sz="2800" dirty="0">
-                <a:latin typeface="+mn-lt"/>
-              </a:rPr>
-              <a:t> is only an aggregation tool– we linked it to </a:t>
-            </a:r>
-            <a:r>
-              <a:rPr lang="en-US" sz="2800" dirty="0" err="1">
-                <a:latin typeface="+mn-lt"/>
-              </a:rPr>
-              <a:t>Bokeh</a:t>
-            </a:r>
-            <a:r>
-              <a:rPr lang="en-US" sz="2800" dirty="0">
-                <a:latin typeface="+mn-lt"/>
-              </a:rPr>
-              <a:t> to draw the plots</a:t>
-            </a:r>
-            <a:r>
-              <a:rPr lang="en-US" sz="2800">
-                <a:latin typeface="+mn-lt"/>
-              </a:rPr>
-              <a:t>. </a:t>
-            </a:r>
-            <a:r>
-              <a:rPr lang="en-US" sz="2800" smtClean="0">
-                <a:latin typeface="+mn-lt"/>
-              </a:rPr>
-              <a:t>http</a:t>
-            </a:r>
-            <a:r>
-              <a:rPr lang="en-US" sz="2800" dirty="0">
-                <a:latin typeface="+mn-lt"/>
-              </a:rPr>
-              <a:t>://</a:t>
-            </a:r>
-            <a:r>
-              <a:rPr lang="en-US" sz="2800" dirty="0" err="1">
-                <a:latin typeface="+mn-lt"/>
-              </a:rPr>
-              <a:t>histogrammar.org</a:t>
-            </a:r>
-            <a:r>
-              <a:rPr lang="en-US" sz="2800" dirty="0">
-                <a:latin typeface="+mn-lt"/>
-              </a:rPr>
-              <a:t> for more</a:t>
-            </a:r>
-            <a:r>
-              <a:rPr lang="en-US" sz="2800" dirty="0" smtClean="0">
-                <a:latin typeface="+mn-lt"/>
-              </a:rPr>
-              <a:t>.</a:t>
-            </a:r>
-            <a:r>
-              <a:rPr lang="en-US" sz="2800" dirty="0">
-                <a:latin typeface="+mn-lt"/>
-              </a:rPr>
-              <a:t> </a:t>
-            </a:r>
-            <a:endParaRPr lang="en-US" sz="2800" dirty="0">
+            <a:endParaRPr lang="en-US" sz="2400" b="1" dirty="0" smtClean="0">
               <a:latin typeface="+mn-lt"/>
             </a:endParaRPr>
+          </a:p>
+          <a:p>
+            <a:endParaRPr lang="en-US" sz="2400" b="1" dirty="0" smtClean="0">
+              <a:latin typeface="+mn-lt"/>
+            </a:endParaRPr>
+          </a:p>
+          <a:p>
+            <a:r>
+              <a:rPr lang="en-US" sz="2400" b="1" dirty="0" err="1" smtClean="0">
+                <a:latin typeface="+mn-lt"/>
+              </a:rPr>
+              <a:t>Histogrammar</a:t>
+            </a:r>
+            <a:r>
+              <a:rPr lang="en-US" sz="2400" b="1" dirty="0" smtClean="0">
+                <a:latin typeface="+mn-lt"/>
+              </a:rPr>
+              <a:t> </a:t>
+            </a:r>
+            <a:r>
+              <a:rPr lang="en-US" sz="2400" dirty="0">
+                <a:latin typeface="+mn-lt"/>
+              </a:rPr>
+              <a:t>is a grammar of </a:t>
+            </a:r>
+            <a:r>
+              <a:rPr lang="en-US" sz="2400" dirty="0" err="1">
+                <a:latin typeface="+mn-lt"/>
+              </a:rPr>
+              <a:t>composable</a:t>
+            </a:r>
+            <a:r>
+              <a:rPr lang="en-US" sz="2400" dirty="0">
+                <a:latin typeface="+mn-lt"/>
+              </a:rPr>
+              <a:t> histogram pieces that together provide all of the capabilities expected in a HEP </a:t>
+            </a:r>
+            <a:br>
+              <a:rPr lang="en-US" sz="2400" dirty="0">
+                <a:latin typeface="+mn-lt"/>
+              </a:rPr>
+            </a:br>
+            <a:r>
+              <a:rPr lang="en-US" sz="2400" dirty="0">
+                <a:latin typeface="+mn-lt"/>
+              </a:rPr>
+              <a:t>histogram </a:t>
+            </a:r>
+            <a:r>
+              <a:rPr lang="en-US" sz="2400" dirty="0" smtClean="0">
+                <a:latin typeface="+mn-lt"/>
+              </a:rPr>
+              <a:t>aggregation package</a:t>
+            </a:r>
+            <a:r>
+              <a:rPr lang="en-US" sz="2400" dirty="0">
+                <a:latin typeface="+mn-lt"/>
+              </a:rPr>
+              <a:t>. These pieces, called "primitive aggregators," are </a:t>
+            </a:r>
+            <a:r>
+              <a:rPr lang="en-US" sz="2400" dirty="0" smtClean="0">
+                <a:latin typeface="+mn-lt"/>
+              </a:rPr>
+              <a:t>all commutative </a:t>
+            </a:r>
+            <a:r>
+              <a:rPr lang="en-US" sz="2400" dirty="0" err="1">
+                <a:latin typeface="+mn-lt"/>
+              </a:rPr>
+              <a:t>monoids</a:t>
+            </a:r>
+            <a:r>
+              <a:rPr lang="en-US" sz="2400" dirty="0">
+                <a:latin typeface="+mn-lt"/>
+              </a:rPr>
+              <a:t>, so any composition </a:t>
+            </a:r>
+            <a:r>
+              <a:rPr lang="en-US" sz="2400" dirty="0" smtClean="0">
+                <a:latin typeface="+mn-lt"/>
+              </a:rPr>
+              <a:t>of </a:t>
+            </a:r>
+            <a:r>
+              <a:rPr lang="en-US" sz="2400" dirty="0">
+                <a:latin typeface="+mn-lt"/>
+              </a:rPr>
+              <a:t>them can be filled in any order on any partitioning of the data. We can therefore use the entire Spark cluster for data exploration </a:t>
+            </a:r>
+            <a:br>
+              <a:rPr lang="en-US" sz="2400" dirty="0">
+                <a:latin typeface="+mn-lt"/>
+              </a:rPr>
+            </a:br>
+            <a:r>
+              <a:rPr lang="en-US" sz="2400" dirty="0">
+                <a:latin typeface="+mn-lt"/>
+              </a:rPr>
+              <a:t>and final plots without being limited to a few plot types. </a:t>
+            </a:r>
+          </a:p>
+          <a:p>
+            <a:r>
+              <a:rPr lang="en-US" sz="2400" dirty="0" err="1">
+                <a:latin typeface="+mn-lt"/>
+              </a:rPr>
+              <a:t>Histogrammar</a:t>
+            </a:r>
+            <a:r>
+              <a:rPr lang="en-US" sz="2400" dirty="0">
+                <a:latin typeface="+mn-lt"/>
+              </a:rPr>
+              <a:t> is only an aggregation tool– we linked it to </a:t>
+            </a:r>
+            <a:r>
+              <a:rPr lang="en-US" sz="2400" dirty="0" err="1">
+                <a:latin typeface="+mn-lt"/>
+              </a:rPr>
+              <a:t>Bokeh</a:t>
+            </a:r>
+            <a:r>
+              <a:rPr lang="en-US" sz="2400" dirty="0">
+                <a:latin typeface="+mn-lt"/>
+              </a:rPr>
+              <a:t> to draw the plots. </a:t>
+            </a:r>
+            <a:r>
+              <a:rPr lang="en-US" sz="2400" dirty="0" smtClean="0">
+                <a:latin typeface="+mn-lt"/>
+              </a:rPr>
+              <a:t>See</a:t>
+            </a:r>
+          </a:p>
+          <a:p>
+            <a:r>
+              <a:rPr lang="en-US" sz="2400" dirty="0" smtClean="0">
+                <a:latin typeface="+mn-lt"/>
+                <a:hlinkClick r:id="rId5"/>
+              </a:rPr>
+              <a:t>http</a:t>
+            </a:r>
+            <a:r>
+              <a:rPr lang="en-US" sz="2400" dirty="0">
+                <a:latin typeface="+mn-lt"/>
+                <a:hlinkClick r:id="rId5"/>
+              </a:rPr>
+              <a:t>://</a:t>
+            </a:r>
+            <a:r>
+              <a:rPr lang="en-US" sz="2400" dirty="0" smtClean="0">
+                <a:latin typeface="+mn-lt"/>
+                <a:hlinkClick r:id="rId5"/>
+              </a:rPr>
+              <a:t>histogrammar.org</a:t>
+            </a:r>
+            <a:r>
+              <a:rPr lang="en-US" sz="2400" dirty="0" smtClean="0">
+                <a:latin typeface="+mn-lt"/>
+              </a:rPr>
+              <a:t> for </a:t>
+            </a:r>
+            <a:r>
+              <a:rPr lang="en-US" sz="2400" dirty="0">
+                <a:latin typeface="+mn-lt"/>
+              </a:rPr>
+              <a:t>more</a:t>
+            </a:r>
+            <a:r>
+              <a:rPr lang="en-US" sz="2400" dirty="0" smtClean="0">
+                <a:latin typeface="+mn-lt"/>
+              </a:rPr>
+              <a:t>.</a:t>
+            </a:r>
+            <a:r>
+              <a:rPr lang="en-US" sz="2400" dirty="0">
+                <a:latin typeface="+mn-lt"/>
+              </a:rPr>
+              <a:t> </a:t>
+            </a:r>
           </a:p>
         </p:txBody>
       </p:sp>
@@ -11856,32 +12362,8 @@
         </p:blipFill>
         <p:spPr>
           <a:xfrm>
-            <a:off x="38480224" y="6586487"/>
+            <a:off x="38007251" y="6580700"/>
             <a:ext cx="4055745" cy="905300"/>
-          </a:xfrm>
-          <a:prstGeom prst="rect">
-            <a:avLst/>
-          </a:prstGeom>
-        </p:spPr>
-      </p:pic>
-      <p:pic>
-        <p:nvPicPr>
-          <p:cNvPr id="2057" name="Picture 2056"/>
-          <p:cNvPicPr>
-            <a:picLocks noChangeAspect="1"/>
-          </p:cNvPicPr>
-          <p:nvPr/>
-        </p:nvPicPr>
-        <p:blipFill>
-          <a:blip r:embed="rId9"/>
-          <a:stretch>
-            <a:fillRect/>
-          </a:stretch>
-        </p:blipFill>
-        <p:spPr>
-          <a:xfrm>
-            <a:off x="27241148" y="22574882"/>
-            <a:ext cx="4459520" cy="4497185"/>
           </a:xfrm>
           <a:prstGeom prst="rect">
             <a:avLst/>
@@ -11897,7 +12379,7 @@
           <p:nvPr/>
         </p:nvPicPr>
         <p:blipFill>
-          <a:blip r:embed="rId10"/>
+          <a:blip r:embed="rId9"/>
           <a:stretch>
             <a:fillRect/>
           </a:stretch>
@@ -11921,7 +12403,7 @@
           <p:nvPr/>
         </p:nvPicPr>
         <p:blipFill>
-          <a:blip r:embed="rId11"/>
+          <a:blip r:embed="rId10"/>
           <a:stretch>
             <a:fillRect/>
           </a:stretch>
@@ -11945,7 +12427,7 @@
           <p:nvPr/>
         </p:nvPicPr>
         <p:blipFill>
-          <a:blip r:embed="rId12">
+          <a:blip r:embed="rId11">
             <a:extLst>
               <a:ext uri="{28A0092B-C50C-407E-A947-70E740481C1C}">
                 <a14:useLocalDpi xmlns:a14="http://schemas.microsoft.com/office/drawing/2010/main" val="0"/>
@@ -12182,6 +12664,30 @@
           </a:p>
         </p:txBody>
       </p:sp>
+      <p:pic>
+        <p:nvPicPr>
+          <p:cNvPr id="2" name="Picture 1"/>
+          <p:cNvPicPr>
+            <a:picLocks noChangeAspect="1"/>
+          </p:cNvPicPr>
+          <p:nvPr/>
+        </p:nvPicPr>
+        <p:blipFill>
+          <a:blip r:embed="rId12"/>
+          <a:stretch>
+            <a:fillRect/>
+          </a:stretch>
+        </p:blipFill>
+        <p:spPr>
+          <a:xfrm>
+            <a:off x="38688101" y="15350887"/>
+            <a:ext cx="2984500" cy="6921500"/>
+          </a:xfrm>
+          <a:prstGeom prst="rect">
+            <a:avLst/>
+          </a:prstGeom>
+        </p:spPr>
+      </p:pic>
     </p:spTree>
   </p:cSld>
   <p:clrMapOvr>

</xml_diff>

<commit_message>
revised last two sections, improved figure
</commit_message>
<xml_diff>
--- a/poster/cmsbigdataSCposter.pptx
+++ b/poster/cmsbigdataSCposter.pptx
@@ -141,7 +141,7 @@
   </p:defaultTextStyle>
   <p:extLst>
     <p:ext uri="{EFAFB233-063F-42B5-8137-9DF3F51BA10A}">
-      <p15:sldGuideLst xmlns:p15="http://schemas.microsoft.com/office/powerpoint/2012/main" xmlns="">
+      <p15:sldGuideLst xmlns="" xmlns:p15="http://schemas.microsoft.com/office/powerpoint/2012/main">
         <p15:guide id="1" orient="horz" pos="3552">
           <p15:clr>
             <a:srgbClr val="A4A3A4"/>
@@ -8851,28 +8851,7 @@
                 <a:latin typeface="+mn-lt"/>
                 <a:cs typeface="Arial"/>
               </a:rPr>
-              <a:t>This </a:t>
-            </a:r>
-            <a:r>
-              <a:rPr lang="en-US" sz="1400" dirty="0" smtClean="0">
-                <a:latin typeface="+mn-lt"/>
-                <a:cs typeface="Arial"/>
-              </a:rPr>
-              <a:t>figure shows the output of the use case </a:t>
-            </a:r>
-            <a:r>
-              <a:rPr lang="en-US" sz="1400" dirty="0" smtClean="0">
-                <a:latin typeface="+mn-lt"/>
-                <a:cs typeface="Arial"/>
-              </a:rPr>
-              <a:t>workflow. </a:t>
-            </a:r>
-            <a:r>
-              <a:rPr lang="en-US" sz="1400" dirty="0" smtClean="0">
-                <a:latin typeface="+mn-lt"/>
-                <a:cs typeface="Arial"/>
-              </a:rPr>
-              <a:t>It shows </a:t>
+              <a:t>This figure shows the output of the use case workflow. It shows </a:t>
             </a:r>
             <a:r>
               <a:rPr lang="en-US" sz="1400" dirty="0">
@@ -9924,14 +9903,7 @@
                 <a:latin typeface="Arial"/>
                 <a:cs typeface="Arial"/>
               </a:rPr>
-              <a:t>2.0</a:t>
-            </a:r>
-            <a:r>
-              <a:rPr lang="en-US" dirty="0" smtClean="0">
-                <a:latin typeface="Arial"/>
-                <a:cs typeface="Arial"/>
-              </a:rPr>
-              <a:t>.</a:t>
+              <a:t>2.0.</a:t>
             </a:r>
           </a:p>
           <a:p>
@@ -10008,21 +9980,7 @@
                 <a:latin typeface="Arial"/>
                 <a:cs typeface="Arial"/>
               </a:rPr>
-              <a:t>Use</a:t>
-            </a:r>
-            <a:r>
-              <a:rPr lang="en-US" dirty="0" smtClean="0">
-                <a:latin typeface="Arial"/>
-                <a:cs typeface="Arial"/>
-              </a:rPr>
-              <a:t> </a:t>
-            </a:r>
-            <a:r>
-              <a:rPr lang="en-US" dirty="0" smtClean="0">
-                <a:latin typeface="Arial"/>
-                <a:cs typeface="Arial"/>
-              </a:rPr>
-              <a:t>the distributed histogrammar package</a:t>
+              <a:t>Use the distributed histogrammar package</a:t>
             </a:r>
             <a:endParaRPr lang="en-US" dirty="0">
               <a:latin typeface="Arial"/>
@@ -10041,8 +9999,8 @@
         </p:nvSpPr>
         <p:spPr bwMode="auto">
           <a:xfrm>
-            <a:off x="21636959" y="15048203"/>
-            <a:ext cx="15520906" cy="8002190"/>
+            <a:off x="21636959" y="14801327"/>
+            <a:ext cx="15520906" cy="8495942"/>
           </a:xfrm>
           <a:prstGeom prst="roundRect">
             <a:avLst>
@@ -10095,34 +10053,16 @@
               <a:rPr lang="en-US" dirty="0" smtClean="0">
                 <a:latin typeface="+mn-lt"/>
               </a:rPr>
-              <a:t>Apache Spark </a:t>
-            </a:r>
+              <a:t>Apache Spark 2.0 is available on Cori and Edison at NERSC. </a:t>
+            </a:r>
+          </a:p>
+          <a:p>
+            <a:pPr defTabSz="3135313"/>
             <a:r>
               <a:rPr lang="en-US" dirty="0" smtClean="0">
                 <a:latin typeface="+mn-lt"/>
               </a:rPr>
-              <a:t>2.0 is </a:t>
-            </a:r>
-            <a:r>
-              <a:rPr lang="en-US" dirty="0" smtClean="0">
-                <a:latin typeface="+mn-lt"/>
-              </a:rPr>
-              <a:t>available on Cori and Edison at NERSC. </a:t>
-            </a:r>
-          </a:p>
-          <a:p>
-            <a:pPr defTabSz="3135313"/>
-            <a:r>
-              <a:rPr lang="en-US" dirty="0" smtClean="0">
-                <a:latin typeface="+mn-lt"/>
-              </a:rPr>
-              <a:t>Edison is used in the initial development and testing; </a:t>
-            </a:r>
-            <a:r>
-              <a:rPr lang="en-US" dirty="0" smtClean="0">
-                <a:latin typeface="+mn-lt"/>
-              </a:rPr>
-              <a:t>a Cray </a:t>
+              <a:t>Edison is used in the initial development and testing; a Cray </a:t>
             </a:r>
             <a:r>
               <a:rPr lang="en-US" dirty="0">
@@ -10173,23 +10113,26 @@
               <a:rPr lang="en-US" dirty="0" smtClean="0">
                 <a:latin typeface="+mn-lt"/>
               </a:rPr>
-              <a:t>Convert the n-tuple format (ROOT TTrees) to the HDF5 </a:t>
+              <a:t>Convert the n-tuple format (ROOT </a:t>
+            </a:r>
+            <a:r>
+              <a:rPr lang="en-US" dirty="0" err="1" smtClean="0">
+                <a:latin typeface="+mn-lt"/>
+              </a:rPr>
+              <a:t>TTree</a:t>
             </a:r>
             <a:r>
               <a:rPr lang="en-US" dirty="0" smtClean="0">
                 <a:latin typeface="+mn-lt"/>
               </a:rPr>
-              <a:t>format</a:t>
+              <a:t>) </a:t>
             </a:r>
             <a:r>
               <a:rPr lang="en-US" dirty="0" smtClean="0">
                 <a:latin typeface="+mn-lt"/>
               </a:rPr>
-              <a:t>. </a:t>
-            </a:r>
-            <a:endParaRPr lang="en-US" dirty="0" smtClean="0">
-              <a:latin typeface="+mn-lt"/>
-            </a:endParaRPr>
+              <a:t>to the HDF5 format. </a:t>
+            </a:r>
           </a:p>
           <a:p>
             <a:pPr marL="914400" lvl="1" indent="-457200" defTabSz="3135313">
@@ -10200,7 +10143,37 @@
               <a:rPr lang="en-US" dirty="0" smtClean="0">
                 <a:latin typeface="+mn-lt"/>
               </a:rPr>
-              <a:t>One HDF5 group per ROOT branch, i.e. particle type (e.g. Tau, electron, </a:t>
+              <a:t>One HDF5 group per </a:t>
+            </a:r>
+            <a:r>
+              <a:rPr lang="en-US" dirty="0" smtClean="0">
+                <a:latin typeface="+mn-lt"/>
+              </a:rPr>
+              <a:t>particle </a:t>
+            </a:r>
+            <a:r>
+              <a:rPr lang="en-US" dirty="0" smtClean="0">
+                <a:latin typeface="+mn-lt"/>
+              </a:rPr>
+              <a:t>type </a:t>
+            </a:r>
+            <a:r>
+              <a:rPr lang="en-US" dirty="0" smtClean="0">
+                <a:latin typeface="+mn-lt"/>
+              </a:rPr>
+              <a:t>e.g. </a:t>
+            </a:r>
+            <a:r>
+              <a:rPr lang="en-US" dirty="0" smtClean="0">
+                <a:latin typeface="+mn-lt"/>
+              </a:rPr>
+              <a:t>Tau</a:t>
+            </a:r>
+            <a:r>
+              <a:rPr lang="en-US" dirty="0" smtClean="0">
+                <a:latin typeface="+mn-lt"/>
+              </a:rPr>
+              <a:t>, electron, </a:t>
             </a:r>
             <a:r>
               <a:rPr lang="en-US" dirty="0" err="1" smtClean="0">
@@ -10209,23 +10182,32 @@
               <a:t>Muon</a:t>
             </a:r>
             <a:r>
+              <a:rPr lang="en-US" dirty="0">
+                <a:latin typeface="+mn-lt"/>
+              </a:rPr>
+              <a:t> </a:t>
+            </a:r>
+            <a:r>
               <a:rPr lang="en-US" dirty="0" smtClean="0">
                 <a:latin typeface="+mn-lt"/>
               </a:rPr>
-              <a:t>, </a:t>
+              <a:t>(ROOT </a:t>
             </a:r>
             <a:r>
               <a:rPr lang="en-US" dirty="0" err="1" smtClean="0">
                 <a:latin typeface="+mn-lt"/>
               </a:rPr>
-              <a:t>etc</a:t>
+              <a:t>TBranch</a:t>
             </a:r>
             <a:r>
               <a:rPr lang="en-US" dirty="0" smtClean="0">
                 <a:latin typeface="+mn-lt"/>
               </a:rPr>
-              <a:t>) </a:t>
-            </a:r>
+              <a:t>)</a:t>
+            </a:r>
+            <a:endParaRPr lang="en-US" dirty="0" smtClean="0">
+              <a:latin typeface="+mn-lt"/>
+            </a:endParaRPr>
           </a:p>
           <a:p>
             <a:pPr marL="914400" lvl="1" indent="-457200" defTabSz="3135313">
@@ -10236,8 +10218,59 @@
               <a:rPr lang="en-US" dirty="0" smtClean="0">
                 <a:latin typeface="+mn-lt"/>
               </a:rPr>
-              <a:t>One HDF5 dataset per ROOT leaf, i.e. particle property in each group </a:t>
-            </a:r>
+              <a:t>One HDF5 dataset per </a:t>
+            </a:r>
+            <a:r>
+              <a:rPr lang="en-US" dirty="0" smtClean="0">
+                <a:latin typeface="+mn-lt"/>
+              </a:rPr>
+              <a:t>particle </a:t>
+            </a:r>
+            <a:r>
+              <a:rPr lang="en-US" dirty="0" smtClean="0">
+                <a:latin typeface="+mn-lt"/>
+              </a:rPr>
+              <a:t>property in each group </a:t>
+            </a:r>
+            <a:r>
+              <a:rPr lang="en-US" dirty="0" smtClean="0">
+                <a:latin typeface="+mn-lt"/>
+              </a:rPr>
+              <a:t>e.g. phi, </a:t>
+            </a:r>
+            <a:r>
+              <a:rPr lang="en-US" dirty="0" err="1" smtClean="0">
+                <a:latin typeface="+mn-lt"/>
+              </a:rPr>
+              <a:t>pt</a:t>
+            </a:r>
+            <a:r>
+              <a:rPr lang="en-US" dirty="0">
+                <a:latin typeface="+mn-lt"/>
+              </a:rPr>
+              <a:t> </a:t>
+            </a:r>
+            <a:r>
+              <a:rPr lang="en-US" dirty="0" smtClean="0">
+                <a:latin typeface="+mn-lt"/>
+              </a:rPr>
+              <a:t>(ROOT </a:t>
+            </a:r>
+            <a:r>
+              <a:rPr lang="en-US" dirty="0" err="1" smtClean="0">
+                <a:latin typeface="+mn-lt"/>
+              </a:rPr>
+              <a:t>TLeaf</a:t>
+            </a:r>
+            <a:r>
+              <a:rPr lang="en-US" dirty="0" smtClean="0">
+                <a:latin typeface="+mn-lt"/>
+              </a:rPr>
+              <a:t>)</a:t>
+            </a:r>
+            <a:endParaRPr lang="en-US" dirty="0" smtClean="0">
+              <a:latin typeface="+mn-lt"/>
+            </a:endParaRPr>
           </a:p>
           <a:p>
             <a:pPr marL="914400" lvl="1" indent="-457200" defTabSz="3135313">
@@ -10254,19 +10287,7 @@
               <a:rPr lang="en-US" dirty="0" smtClean="0">
                 <a:latin typeface="+mn-lt"/>
               </a:rPr>
-              <a:t>olumn</a:t>
-            </a:r>
-            <a:r>
-              <a:rPr lang="en-US" dirty="0" smtClean="0">
-                <a:latin typeface="+mn-lt"/>
-              </a:rPr>
-              <a:t>-oriented </a:t>
-            </a:r>
-            <a:r>
-              <a:rPr lang="en-US" dirty="0" smtClean="0">
-                <a:latin typeface="+mn-lt"/>
-              </a:rPr>
-              <a:t>data for faster access </a:t>
+              <a:t>olumn-oriented data for faster access </a:t>
             </a:r>
           </a:p>
           <a:p>
@@ -10278,19 +10299,25 @@
               <a:rPr lang="en-US" dirty="0" smtClean="0">
                 <a:latin typeface="+mn-lt"/>
               </a:rPr>
-              <a:t>Custom </a:t>
+              <a:t>Custom HDF5 reader to read in a </a:t>
             </a:r>
             <a:r>
               <a:rPr lang="en-US" dirty="0" smtClean="0">
                 <a:latin typeface="+mn-lt"/>
               </a:rPr>
-              <a:t>HDF5 reader to read in </a:t>
+              <a:t>HDF5 group </a:t>
             </a:r>
             <a:r>
               <a:rPr lang="en-US" dirty="0" smtClean="0">
                 <a:latin typeface="+mn-lt"/>
               </a:rPr>
-              <a:t>a group with several 1D datasets into </a:t>
+              <a:t>with several 1D datasets into </a:t>
+            </a:r>
+            <a:r>
+              <a:rPr lang="en-US" dirty="0" smtClean="0">
+                <a:latin typeface="+mn-lt"/>
+              </a:rPr>
+              <a:t>Spark </a:t>
             </a:r>
             <a:r>
               <a:rPr lang="en-US" dirty="0" err="1" smtClean="0">
@@ -10326,25 +10353,7 @@
               <a:rPr lang="en-US" dirty="0" smtClean="0">
                 <a:latin typeface="+mn-lt"/>
               </a:rPr>
-              <a:t>perform skimming </a:t>
-            </a:r>
-            <a:r>
-              <a:rPr lang="en-US" dirty="0" smtClean="0">
-                <a:latin typeface="+mn-lt"/>
-              </a:rPr>
-              <a:t>and </a:t>
-            </a:r>
-            <a:r>
-              <a:rPr lang="en-US" dirty="0" smtClean="0">
-                <a:latin typeface="+mn-lt"/>
-              </a:rPr>
-              <a:t>slimming </a:t>
-            </a:r>
-            <a:r>
-              <a:rPr lang="en-US" dirty="0" smtClean="0">
-                <a:latin typeface="+mn-lt"/>
-              </a:rPr>
-              <a:t>on Spark </a:t>
+              <a:t>perform skimming and slimming on Spark </a:t>
             </a:r>
             <a:r>
               <a:rPr lang="en-US" dirty="0" err="1" smtClean="0">
@@ -10368,13 +10377,7 @@
               <a:rPr lang="en-US" dirty="0" smtClean="0">
                 <a:latin typeface="+mn-lt"/>
               </a:rPr>
-              <a:t>Use</a:t>
-            </a:r>
-            <a:r>
-              <a:rPr lang="en-US" dirty="0" smtClean="0">
-                <a:latin typeface="+mn-lt"/>
-              </a:rPr>
-              <a:t> </a:t>
+              <a:t>Use </a:t>
             </a:r>
             <a:r>
               <a:rPr lang="en-US" dirty="0" smtClean="0">
@@ -10402,9 +10405,6 @@
               </a:rPr>
               <a:t> transformations. </a:t>
             </a:r>
-            <a:endParaRPr lang="en-US" dirty="0" smtClean="0">
-              <a:latin typeface="+mn-lt"/>
-            </a:endParaRPr>
           </a:p>
           <a:p>
             <a:pPr marL="914400" lvl="1" indent="-457200" defTabSz="3135313">
@@ -10417,9 +10417,6 @@
               </a:rPr>
               <a:t>Use SQL queries and UDF </a:t>
             </a:r>
-            <a:endParaRPr lang="en-US" dirty="0" smtClean="0">
-              <a:latin typeface="+mn-lt"/>
-            </a:endParaRPr>
           </a:p>
           <a:p>
             <a:pPr marL="914400" lvl="1" indent="-457200" defTabSz="3135313">
@@ -10450,45 +10447,25 @@
                 <a:latin typeface="+mn-lt"/>
                 <a:cs typeface="Arial"/>
               </a:rPr>
-              <a:t>Read intermediate data into Spark Dataframes or </a:t>
+              <a:t>Read intermediate data into Spark Dataframes or Datasets, and make </a:t>
             </a:r>
             <a:r>
               <a:rPr lang="en-US" dirty="0" smtClean="0">
                 <a:latin typeface="+mn-lt"/>
-                <a:cs typeface="Arial"/>
-              </a:rPr>
-              <a:t>Datasets</a:t>
+              </a:rPr>
+              <a:t>plots using R and the distributed </a:t>
+            </a:r>
+            <a:r>
+              <a:rPr lang="en-US" dirty="0" err="1" smtClean="0">
+                <a:latin typeface="+mn-lt"/>
+              </a:rPr>
+              <a:t>histogrammar</a:t>
             </a:r>
             <a:r>
               <a:rPr lang="en-US" dirty="0" smtClean="0">
                 <a:latin typeface="+mn-lt"/>
-                <a:cs typeface="Arial"/>
-              </a:rPr>
-              <a:t>, and make </a:t>
-            </a:r>
-            <a:r>
-              <a:rPr lang="en-US" dirty="0" smtClean="0">
-                <a:latin typeface="+mn-lt"/>
-              </a:rPr>
-              <a:t>plots using R and the distributed </a:t>
-            </a:r>
-            <a:r>
-              <a:rPr lang="en-US" dirty="0" err="1" smtClean="0">
-                <a:latin typeface="+mn-lt"/>
-              </a:rPr>
-              <a:t>histogrammar</a:t>
-            </a:r>
-            <a:r>
-              <a:rPr lang="en-US" dirty="0" smtClean="0">
-                <a:latin typeface="+mn-lt"/>
-              </a:rPr>
-              <a:t> </a:t>
-            </a:r>
-            <a:r>
-              <a:rPr lang="en-US" dirty="0" smtClean="0">
-                <a:latin typeface="+mn-lt"/>
-              </a:rPr>
-              <a:t>package. </a:t>
+              </a:rPr>
+              <a:t> package. </a:t>
             </a:r>
           </a:p>
         </p:txBody>
@@ -10558,7 +10535,7 @@
                 </a:solidFill>
                 <a:latin typeface="+mn-lt"/>
               </a:rPr>
-              <a:t>Results and Findings</a:t>
+              <a:t>Results </a:t>
             </a:r>
             <a:endParaRPr lang="en-US" sz="3200" b="1" dirty="0">
               <a:solidFill>
@@ -10691,7 +10668,7 @@
         </p:spPr>
         <p:txBody>
           <a:bodyPr wrap="square" anchor="ctr">
-            <a:normAutofit lnSpcReduction="10000"/>
+            <a:normAutofit/>
           </a:bodyPr>
           <a:lstStyle/>
           <a:p>
@@ -10701,98 +10678,21 @@
                 <a:latin typeface="Arial"/>
                 <a:cs typeface="Arial"/>
               </a:rPr>
-              <a:t>Ease of Use: </a:t>
+              <a:t>Performance </a:t>
+            </a:r>
+            <a:r>
+              <a:rPr lang="en-US" b="1" dirty="0" smtClean="0">
+                <a:latin typeface="Arial"/>
+                <a:cs typeface="Arial"/>
+              </a:rPr>
+              <a:t>at NERSC </a:t>
             </a:r>
             <a:r>
               <a:rPr lang="en-US" dirty="0" smtClean="0">
                 <a:latin typeface="Arial"/>
                 <a:cs typeface="Arial"/>
               </a:rPr>
-              <a:t>A </a:t>
-            </a:r>
-            <a:r>
-              <a:rPr lang="en-US" dirty="0" smtClean="0">
-                <a:latin typeface="Arial"/>
-                <a:cs typeface="Arial"/>
-              </a:rPr>
-              <a:t>distributed processing environment with task and data </a:t>
-            </a:r>
-            <a:r>
-              <a:rPr lang="en-US" dirty="0" smtClean="0">
-                <a:latin typeface="Arial"/>
-                <a:cs typeface="Arial"/>
-              </a:rPr>
-              <a:t>distribution </a:t>
-            </a:r>
-            <a:r>
-              <a:rPr lang="en-US" dirty="0" smtClean="0">
-                <a:latin typeface="Arial"/>
-                <a:cs typeface="Arial"/>
-              </a:rPr>
-              <a:t>and assignment abstracted from </a:t>
-            </a:r>
-            <a:r>
-              <a:rPr lang="en-US" dirty="0" smtClean="0">
-                <a:latin typeface="Arial"/>
-                <a:cs typeface="Arial"/>
-              </a:rPr>
-              <a:t>end-user, minimal bookkeeping</a:t>
-            </a:r>
-            <a:r>
-              <a:rPr lang="en-US" dirty="0" smtClean="0">
-                <a:latin typeface="Arial"/>
-                <a:cs typeface="Arial"/>
-              </a:rPr>
-              <a:t>, </a:t>
-            </a:r>
-            <a:r>
-              <a:rPr lang="en-US" dirty="0" smtClean="0">
-                <a:latin typeface="Arial"/>
-                <a:cs typeface="Arial"/>
-              </a:rPr>
-              <a:t>high </a:t>
-            </a:r>
-            <a:r>
-              <a:rPr lang="en-US" dirty="0" smtClean="0">
-                <a:latin typeface="Arial"/>
-                <a:cs typeface="Arial"/>
-              </a:rPr>
-              <a:t>level API </a:t>
-            </a:r>
-            <a:r>
-              <a:rPr lang="en-US" dirty="0" smtClean="0">
-                <a:latin typeface="Arial"/>
-                <a:cs typeface="Arial"/>
-              </a:rPr>
-              <a:t>(SQL-like queries)</a:t>
-            </a:r>
-            <a:endParaRPr lang="en-US" dirty="0" smtClean="0">
-              <a:latin typeface="Arial"/>
-              <a:cs typeface="Arial"/>
-            </a:endParaRPr>
-          </a:p>
-          <a:p>
-            <a:pPr defTabSz="3135313"/>
-            <a:r>
-              <a:rPr lang="en-US" b="1" dirty="0" smtClean="0">
-                <a:latin typeface="Arial"/>
-                <a:cs typeface="Arial"/>
-              </a:rPr>
-              <a:t>Performance at NERSC </a:t>
-            </a:r>
-            <a:r>
-              <a:rPr lang="en-US" dirty="0" smtClean="0">
-                <a:latin typeface="Arial"/>
-                <a:cs typeface="Arial"/>
-              </a:rPr>
-              <a:t>using 140 </a:t>
-            </a:r>
-            <a:r>
-              <a:rPr lang="en-US" dirty="0" smtClean="0">
-                <a:latin typeface="Arial"/>
-                <a:cs typeface="Arial"/>
-              </a:rPr>
-              <a:t>cores, and total of 46 GB compressed data in 78 HDF5 files</a:t>
+              <a:t>using 140 cores, and total of 46 GB compressed data in 78 HDF5 files</a:t>
             </a:r>
           </a:p>
           <a:p>
@@ -10821,10 +10721,6 @@
               </a:rPr>
               <a:t>1sec, 37 million events</a:t>
             </a:r>
-            <a:endParaRPr lang="en-US" dirty="0" smtClean="0">
-              <a:latin typeface="Arial"/>
-              <a:cs typeface="Arial"/>
-            </a:endParaRPr>
           </a:p>
           <a:p>
             <a:pPr marL="457200" indent="-457200" defTabSz="3135313">
@@ -10836,28 +10732,7 @@
                 <a:latin typeface="Arial"/>
                 <a:cs typeface="Arial"/>
               </a:rPr>
-              <a:t>Sum </a:t>
-            </a:r>
-            <a:r>
-              <a:rPr lang="en-US" dirty="0" smtClean="0">
-                <a:latin typeface="Arial"/>
-                <a:cs typeface="Arial"/>
-              </a:rPr>
-              <a:t>of weights </a:t>
-            </a:r>
-            <a:r>
-              <a:rPr lang="en-US" dirty="0" smtClean="0">
-                <a:latin typeface="Arial"/>
-                <a:cs typeface="Arial"/>
-              </a:rPr>
-              <a:t>for 37 million </a:t>
-            </a:r>
-            <a:r>
-              <a:rPr lang="en-US" dirty="0" smtClean="0">
-                <a:latin typeface="Arial"/>
-                <a:cs typeface="Arial"/>
-              </a:rPr>
-              <a:t>events =&gt; 2 sec </a:t>
+              <a:t>Sum of weights for 37 million events =&gt; 2 sec </a:t>
             </a:r>
           </a:p>
           <a:p>
@@ -10870,92 +10745,49 @@
                 <a:latin typeface="Arial"/>
                 <a:cs typeface="Arial"/>
               </a:rPr>
-              <a:t>Creating </a:t>
-            </a:r>
+              <a:t>Creating and saving files after filtering/cuts =&gt; 1-6 min</a:t>
+            </a:r>
+          </a:p>
+          <a:p>
+            <a:pPr defTabSz="3135313"/>
             <a:r>
               <a:rPr lang="en-US" dirty="0" smtClean="0">
                 <a:latin typeface="Arial"/>
                 <a:cs typeface="Arial"/>
               </a:rPr>
-              <a:t>and saving </a:t>
+              <a:t>Similar test was repeated with one uncompressed file with the same data, total 86 GB, initial reading and caching time is twice </a:t>
             </a:r>
             <a:r>
               <a:rPr lang="en-US" dirty="0" smtClean="0">
                 <a:latin typeface="Arial"/>
                 <a:cs typeface="Arial"/>
               </a:rPr>
-              <a:t>files after filtering/cuts =</a:t>
+              <a:t>as long. The </a:t>
             </a:r>
             <a:r>
               <a:rPr lang="en-US" dirty="0" smtClean="0">
                 <a:latin typeface="Arial"/>
                 <a:cs typeface="Arial"/>
               </a:rPr>
-              <a:t>&gt; 1-6 </a:t>
+              <a:t>rest of the tests have comparable outcome. </a:t>
+            </a:r>
+          </a:p>
+          <a:p>
+            <a:pPr defTabSz="3135313"/>
+            <a:r>
+              <a:rPr lang="en-US" b="1" dirty="0" smtClean="0">
+                <a:latin typeface="Arial"/>
+                <a:cs typeface="Arial"/>
+              </a:rPr>
+              <a:t>Performance at Princeton BD cluster</a:t>
             </a:r>
             <a:r>
               <a:rPr lang="en-US" dirty="0" smtClean="0">
                 <a:latin typeface="Arial"/>
                 <a:cs typeface="Arial"/>
               </a:rPr>
-              <a:t>min</a:t>
-            </a:r>
-          </a:p>
-          <a:p>
-            <a:pPr defTabSz="3135313"/>
-            <a:r>
-              <a:rPr lang="en-US" dirty="0" smtClean="0">
-                <a:latin typeface="Arial"/>
-                <a:cs typeface="Arial"/>
-              </a:rPr>
-              <a:t>Similar test was repeated with one uncompressed file with the same data, total 86 GB, initial reading and caching time is twice as more, however, rest of the tests have comparable outcome. </a:t>
-            </a:r>
-            <a:endParaRPr lang="en-US" dirty="0" smtClean="0">
-              <a:latin typeface="Arial"/>
-              <a:cs typeface="Arial"/>
-            </a:endParaRPr>
-          </a:p>
-          <a:p>
-            <a:pPr defTabSz="3135313"/>
-            <a:r>
-              <a:rPr lang="en-US" b="1" dirty="0" smtClean="0">
-                <a:latin typeface="Arial"/>
-                <a:cs typeface="Arial"/>
-              </a:rPr>
-              <a:t>Performance </a:t>
-            </a:r>
-            <a:r>
-              <a:rPr lang="en-US" b="1" dirty="0" smtClean="0">
-                <a:latin typeface="Arial"/>
-                <a:cs typeface="Arial"/>
-              </a:rPr>
-              <a:t>at </a:t>
-            </a:r>
-            <a:r>
-              <a:rPr lang="en-US" b="1" dirty="0" smtClean="0">
-                <a:latin typeface="Arial"/>
-                <a:cs typeface="Arial"/>
-              </a:rPr>
-              <a:t>Princeton BD cluster</a:t>
-            </a:r>
-            <a:r>
-              <a:rPr lang="en-US" dirty="0" smtClean="0">
-                <a:latin typeface="Arial"/>
-                <a:cs typeface="Arial"/>
-              </a:rPr>
-              <a:t> </a:t>
-            </a:r>
-            <a:r>
-              <a:rPr lang="en-US" dirty="0" smtClean="0">
-                <a:latin typeface="Arial"/>
-                <a:cs typeface="Arial"/>
-              </a:rPr>
-              <a:t>using 140 cores: </a:t>
-            </a:r>
-            <a:endParaRPr lang="en-US" dirty="0" smtClean="0">
-              <a:latin typeface="Arial"/>
-              <a:cs typeface="Arial"/>
-            </a:endParaRPr>
+              <a:t> using 140 cores: </a:t>
+            </a:r>
           </a:p>
           <a:p>
             <a:pPr marL="457200" indent="-457200" defTabSz="3135313">
@@ -11001,7 +10833,7 @@
         <p:spPr bwMode="auto">
           <a:xfrm>
             <a:off x="32971094" y="24709972"/>
-            <a:ext cx="9766522" cy="5753095"/>
+            <a:ext cx="9766522" cy="6261095"/>
           </a:xfrm>
           <a:prstGeom prst="roundRect">
             <a:avLst>
@@ -11038,104 +10870,78 @@
           <a:bodyPr wrap="square" anchor="ctr"/>
           <a:lstStyle/>
           <a:p>
-            <a:pPr marL="457200" indent="-457200" algn="just">
+            <a:r>
+              <a:rPr lang="en-US" sz="2800" dirty="0" smtClean="0">
+                <a:latin typeface="Arial"/>
+                <a:cs typeface="Arial"/>
+              </a:rPr>
+              <a:t>The goal of </a:t>
+            </a:r>
+            <a:r>
+              <a:rPr lang="en-US" sz="2800" dirty="0" smtClean="0">
+                <a:latin typeface="Arial"/>
+                <a:cs typeface="Arial"/>
+              </a:rPr>
+              <a:t>our exploratory study is to </a:t>
+            </a:r>
+            <a:r>
+              <a:rPr lang="en-US" sz="2800" dirty="0" smtClean="0">
+                <a:latin typeface="Arial"/>
+                <a:cs typeface="Arial"/>
+              </a:rPr>
+              <a:t>shorten </a:t>
+            </a:r>
+            <a:r>
+              <a:rPr lang="en-US" sz="2800" i="1" dirty="0" smtClean="0">
+                <a:latin typeface="Arial"/>
+                <a:cs typeface="Arial"/>
+              </a:rPr>
+              <a:t>time </a:t>
+            </a:r>
+            <a:r>
+              <a:rPr lang="en-US" sz="2800" i="1" dirty="0" smtClean="0">
+                <a:latin typeface="Arial"/>
+                <a:cs typeface="Arial"/>
+              </a:rPr>
+              <a:t>to </a:t>
+            </a:r>
+            <a:r>
+              <a:rPr lang="en-US" sz="2800" i="1" dirty="0" smtClean="0">
+                <a:latin typeface="Arial"/>
+                <a:cs typeface="Arial"/>
+              </a:rPr>
+              <a:t>physics </a:t>
+            </a:r>
+            <a:r>
+              <a:rPr lang="en-US" sz="2800" dirty="0" smtClean="0">
+                <a:latin typeface="Arial"/>
+                <a:cs typeface="Arial"/>
+              </a:rPr>
+              <a:t>using Spark</a:t>
+            </a:r>
+          </a:p>
+          <a:p>
+            <a:pPr marL="457200" indent="-457200">
               <a:buFont typeface="Wingdings" charset="2"/>
               <a:buChar char="Ø"/>
             </a:pPr>
             <a:r>
+              <a:rPr lang="en-US" sz="2800" dirty="0">
+                <a:latin typeface="Arial"/>
+                <a:cs typeface="Arial"/>
+              </a:rPr>
+              <a:t>We have observed good scalability, </a:t>
+            </a:r>
+            <a:r>
               <a:rPr lang="en-US" sz="2800" dirty="0" smtClean="0">
                 <a:latin typeface="Arial"/>
                 <a:cs typeface="Arial"/>
               </a:rPr>
-              <a:t>Big </a:t>
-            </a:r>
-            <a:r>
-              <a:rPr lang="en-US" sz="2800" dirty="0">
-                <a:latin typeface="Arial"/>
-                <a:cs typeface="Arial"/>
-              </a:rPr>
-              <a:t>Data technologies </a:t>
-            </a:r>
-            <a:r>
-              <a:rPr lang="en-US" sz="2800" dirty="0" smtClean="0">
-                <a:latin typeface="Arial"/>
-                <a:cs typeface="Arial"/>
-              </a:rPr>
-              <a:t>are promising </a:t>
-            </a:r>
-            <a:r>
-              <a:rPr lang="en-US" sz="2800" dirty="0">
-                <a:latin typeface="Arial"/>
-                <a:cs typeface="Arial"/>
-              </a:rPr>
-              <a:t>to shorten "</a:t>
-            </a:r>
-            <a:r>
-              <a:rPr lang="en-US" sz="2800" dirty="0" smtClean="0">
-                <a:latin typeface="Arial"/>
-                <a:cs typeface="Arial"/>
-              </a:rPr>
-              <a:t>time to </a:t>
-            </a:r>
-            <a:r>
-              <a:rPr lang="en-US" sz="2800" dirty="0">
-                <a:latin typeface="Arial"/>
-                <a:cs typeface="Arial"/>
-              </a:rPr>
-              <a:t>physics": </a:t>
-            </a:r>
-            <a:r>
-              <a:rPr lang="en-US" sz="2800" dirty="0" smtClean="0">
-                <a:latin typeface="Arial"/>
-                <a:cs typeface="Arial"/>
-              </a:rPr>
-              <a:t>Spark </a:t>
-            </a:r>
-            <a:r>
-              <a:rPr lang="en-US" sz="2800" dirty="0">
-                <a:latin typeface="Arial"/>
-                <a:cs typeface="Arial"/>
-              </a:rPr>
-              <a:t>reduces book keeping overhead </a:t>
-            </a:r>
-            <a:r>
-              <a:rPr lang="en-US" sz="2800" dirty="0" smtClean="0">
-                <a:latin typeface="Arial"/>
-                <a:cs typeface="Arial"/>
-              </a:rPr>
-              <a:t>and has </a:t>
-            </a:r>
-            <a:r>
-              <a:rPr lang="en-US" sz="2800" dirty="0">
-                <a:latin typeface="Arial"/>
-                <a:cs typeface="Arial"/>
-              </a:rPr>
-              <a:t>potential </a:t>
-            </a:r>
-            <a:r>
-              <a:rPr lang="en-US" sz="2800" dirty="0" smtClean="0">
-                <a:latin typeface="Arial"/>
-                <a:cs typeface="Arial"/>
-              </a:rPr>
-              <a:t>to </a:t>
-            </a:r>
-            <a:r>
-              <a:rPr lang="en-US" sz="2800" dirty="0">
-                <a:latin typeface="Arial"/>
-                <a:cs typeface="Arial"/>
-              </a:rPr>
-              <a:t>optimize analysis of very big </a:t>
-            </a:r>
-            <a:r>
-              <a:rPr lang="en-US" sz="2800" dirty="0" smtClean="0">
-                <a:latin typeface="Arial"/>
-                <a:cs typeface="Arial"/>
-              </a:rPr>
-              <a:t>datasets. </a:t>
-            </a:r>
-          </a:p>
-          <a:p>
-            <a:pPr marL="457200" indent="-457200" algn="just">
+              <a:t>task distribution and data partitioning</a:t>
+            </a:r>
+          </a:p>
+          <a:p>
+            <a:pPr marL="457200" indent="-457200">
               <a:buFont typeface="Wingdings" charset="2"/>
               <a:buChar char="Ø"/>
             </a:pPr>
@@ -11144,18 +10950,60 @@
                 <a:latin typeface="Arial"/>
                 <a:cs typeface="Arial"/>
               </a:rPr>
-              <a:t>We have observed good scalability, data and task orchestration and support of high level API in </a:t>
+              <a:t>Availability </a:t>
+            </a:r>
+            <a:r>
+              <a:rPr lang="en-US" sz="2800" dirty="0">
+                <a:latin typeface="Arial"/>
+                <a:cs typeface="Arial"/>
+              </a:rPr>
+              <a:t>of </a:t>
+            </a:r>
+            <a:r>
+              <a:rPr lang="en-US" sz="2800" dirty="0" err="1">
+                <a:latin typeface="Arial"/>
+                <a:cs typeface="Arial"/>
+              </a:rPr>
+              <a:t>pySpark</a:t>
+            </a:r>
+            <a:r>
+              <a:rPr lang="en-US" sz="2800" dirty="0">
+                <a:latin typeface="Arial"/>
+                <a:cs typeface="Arial"/>
+              </a:rPr>
+              <a:t> and </a:t>
+            </a:r>
+            <a:r>
+              <a:rPr lang="en-US" sz="2800" dirty="0" err="1" smtClean="0">
+                <a:latin typeface="Arial"/>
+                <a:cs typeface="Arial"/>
+              </a:rPr>
+              <a:t>SparkR</a:t>
             </a:r>
             <a:r>
               <a:rPr lang="en-US" sz="2800" dirty="0" smtClean="0">
                 <a:latin typeface="Arial"/>
                 <a:cs typeface="Arial"/>
               </a:rPr>
-              <a:t>Spark </a:t>
-            </a:r>
-          </a:p>
-          <a:p>
-            <a:pPr marL="457200" indent="-457200" algn="just">
+              <a:t> high level </a:t>
+            </a:r>
+            <a:r>
+              <a:rPr lang="en-US" sz="2800" smtClean="0">
+                <a:latin typeface="Arial"/>
+                <a:cs typeface="Arial"/>
+              </a:rPr>
+              <a:t>APIs are </a:t>
+            </a:r>
+            <a:r>
+              <a:rPr lang="en-US" sz="2800" dirty="0">
+                <a:latin typeface="Arial"/>
+                <a:cs typeface="Arial"/>
+              </a:rPr>
+              <a:t>appealing to the HEP user community </a:t>
+            </a:r>
+          </a:p>
+          <a:p>
+            <a:pPr marL="457200" indent="-457200">
               <a:buFont typeface="Wingdings" charset="2"/>
               <a:buChar char="Ø"/>
             </a:pPr>
@@ -11164,7 +11012,76 @@
                 <a:latin typeface="Arial"/>
                 <a:cs typeface="Arial"/>
               </a:rPr>
-              <a:t>Documentation, and support needs to be better</a:t>
+              <a:t>Encoding skimming workflow using </a:t>
+            </a:r>
+            <a:r>
+              <a:rPr lang="en-US" sz="2800" dirty="0" err="1" smtClean="0">
+                <a:latin typeface="Arial"/>
+                <a:cs typeface="Arial"/>
+              </a:rPr>
+              <a:t>Scala</a:t>
+            </a:r>
+            <a:r>
+              <a:rPr lang="en-US" sz="2800" dirty="0" smtClean="0">
+                <a:latin typeface="Arial"/>
+                <a:cs typeface="Arial"/>
+              </a:rPr>
+              <a:t> best practices is challenging along with optimal use of Spark </a:t>
+            </a:r>
+            <a:r>
+              <a:rPr lang="en-US" sz="2800" dirty="0" err="1" smtClean="0">
+                <a:latin typeface="Arial"/>
+                <a:cs typeface="Arial"/>
+              </a:rPr>
+              <a:t>DataFrame</a:t>
+            </a:r>
+            <a:r>
+              <a:rPr lang="en-US" sz="2800" dirty="0" smtClean="0">
+                <a:latin typeface="Arial"/>
+                <a:cs typeface="Arial"/>
+              </a:rPr>
+              <a:t> features </a:t>
+            </a:r>
+          </a:p>
+          <a:p>
+            <a:pPr marL="457200" indent="-457200">
+              <a:buFont typeface="Wingdings" charset="2"/>
+              <a:buChar char="Ø"/>
+            </a:pPr>
+            <a:r>
+              <a:rPr lang="en-US" sz="2800" dirty="0" smtClean="0">
+                <a:latin typeface="Arial"/>
+                <a:cs typeface="Arial"/>
+              </a:rPr>
+              <a:t>Documentation</a:t>
+            </a:r>
+            <a:r>
+              <a:rPr lang="en-US" sz="2800" dirty="0" smtClean="0">
+                <a:latin typeface="Arial"/>
+                <a:cs typeface="Arial"/>
+              </a:rPr>
+              <a:t>, and </a:t>
+            </a:r>
+            <a:r>
+              <a:rPr lang="en-US" sz="2800" dirty="0" smtClean="0">
+                <a:latin typeface="Arial"/>
+                <a:cs typeface="Arial"/>
+              </a:rPr>
+              <a:t>error reporting</a:t>
+            </a:r>
+            <a:r>
+              <a:rPr lang="en-US" sz="2800" dirty="0" smtClean="0">
+                <a:latin typeface="Arial"/>
+                <a:cs typeface="Arial"/>
+              </a:rPr>
+              <a:t> </a:t>
+            </a:r>
+            <a:r>
+              <a:rPr lang="en-US" sz="2800" dirty="0" smtClean="0">
+                <a:latin typeface="Arial"/>
+                <a:cs typeface="Arial"/>
+              </a:rPr>
+              <a:t>needs to be better</a:t>
             </a:r>
             <a:endParaRPr lang="en-US" sz="2800" dirty="0">
               <a:latin typeface="Arial"/>
@@ -11172,7 +11089,27 @@
             </a:endParaRPr>
           </a:p>
           <a:p>
-            <a:pPr marL="457200" indent="-457200" algn="just">
+            <a:r>
+              <a:rPr lang="en-US" sz="2800" dirty="0" smtClean="0">
+                <a:latin typeface="Arial"/>
+                <a:cs typeface="Arial"/>
+              </a:rPr>
+              <a:t>Future direction</a:t>
+            </a:r>
+            <a:r>
+              <a:rPr lang="en-US" sz="2800" dirty="0" smtClean="0">
+                <a:latin typeface="Arial"/>
+                <a:cs typeface="Arial"/>
+              </a:rPr>
+              <a:t>:</a:t>
+            </a:r>
+            <a:endParaRPr lang="en-US" sz="2800" dirty="0">
+              <a:latin typeface="Arial"/>
+              <a:cs typeface="Arial"/>
+            </a:endParaRPr>
+          </a:p>
+          <a:p>
+            <a:pPr marL="457200" indent="-457200">
               <a:buFont typeface="Wingdings" charset="2"/>
               <a:buChar char="Ø"/>
             </a:pPr>
@@ -11181,32 +11118,11 @@
                 <a:latin typeface="Arial"/>
                 <a:cs typeface="Arial"/>
               </a:rPr>
-              <a:t>Next </a:t>
-            </a:r>
-            <a:r>
-              <a:rPr lang="en-US" sz="2800" dirty="0">
-                <a:latin typeface="Arial"/>
-                <a:cs typeface="Arial"/>
-              </a:rPr>
-              <a:t>steps on the way to </a:t>
-            </a:r>
-            <a:r>
-              <a:rPr lang="en-US" sz="2800" dirty="0" smtClean="0">
-                <a:latin typeface="Arial"/>
-                <a:cs typeface="Arial"/>
-              </a:rPr>
-              <a:t>a full </a:t>
-            </a:r>
-            <a:r>
-              <a:rPr lang="en-US" sz="2800" dirty="0">
-                <a:latin typeface="Arial"/>
-                <a:cs typeface="Arial"/>
-              </a:rPr>
-              <a:t>feasibility study:</a:t>
-            </a:r>
-          </a:p>
-          <a:p>
-            <a:pPr marL="914400" lvl="1" indent="-457200" algn="just">
+              <a:t>Improve the HDF5 reader interface </a:t>
+            </a:r>
+          </a:p>
+          <a:p>
+            <a:pPr marL="457200" indent="-457200">
               <a:buFont typeface="Wingdings" charset="2"/>
               <a:buChar char="Ø"/>
             </a:pPr>
@@ -11215,32 +11131,11 @@
                 <a:latin typeface="Arial"/>
                 <a:cs typeface="Arial"/>
               </a:rPr>
-              <a:t>Optimize </a:t>
-            </a:r>
-            <a:r>
-              <a:rPr lang="en-US" sz="2800" dirty="0">
-                <a:latin typeface="Arial"/>
-                <a:cs typeface="Arial"/>
-              </a:rPr>
-              <a:t>analysis workflow to the new big </a:t>
-            </a:r>
-            <a:r>
-              <a:rPr lang="en-US" sz="2800" dirty="0" smtClean="0">
-                <a:latin typeface="Arial"/>
-                <a:cs typeface="Arial"/>
-              </a:rPr>
-              <a:t>data technology </a:t>
-            </a:r>
-            <a:r>
-              <a:rPr lang="en-US" sz="2800" dirty="0">
-                <a:latin typeface="Arial"/>
-                <a:cs typeface="Arial"/>
-              </a:rPr>
-              <a:t>paradigm</a:t>
-            </a:r>
-          </a:p>
-          <a:p>
-            <a:pPr marL="914400" lvl="1" indent="-457200" algn="just">
+              <a:t>Optimize skimming workflow </a:t>
+            </a:r>
+          </a:p>
+          <a:p>
+            <a:pPr marL="457200" indent="-457200">
               <a:buFont typeface="Wingdings" charset="2"/>
               <a:buChar char="Ø"/>
             </a:pPr>
@@ -11249,21 +11144,7 @@
                 <a:latin typeface="Arial"/>
                 <a:cs typeface="Arial"/>
               </a:rPr>
-              <a:t>Demonstrate </a:t>
-            </a:r>
-            <a:r>
-              <a:rPr lang="en-US" sz="2800" dirty="0">
-                <a:latin typeface="Arial"/>
-                <a:cs typeface="Arial"/>
-              </a:rPr>
-              <a:t>multi-user capabilities on </a:t>
-            </a:r>
-            <a:r>
-              <a:rPr lang="en-US" sz="2800" dirty="0" smtClean="0">
-                <a:latin typeface="Arial"/>
-                <a:cs typeface="Arial"/>
-              </a:rPr>
-              <a:t>Petabyte  datasets</a:t>
+              <a:t>Scale up to greater than TB data set</a:t>
             </a:r>
           </a:p>
         </p:txBody>
@@ -11278,8 +11159,8 @@
         </p:nvSpPr>
         <p:spPr bwMode="auto">
           <a:xfrm>
-            <a:off x="32971094" y="30638520"/>
-            <a:ext cx="9766522" cy="1505887"/>
+            <a:off x="32971094" y="31106533"/>
+            <a:ext cx="9766522" cy="1037874"/>
           </a:xfrm>
           <a:prstGeom prst="roundRect">
             <a:avLst>
@@ -11317,35 +11198,35 @@
           <a:lstStyle/>
           <a:p>
             <a:r>
-              <a:rPr lang="en-US" sz="2400" dirty="0" smtClean="0">
+              <a:rPr lang="en-US" sz="2000" dirty="0" smtClean="0">
                 <a:latin typeface="Arial"/>
                 <a:cs typeface="Arial"/>
               </a:rPr>
               <a:t>This study is supported by the Department of Energy (DOE). The CMS collaboration is supported by DOE</a:t>
             </a:r>
             <a:r>
-              <a:rPr lang="en-US" sz="2400" dirty="0">
+              <a:rPr lang="en-US" sz="2000" dirty="0">
                 <a:latin typeface="Arial"/>
                 <a:cs typeface="Arial"/>
               </a:rPr>
               <a:t>, NSF, </a:t>
             </a:r>
             <a:r>
-              <a:rPr lang="en-US" sz="2400" dirty="0" smtClean="0">
+              <a:rPr lang="en-US" sz="2000" dirty="0" smtClean="0">
                 <a:latin typeface="Arial"/>
                 <a:cs typeface="Arial"/>
               </a:rPr>
               <a:t>and international </a:t>
             </a:r>
             <a:r>
-              <a:rPr lang="en-US" sz="2400" dirty="0">
+              <a:rPr lang="en-US" sz="2000" dirty="0">
                 <a:latin typeface="Arial"/>
                 <a:cs typeface="Arial"/>
               </a:rPr>
               <a:t>funding </a:t>
             </a:r>
             <a:r>
-              <a:rPr lang="en-US" sz="2400" dirty="0" smtClean="0">
+              <a:rPr lang="en-US" sz="2000" dirty="0" smtClean="0">
                 <a:latin typeface="Arial"/>
                 <a:cs typeface="Arial"/>
               </a:rPr>
@@ -11508,14 +11389,7 @@
                 <a:latin typeface="Arial"/>
                 <a:cs typeface="Arial"/>
               </a:rPr>
-              <a:t>Recorded data and simulations are processed centrally and the output is analyzed by all physicists looking for a wealth of different physics </a:t>
-            </a:r>
-            <a:r>
-              <a:rPr lang="en-US" sz="2400" dirty="0" smtClean="0">
-                <a:latin typeface="Arial"/>
-                <a:cs typeface="Arial"/>
-              </a:rPr>
-              <a:t>signals</a:t>
+              <a:t>Recorded data and simulations are processed centrally and the output is analyzed by all physicists looking for a wealth of different physics signals</a:t>
             </a:r>
             <a:endParaRPr lang="en-US" sz="2800" dirty="0" smtClean="0">
               <a:latin typeface="Arial"/>
@@ -11795,10 +11669,6 @@
               </a:rPr>
               <a:t>, Tau, Photon, Jets)</a:t>
             </a:r>
-            <a:endParaRPr lang="en-US" sz="2400" dirty="0" smtClean="0">
-              <a:latin typeface="Arial"/>
-              <a:cs typeface="Arial"/>
-            </a:endParaRPr>
           </a:p>
           <a:p>
             <a:pPr marL="914400" lvl="1" indent="-457200">

</xml_diff>

<commit_message>
revisions with Jim K
</commit_message>
<xml_diff>
--- a/poster/cmsbigdataSCposter.pptx
+++ b/poster/cmsbigdataSCposter.pptx
@@ -8673,219 +8673,6 @@
       </p:grpSpPr>
       <p:sp>
         <p:nvSpPr>
-          <p:cNvPr id="52" name="AutoShape 508"/>
-          <p:cNvSpPr>
-            <a:spLocks noChangeArrowheads="1"/>
-          </p:cNvSpPr>
-          <p:nvPr/>
-        </p:nvSpPr>
-        <p:spPr bwMode="auto">
-          <a:xfrm>
-            <a:off x="37541201" y="15185084"/>
-            <a:ext cx="5196415" cy="7865309"/>
-          </a:xfrm>
-          <a:prstGeom prst="roundRect">
-            <a:avLst>
-              <a:gd name="adj" fmla="val 16667"/>
-            </a:avLst>
-          </a:prstGeom>
-          <a:solidFill>
-            <a:schemeClr val="bg1"/>
-          </a:solidFill>
-          <a:ln w="28575">
-            <a:solidFill>
-              <a:schemeClr val="tx1"/>
-            </a:solidFill>
-            <a:round/>
-            <a:headEnd/>
-            <a:tailEnd/>
-          </a:ln>
-          <a:effectLst/>
-          <a:extLst>
-            <a:ext uri="{AF507438-7753-43e0-B8FC-AC1667EBCBE1}">
-              <a14:hiddenEffects xmlns:a14="http://schemas.microsoft.com/office/drawing/2010/main">
-                <a:effectLst>
-                  <a:outerShdw blurRad="63500" dist="38099" dir="2700000" algn="ctr" rotWithShape="0">
-                    <a:schemeClr val="bg2">
-                      <a:alpha val="74998"/>
-                    </a:schemeClr>
-                  </a:outerShdw>
-                </a:effectLst>
-              </a14:hiddenEffects>
-            </a:ext>
-          </a:extLst>
-        </p:spPr>
-        <p:txBody>
-          <a:bodyPr wrap="square" anchor="ctr">
-            <a:noAutofit/>
-          </a:bodyPr>
-          <a:lstStyle/>
-          <a:p>
-            <a:pPr algn="ctr" defTabSz="3135313"/>
-            <a:endParaRPr lang="en-US" dirty="0" smtClean="0">
-              <a:latin typeface="+mn-lt"/>
-            </a:endParaRPr>
-          </a:p>
-          <a:p>
-            <a:pPr algn="ctr" defTabSz="3135313"/>
-            <a:endParaRPr lang="en-US" dirty="0">
-              <a:latin typeface="+mn-lt"/>
-            </a:endParaRPr>
-          </a:p>
-          <a:p>
-            <a:pPr algn="ctr" defTabSz="3135313"/>
-            <a:endParaRPr lang="en-US" dirty="0" smtClean="0">
-              <a:latin typeface="+mn-lt"/>
-            </a:endParaRPr>
-          </a:p>
-          <a:p>
-            <a:pPr algn="ctr" defTabSz="3135313"/>
-            <a:endParaRPr lang="en-US" dirty="0">
-              <a:latin typeface="+mn-lt"/>
-            </a:endParaRPr>
-          </a:p>
-          <a:p>
-            <a:pPr algn="ctr" defTabSz="3135313"/>
-            <a:endParaRPr lang="en-US" dirty="0" smtClean="0">
-              <a:latin typeface="+mn-lt"/>
-            </a:endParaRPr>
-          </a:p>
-          <a:p>
-            <a:pPr algn="ctr" defTabSz="3135313"/>
-            <a:endParaRPr lang="en-US" dirty="0" smtClean="0">
-              <a:latin typeface="+mn-lt"/>
-            </a:endParaRPr>
-          </a:p>
-          <a:p>
-            <a:pPr algn="ctr" defTabSz="3135313"/>
-            <a:endParaRPr lang="en-US" dirty="0">
-              <a:latin typeface="+mn-lt"/>
-            </a:endParaRPr>
-          </a:p>
-          <a:p>
-            <a:pPr algn="ctr" defTabSz="3135313"/>
-            <a:endParaRPr lang="en-US" dirty="0">
-              <a:latin typeface="+mn-lt"/>
-            </a:endParaRPr>
-          </a:p>
-          <a:p>
-            <a:pPr algn="ctr" defTabSz="3135313"/>
-            <a:endParaRPr lang="en-US" dirty="0" smtClean="0">
-              <a:latin typeface="+mn-lt"/>
-            </a:endParaRPr>
-          </a:p>
-          <a:p>
-            <a:pPr algn="ctr" defTabSz="3135313"/>
-            <a:endParaRPr lang="en-US" sz="2000" dirty="0" smtClean="0">
-              <a:latin typeface="+mn-lt"/>
-              <a:cs typeface="Arial"/>
-            </a:endParaRPr>
-          </a:p>
-          <a:p>
-            <a:pPr algn="ctr" defTabSz="3135313"/>
-            <a:endParaRPr lang="en-US" sz="2000" dirty="0">
-              <a:latin typeface="+mn-lt"/>
-              <a:cs typeface="Arial"/>
-            </a:endParaRPr>
-          </a:p>
-          <a:p>
-            <a:pPr algn="ctr" defTabSz="3135313"/>
-            <a:endParaRPr lang="en-US" sz="2000" dirty="0" smtClean="0">
-              <a:latin typeface="+mn-lt"/>
-              <a:cs typeface="Arial"/>
-            </a:endParaRPr>
-          </a:p>
-          <a:p>
-            <a:pPr algn="ctr" defTabSz="3135313"/>
-            <a:endParaRPr lang="en-US" sz="2000" dirty="0">
-              <a:latin typeface="+mn-lt"/>
-              <a:cs typeface="Arial"/>
-            </a:endParaRPr>
-          </a:p>
-          <a:p>
-            <a:pPr algn="ctr" defTabSz="3135313"/>
-            <a:endParaRPr lang="en-US" sz="2000" dirty="0" smtClean="0">
-              <a:latin typeface="+mn-lt"/>
-              <a:cs typeface="Arial"/>
-            </a:endParaRPr>
-          </a:p>
-          <a:p>
-            <a:pPr algn="ctr" defTabSz="3135313"/>
-            <a:endParaRPr lang="en-US" sz="2000" dirty="0">
-              <a:latin typeface="+mn-lt"/>
-              <a:cs typeface="Arial"/>
-            </a:endParaRPr>
-          </a:p>
-          <a:p>
-            <a:pPr algn="ctr" defTabSz="3135313"/>
-            <a:endParaRPr lang="en-US" sz="2000" dirty="0" smtClean="0">
-              <a:latin typeface="+mn-lt"/>
-              <a:cs typeface="Arial"/>
-            </a:endParaRPr>
-          </a:p>
-          <a:p>
-            <a:pPr algn="ctr" defTabSz="3135313"/>
-            <a:endParaRPr lang="en-US" sz="2000" dirty="0">
-              <a:latin typeface="+mn-lt"/>
-              <a:cs typeface="Arial"/>
-            </a:endParaRPr>
-          </a:p>
-          <a:p>
-            <a:pPr algn="ctr" defTabSz="3135313"/>
-            <a:endParaRPr lang="en-US" sz="2000" dirty="0" smtClean="0">
-              <a:latin typeface="+mn-lt"/>
-              <a:cs typeface="Arial"/>
-            </a:endParaRPr>
-          </a:p>
-          <a:p>
-            <a:pPr algn="ctr" defTabSz="3135313"/>
-            <a:endParaRPr lang="en-US" sz="1400" dirty="0" smtClean="0">
-              <a:latin typeface="+mn-lt"/>
-              <a:cs typeface="Arial"/>
-            </a:endParaRPr>
-          </a:p>
-          <a:p>
-            <a:pPr algn="ctr" defTabSz="3135313"/>
-            <a:r>
-              <a:rPr lang="en-US" sz="1400" dirty="0" smtClean="0">
-                <a:latin typeface="+mn-lt"/>
-                <a:cs typeface="Arial"/>
-              </a:rPr>
-              <a:t>This figure shows the output of the use case workflow. It shows </a:t>
-            </a:r>
-            <a:r>
-              <a:rPr lang="en-US" sz="1400" dirty="0">
-                <a:latin typeface="+mn-lt"/>
-                <a:cs typeface="Arial"/>
-              </a:rPr>
-              <a:t>Muon </a:t>
-            </a:r>
-            <a:r>
-              <a:rPr lang="en-US" sz="1400" dirty="0" smtClean="0">
-                <a:latin typeface="+mn-lt"/>
-                <a:cs typeface="Arial"/>
-              </a:rPr>
-              <a:t>transverse momentum </a:t>
-            </a:r>
-            <a:r>
-              <a:rPr lang="en-US" sz="1400" dirty="0">
-                <a:latin typeface="+mn-lt"/>
-                <a:cs typeface="Arial"/>
-              </a:rPr>
-              <a:t>distributions for di-boson </a:t>
-            </a:r>
-            <a:r>
-              <a:rPr lang="en-US" sz="1400" dirty="0" smtClean="0">
-                <a:latin typeface="+mn-lt"/>
-                <a:cs typeface="Arial"/>
-              </a:rPr>
-              <a:t>simulated samples.</a:t>
-            </a:r>
-          </a:p>
-        </p:txBody>
-      </p:sp>
-      <p:sp>
-        <p:nvSpPr>
           <p:cNvPr id="2053" name="Rectangle 5"/>
           <p:cNvSpPr>
             <a:spLocks noChangeArrowheads="1"/>
@@ -9450,7 +9237,7 @@
         </p:nvSpPr>
         <p:spPr bwMode="auto">
           <a:xfrm>
-            <a:off x="21636959" y="6349541"/>
+            <a:off x="21636959" y="14869157"/>
             <a:ext cx="15520906" cy="8287532"/>
           </a:xfrm>
           <a:prstGeom prst="roundRect">
@@ -9999,7 +9786,7 @@
         </p:nvSpPr>
         <p:spPr bwMode="auto">
           <a:xfrm>
-            <a:off x="21636959" y="14801327"/>
+            <a:off x="21636959" y="6158253"/>
             <a:ext cx="15520906" cy="8495942"/>
           </a:xfrm>
           <a:prstGeom prst="roundRect">
@@ -10985,14 +10772,7 @@
                 <a:latin typeface="Arial"/>
                 <a:cs typeface="Arial"/>
               </a:rPr>
-              <a:t> high level </a:t>
-            </a:r>
-            <a:r>
-              <a:rPr lang="en-US" sz="2800" smtClean="0">
-                <a:latin typeface="Arial"/>
-                <a:cs typeface="Arial"/>
-              </a:rPr>
-              <a:t>APIs are </a:t>
+              <a:t> high level APIs are </a:t>
             </a:r>
             <a:r>
               <a:rPr lang="en-US" sz="2800" dirty="0">
@@ -11932,242 +11712,6 @@
           </a:p>
         </p:txBody>
       </p:sp>
-      <p:sp>
-        <p:nvSpPr>
-          <p:cNvPr id="43" name="AutoShape 508"/>
-          <p:cNvSpPr>
-            <a:spLocks noChangeArrowheads="1"/>
-          </p:cNvSpPr>
-          <p:nvPr/>
-        </p:nvSpPr>
-        <p:spPr bwMode="auto">
-          <a:xfrm>
-            <a:off x="37530640" y="6350480"/>
-            <a:ext cx="5206976" cy="8303715"/>
-          </a:xfrm>
-          <a:prstGeom prst="roundRect">
-            <a:avLst>
-              <a:gd name="adj" fmla="val 16667"/>
-            </a:avLst>
-          </a:prstGeom>
-          <a:solidFill>
-            <a:schemeClr val="bg1"/>
-          </a:solidFill>
-          <a:ln w="28575">
-            <a:solidFill>
-              <a:schemeClr val="tx1"/>
-            </a:solidFill>
-            <a:round/>
-            <a:headEnd/>
-            <a:tailEnd/>
-          </a:ln>
-          <a:effectLst/>
-          <a:extLst>
-            <a:ext uri="{AF507438-7753-43e0-B8FC-AC1667EBCBE1}">
-              <a14:hiddenEffects xmlns:a14="http://schemas.microsoft.com/office/drawing/2010/main">
-                <a:effectLst>
-                  <a:outerShdw blurRad="63500" dist="38099" dir="2700000" algn="ctr" rotWithShape="0">
-                    <a:schemeClr val="bg2">
-                      <a:alpha val="74998"/>
-                    </a:schemeClr>
-                  </a:outerShdw>
-                </a:effectLst>
-              </a14:hiddenEffects>
-            </a:ext>
-          </a:extLst>
-        </p:spPr>
-        <p:txBody>
-          <a:bodyPr wrap="square" anchor="ctr">
-            <a:spAutoFit/>
-          </a:bodyPr>
-          <a:lstStyle/>
-          <a:p>
-            <a:endParaRPr lang="en-US" sz="2400" b="1" dirty="0" smtClean="0">
-              <a:latin typeface="+mn-lt"/>
-            </a:endParaRPr>
-          </a:p>
-          <a:p>
-            <a:endParaRPr lang="en-US" sz="2400" b="1" dirty="0" smtClean="0">
-              <a:latin typeface="+mn-lt"/>
-            </a:endParaRPr>
-          </a:p>
-          <a:p>
-            <a:r>
-              <a:rPr lang="en-US" sz="2400" b="1" dirty="0" err="1" smtClean="0">
-                <a:latin typeface="+mn-lt"/>
-              </a:rPr>
-              <a:t>Histogrammar</a:t>
-            </a:r>
-            <a:r>
-              <a:rPr lang="en-US" sz="2400" b="1" dirty="0" smtClean="0">
-                <a:latin typeface="+mn-lt"/>
-              </a:rPr>
-              <a:t> </a:t>
-            </a:r>
-            <a:r>
-              <a:rPr lang="en-US" sz="2400" dirty="0">
-                <a:latin typeface="+mn-lt"/>
-              </a:rPr>
-              <a:t>is a grammar of </a:t>
-            </a:r>
-            <a:r>
-              <a:rPr lang="en-US" sz="2400" dirty="0" err="1">
-                <a:latin typeface="+mn-lt"/>
-              </a:rPr>
-              <a:t>composable</a:t>
-            </a:r>
-            <a:r>
-              <a:rPr lang="en-US" sz="2400" dirty="0">
-                <a:latin typeface="+mn-lt"/>
-              </a:rPr>
-              <a:t> histogram pieces that together provide all of the capabilities expected in a HEP </a:t>
-            </a:r>
-            <a:br>
-              <a:rPr lang="en-US" sz="2400" dirty="0">
-                <a:latin typeface="+mn-lt"/>
-              </a:rPr>
-            </a:br>
-            <a:r>
-              <a:rPr lang="en-US" sz="2400" dirty="0">
-                <a:latin typeface="+mn-lt"/>
-              </a:rPr>
-              <a:t>histogram </a:t>
-            </a:r>
-            <a:r>
-              <a:rPr lang="en-US" sz="2400" dirty="0" smtClean="0">
-                <a:latin typeface="+mn-lt"/>
-              </a:rPr>
-              <a:t>aggregation package</a:t>
-            </a:r>
-            <a:r>
-              <a:rPr lang="en-US" sz="2400" dirty="0">
-                <a:latin typeface="+mn-lt"/>
-              </a:rPr>
-              <a:t>. These pieces, called "primitive aggregators," are </a:t>
-            </a:r>
-            <a:r>
-              <a:rPr lang="en-US" sz="2400" dirty="0" smtClean="0">
-                <a:latin typeface="+mn-lt"/>
-              </a:rPr>
-              <a:t>all commutative </a:t>
-            </a:r>
-            <a:r>
-              <a:rPr lang="en-US" sz="2400" dirty="0" err="1">
-                <a:latin typeface="+mn-lt"/>
-              </a:rPr>
-              <a:t>monoids</a:t>
-            </a:r>
-            <a:r>
-              <a:rPr lang="en-US" sz="2400" dirty="0">
-                <a:latin typeface="+mn-lt"/>
-              </a:rPr>
-              <a:t>, so any composition </a:t>
-            </a:r>
-            <a:r>
-              <a:rPr lang="en-US" sz="2400" dirty="0" smtClean="0">
-                <a:latin typeface="+mn-lt"/>
-              </a:rPr>
-              <a:t>of </a:t>
-            </a:r>
-            <a:r>
-              <a:rPr lang="en-US" sz="2400" dirty="0">
-                <a:latin typeface="+mn-lt"/>
-              </a:rPr>
-              <a:t>them can be filled in any order on any partitioning of the data. We can therefore use the entire Spark cluster for data exploration </a:t>
-            </a:r>
-            <a:br>
-              <a:rPr lang="en-US" sz="2400" dirty="0">
-                <a:latin typeface="+mn-lt"/>
-              </a:rPr>
-            </a:br>
-            <a:r>
-              <a:rPr lang="en-US" sz="2400" dirty="0">
-                <a:latin typeface="+mn-lt"/>
-              </a:rPr>
-              <a:t>and final plots without being limited to a few plot types. </a:t>
-            </a:r>
-          </a:p>
-          <a:p>
-            <a:r>
-              <a:rPr lang="en-US" sz="2400" dirty="0" err="1">
-                <a:latin typeface="+mn-lt"/>
-              </a:rPr>
-              <a:t>Histogrammar</a:t>
-            </a:r>
-            <a:r>
-              <a:rPr lang="en-US" sz="2400" dirty="0">
-                <a:latin typeface="+mn-lt"/>
-              </a:rPr>
-              <a:t> is only an aggregation tool– we linked it to </a:t>
-            </a:r>
-            <a:r>
-              <a:rPr lang="en-US" sz="2400" dirty="0" err="1">
-                <a:latin typeface="+mn-lt"/>
-              </a:rPr>
-              <a:t>Bokeh</a:t>
-            </a:r>
-            <a:r>
-              <a:rPr lang="en-US" sz="2400" dirty="0">
-                <a:latin typeface="+mn-lt"/>
-              </a:rPr>
-              <a:t> to draw the plots. </a:t>
-            </a:r>
-            <a:r>
-              <a:rPr lang="en-US" sz="2400" dirty="0" smtClean="0">
-                <a:latin typeface="+mn-lt"/>
-              </a:rPr>
-              <a:t>See</a:t>
-            </a:r>
-          </a:p>
-          <a:p>
-            <a:r>
-              <a:rPr lang="en-US" sz="2400" dirty="0" smtClean="0">
-                <a:latin typeface="+mn-lt"/>
-                <a:hlinkClick r:id="rId5"/>
-              </a:rPr>
-              <a:t>http</a:t>
-            </a:r>
-            <a:r>
-              <a:rPr lang="en-US" sz="2400" dirty="0">
-                <a:latin typeface="+mn-lt"/>
-                <a:hlinkClick r:id="rId5"/>
-              </a:rPr>
-              <a:t>://</a:t>
-            </a:r>
-            <a:r>
-              <a:rPr lang="en-US" sz="2400" dirty="0" smtClean="0">
-                <a:latin typeface="+mn-lt"/>
-                <a:hlinkClick r:id="rId5"/>
-              </a:rPr>
-              <a:t>histogrammar.org</a:t>
-            </a:r>
-            <a:r>
-              <a:rPr lang="en-US" sz="2400" dirty="0" smtClean="0">
-                <a:latin typeface="+mn-lt"/>
-              </a:rPr>
-              <a:t> for </a:t>
-            </a:r>
-            <a:r>
-              <a:rPr lang="en-US" sz="2400" dirty="0">
-                <a:latin typeface="+mn-lt"/>
-              </a:rPr>
-              <a:t>more</a:t>
-            </a:r>
-            <a:r>
-              <a:rPr lang="en-US" sz="2400" dirty="0" smtClean="0">
-                <a:latin typeface="+mn-lt"/>
-              </a:rPr>
-              <a:t>.</a:t>
-            </a:r>
-            <a:r>
-              <a:rPr lang="en-US" sz="2400" dirty="0">
-                <a:latin typeface="+mn-lt"/>
-              </a:rPr>
-              <a:t> </a:t>
-            </a:r>
-          </a:p>
-        </p:txBody>
-      </p:sp>
       <p:pic>
         <p:nvPicPr>
           <p:cNvPr id="2051" name="Picture 2050"/>
@@ -12177,7 +11721,7 @@
           <p:nvPr/>
         </p:nvPicPr>
         <p:blipFill>
-          <a:blip r:embed="rId6"/>
+          <a:blip r:embed="rId5"/>
           <a:stretch>
             <a:fillRect/>
           </a:stretch>
@@ -12201,7 +11745,7 @@
           <p:nvPr/>
         </p:nvPicPr>
         <p:blipFill>
-          <a:blip r:embed="rId7"/>
+          <a:blip r:embed="rId6"/>
           <a:stretch>
             <a:fillRect/>
           </a:stretch>
@@ -12216,30 +11760,282 @@
           </a:prstGeom>
         </p:spPr>
       </p:pic>
-      <p:pic>
-        <p:nvPicPr>
-          <p:cNvPr id="2056" name="Picture 2055"/>
-          <p:cNvPicPr>
-            <a:picLocks noChangeAspect="1"/>
-          </p:cNvPicPr>
+      <p:grpSp>
+        <p:nvGrpSpPr>
+          <p:cNvPr id="3" name="Group 2"/>
+          <p:cNvGrpSpPr/>
           <p:nvPr/>
-        </p:nvPicPr>
-        <p:blipFill>
-          <a:blip r:embed="rId8"/>
-          <a:stretch>
-            <a:fillRect/>
-          </a:stretch>
-        </p:blipFill>
-        <p:spPr>
+        </p:nvGrpSpPr>
+        <p:grpSpPr>
           <a:xfrm>
-            <a:off x="38007251" y="6580700"/>
-            <a:ext cx="4055745" cy="905300"/>
+            <a:off x="37530640" y="14869157"/>
+            <a:ext cx="5206976" cy="7985282"/>
+            <a:chOff x="37530640" y="6509696"/>
+            <a:chExt cx="5206976" cy="7985282"/>
           </a:xfrm>
-          <a:prstGeom prst="rect">
-            <a:avLst/>
-          </a:prstGeom>
-        </p:spPr>
-      </p:pic>
+        </p:grpSpPr>
+        <p:sp>
+          <p:nvSpPr>
+            <p:cNvPr id="43" name="AutoShape 508"/>
+            <p:cNvSpPr>
+              <a:spLocks noChangeArrowheads="1"/>
+            </p:cNvSpPr>
+            <p:nvPr/>
+          </p:nvSpPr>
+          <p:spPr bwMode="auto">
+            <a:xfrm>
+              <a:off x="37530640" y="6509696"/>
+              <a:ext cx="5206976" cy="7985282"/>
+            </a:xfrm>
+            <a:prstGeom prst="roundRect">
+              <a:avLst>
+                <a:gd name="adj" fmla="val 16667"/>
+              </a:avLst>
+            </a:prstGeom>
+            <a:solidFill>
+              <a:schemeClr val="bg1"/>
+            </a:solidFill>
+            <a:ln w="28575">
+              <a:solidFill>
+                <a:schemeClr val="tx1"/>
+              </a:solidFill>
+              <a:round/>
+              <a:headEnd/>
+              <a:tailEnd/>
+            </a:ln>
+            <a:effectLst/>
+            <a:extLst>
+              <a:ext uri="{AF507438-7753-43e0-B8FC-AC1667EBCBE1}">
+                <a14:hiddenEffects xmlns:a14="http://schemas.microsoft.com/office/drawing/2010/main">
+                  <a:effectLst>
+                    <a:outerShdw blurRad="63500" dist="38099" dir="2700000" algn="ctr" rotWithShape="0">
+                      <a:schemeClr val="bg2">
+                        <a:alpha val="74998"/>
+                      </a:schemeClr>
+                    </a:outerShdw>
+                  </a:effectLst>
+                </a14:hiddenEffects>
+              </a:ext>
+            </a:extLst>
+          </p:spPr>
+          <p:txBody>
+            <a:bodyPr wrap="square" anchor="ctr">
+              <a:spAutoFit/>
+            </a:bodyPr>
+            <a:lstStyle/>
+            <a:p>
+              <a:endParaRPr lang="en-US" sz="2400" b="1" dirty="0" smtClean="0">
+                <a:latin typeface="+mn-lt"/>
+              </a:endParaRPr>
+            </a:p>
+            <a:p>
+              <a:endParaRPr lang="en-US" sz="2400" b="1" dirty="0" smtClean="0">
+                <a:latin typeface="+mn-lt"/>
+              </a:endParaRPr>
+            </a:p>
+            <a:p>
+              <a:r>
+                <a:rPr lang="en-US" sz="2400" b="1" dirty="0" err="1" smtClean="0">
+                  <a:latin typeface="+mn-lt"/>
+                </a:rPr>
+                <a:t>Histogrammar</a:t>
+              </a:r>
+              <a:r>
+                <a:rPr lang="en-US" sz="2400" b="1" dirty="0" smtClean="0">
+                  <a:latin typeface="+mn-lt"/>
+                </a:rPr>
+                <a:t> </a:t>
+              </a:r>
+              <a:r>
+                <a:rPr lang="en-US" sz="2400" dirty="0">
+                  <a:latin typeface="+mn-lt"/>
+                </a:rPr>
+                <a:t>is a grammar of </a:t>
+              </a:r>
+              <a:r>
+                <a:rPr lang="en-US" sz="2400" dirty="0" err="1">
+                  <a:latin typeface="+mn-lt"/>
+                </a:rPr>
+                <a:t>composable</a:t>
+              </a:r>
+              <a:r>
+                <a:rPr lang="en-US" sz="2400" dirty="0">
+                  <a:latin typeface="+mn-lt"/>
+                </a:rPr>
+                <a:t> histogram pieces that together provide all of the capabilities expected in a HEP </a:t>
+              </a:r>
+              <a:br>
+                <a:rPr lang="en-US" sz="2400" dirty="0">
+                  <a:latin typeface="+mn-lt"/>
+                </a:rPr>
+              </a:br>
+              <a:r>
+                <a:rPr lang="en-US" sz="2400" dirty="0">
+                  <a:latin typeface="+mn-lt"/>
+                </a:rPr>
+                <a:t>histogram </a:t>
+              </a:r>
+              <a:r>
+                <a:rPr lang="en-US" sz="2400" dirty="0" smtClean="0">
+                  <a:latin typeface="+mn-lt"/>
+                </a:rPr>
+                <a:t>aggregation package</a:t>
+              </a:r>
+              <a:r>
+                <a:rPr lang="en-US" sz="2400" dirty="0">
+                  <a:latin typeface="+mn-lt"/>
+                </a:rPr>
+                <a:t>. These pieces, called "primitive aggregators," are </a:t>
+              </a:r>
+              <a:r>
+                <a:rPr lang="en-US" sz="2400" dirty="0" smtClean="0">
+                  <a:latin typeface="+mn-lt"/>
+                </a:rPr>
+                <a:t>all commutative </a:t>
+              </a:r>
+              <a:r>
+                <a:rPr lang="en-US" sz="2400" dirty="0" err="1">
+                  <a:latin typeface="+mn-lt"/>
+                </a:rPr>
+                <a:t>monoids</a:t>
+              </a:r>
+              <a:r>
+                <a:rPr lang="en-US" sz="2400" dirty="0">
+                  <a:latin typeface="+mn-lt"/>
+                </a:rPr>
+                <a:t>, so any composition </a:t>
+              </a:r>
+              <a:r>
+                <a:rPr lang="en-US" sz="2400" dirty="0" smtClean="0">
+                  <a:latin typeface="+mn-lt"/>
+                </a:rPr>
+                <a:t>of </a:t>
+              </a:r>
+              <a:r>
+                <a:rPr lang="en-US" sz="2400" dirty="0">
+                  <a:latin typeface="+mn-lt"/>
+                </a:rPr>
+                <a:t>them can be filled in any order on any partitioning of the data. We can therefore use the entire Spark cluster for data exploration </a:t>
+              </a:r>
+              <a:r>
+                <a:rPr lang="en-US" sz="2400" dirty="0" smtClean="0">
+                  <a:latin typeface="+mn-lt"/>
+                </a:rPr>
+                <a:t>and </a:t>
+              </a:r>
+              <a:r>
+                <a:rPr lang="en-US" sz="2400" dirty="0">
+                  <a:latin typeface="+mn-lt"/>
+                </a:rPr>
+                <a:t>final plots without being limited to a few plot types. </a:t>
+              </a:r>
+            </a:p>
+            <a:p>
+              <a:r>
+                <a:rPr lang="en-US" sz="2400" dirty="0" err="1">
+                  <a:latin typeface="+mn-lt"/>
+                </a:rPr>
+                <a:t>Histogrammar</a:t>
+              </a:r>
+              <a:r>
+                <a:rPr lang="en-US" sz="2400" dirty="0">
+                  <a:latin typeface="+mn-lt"/>
+                </a:rPr>
+                <a:t> is only an aggregation tool– we linked it to </a:t>
+              </a:r>
+              <a:r>
+                <a:rPr lang="en-US" sz="2400" dirty="0" err="1">
+                  <a:latin typeface="+mn-lt"/>
+                </a:rPr>
+                <a:t>Bokeh</a:t>
+              </a:r>
+              <a:r>
+                <a:rPr lang="en-US" sz="2400" dirty="0">
+                  <a:latin typeface="+mn-lt"/>
+                </a:rPr>
+                <a:t> to draw the plots. </a:t>
+              </a:r>
+              <a:r>
+                <a:rPr lang="en-US" sz="2400" dirty="0" smtClean="0">
+                  <a:latin typeface="+mn-lt"/>
+                </a:rPr>
+                <a:t>See</a:t>
+              </a:r>
+            </a:p>
+            <a:p>
+              <a:r>
+                <a:rPr lang="en-US" sz="2400" dirty="0" smtClean="0">
+                  <a:latin typeface="+mn-lt"/>
+                  <a:hlinkClick r:id="rId7"/>
+                </a:rPr>
+                <a:t>http</a:t>
+              </a:r>
+              <a:r>
+                <a:rPr lang="en-US" sz="2400" dirty="0">
+                  <a:latin typeface="+mn-lt"/>
+                  <a:hlinkClick r:id="rId7"/>
+                </a:rPr>
+                <a:t>://</a:t>
+              </a:r>
+              <a:r>
+                <a:rPr lang="en-US" sz="2400" dirty="0" smtClean="0">
+                  <a:latin typeface="+mn-lt"/>
+                  <a:hlinkClick r:id="rId7"/>
+                </a:rPr>
+                <a:t>histogrammar.org</a:t>
+              </a:r>
+              <a:r>
+                <a:rPr lang="en-US" sz="2400" dirty="0" smtClean="0">
+                  <a:latin typeface="+mn-lt"/>
+                </a:rPr>
+                <a:t> for </a:t>
+              </a:r>
+              <a:r>
+                <a:rPr lang="en-US" sz="2400" dirty="0">
+                  <a:latin typeface="+mn-lt"/>
+                </a:rPr>
+                <a:t>more</a:t>
+              </a:r>
+              <a:r>
+                <a:rPr lang="en-US" sz="2400" dirty="0" smtClean="0">
+                  <a:latin typeface="+mn-lt"/>
+                </a:rPr>
+                <a:t>.</a:t>
+              </a:r>
+              <a:r>
+                <a:rPr lang="en-US" sz="2400" dirty="0">
+                  <a:latin typeface="+mn-lt"/>
+                </a:rPr>
+                <a:t> </a:t>
+              </a:r>
+            </a:p>
+          </p:txBody>
+        </p:sp>
+        <p:pic>
+          <p:nvPicPr>
+            <p:cNvPr id="2056" name="Picture 2055"/>
+            <p:cNvPicPr>
+              <a:picLocks noChangeAspect="1"/>
+            </p:cNvPicPr>
+            <p:nvPr/>
+          </p:nvPicPr>
+          <p:blipFill>
+            <a:blip r:embed="rId8"/>
+            <a:stretch>
+              <a:fillRect/>
+            </a:stretch>
+          </p:blipFill>
+          <p:spPr>
+            <a:xfrm>
+              <a:off x="38007251" y="6580700"/>
+              <a:ext cx="4055745" cy="905300"/>
+            </a:xfrm>
+            <a:prstGeom prst="rect">
+              <a:avLst/>
+            </a:prstGeom>
+          </p:spPr>
+        </p:pic>
+      </p:grpSp>
       <p:pic>
         <p:nvPicPr>
           <p:cNvPr id="4" name="Picture 3"/>
@@ -12534,30 +12330,258 @@
           </a:p>
         </p:txBody>
       </p:sp>
-      <p:pic>
-        <p:nvPicPr>
-          <p:cNvPr id="2" name="Picture 1"/>
-          <p:cNvPicPr>
-            <a:picLocks noChangeAspect="1"/>
-          </p:cNvPicPr>
+      <p:grpSp>
+        <p:nvGrpSpPr>
+          <p:cNvPr id="9" name="Group 8"/>
+          <p:cNvGrpSpPr/>
           <p:nvPr/>
-        </p:nvPicPr>
-        <p:blipFill>
-          <a:blip r:embed="rId12"/>
-          <a:stretch>
-            <a:fillRect/>
-          </a:stretch>
-        </p:blipFill>
-        <p:spPr>
+        </p:nvGrpSpPr>
+        <p:grpSpPr>
           <a:xfrm>
-            <a:off x="38688101" y="15350887"/>
-            <a:ext cx="2984500" cy="6921500"/>
+            <a:off x="37464801" y="6305595"/>
+            <a:ext cx="5196415" cy="7865309"/>
+            <a:chOff x="37541201" y="15185084"/>
+            <a:chExt cx="5196415" cy="7865309"/>
           </a:xfrm>
-          <a:prstGeom prst="rect">
-            <a:avLst/>
-          </a:prstGeom>
-        </p:spPr>
-      </p:pic>
+        </p:grpSpPr>
+        <p:sp>
+          <p:nvSpPr>
+            <p:cNvPr id="52" name="AutoShape 508"/>
+            <p:cNvSpPr>
+              <a:spLocks noChangeArrowheads="1"/>
+            </p:cNvSpPr>
+            <p:nvPr/>
+          </p:nvSpPr>
+          <p:spPr bwMode="auto">
+            <a:xfrm>
+              <a:off x="37541201" y="15185084"/>
+              <a:ext cx="5196415" cy="7865309"/>
+            </a:xfrm>
+            <a:prstGeom prst="roundRect">
+              <a:avLst>
+                <a:gd name="adj" fmla="val 16667"/>
+              </a:avLst>
+            </a:prstGeom>
+            <a:solidFill>
+              <a:schemeClr val="bg1"/>
+            </a:solidFill>
+            <a:ln w="28575">
+              <a:solidFill>
+                <a:schemeClr val="tx1"/>
+              </a:solidFill>
+              <a:round/>
+              <a:headEnd/>
+              <a:tailEnd/>
+            </a:ln>
+            <a:effectLst/>
+            <a:extLst>
+              <a:ext uri="{AF507438-7753-43e0-B8FC-AC1667EBCBE1}">
+                <a14:hiddenEffects xmlns:a14="http://schemas.microsoft.com/office/drawing/2010/main">
+                  <a:effectLst>
+                    <a:outerShdw blurRad="63500" dist="38099" dir="2700000" algn="ctr" rotWithShape="0">
+                      <a:schemeClr val="bg2">
+                        <a:alpha val="74998"/>
+                      </a:schemeClr>
+                    </a:outerShdw>
+                  </a:effectLst>
+                </a14:hiddenEffects>
+              </a:ext>
+            </a:extLst>
+          </p:spPr>
+          <p:txBody>
+            <a:bodyPr wrap="square" anchor="ctr">
+              <a:noAutofit/>
+            </a:bodyPr>
+            <a:lstStyle/>
+            <a:p>
+              <a:pPr algn="ctr" defTabSz="3135313"/>
+              <a:endParaRPr lang="en-US" dirty="0" smtClean="0">
+                <a:latin typeface="+mn-lt"/>
+              </a:endParaRPr>
+            </a:p>
+            <a:p>
+              <a:pPr algn="ctr" defTabSz="3135313"/>
+              <a:endParaRPr lang="en-US" dirty="0">
+                <a:latin typeface="+mn-lt"/>
+              </a:endParaRPr>
+            </a:p>
+            <a:p>
+              <a:pPr algn="ctr" defTabSz="3135313"/>
+              <a:endParaRPr lang="en-US" dirty="0" smtClean="0">
+                <a:latin typeface="+mn-lt"/>
+              </a:endParaRPr>
+            </a:p>
+            <a:p>
+              <a:pPr algn="ctr" defTabSz="3135313"/>
+              <a:endParaRPr lang="en-US" dirty="0">
+                <a:latin typeface="+mn-lt"/>
+              </a:endParaRPr>
+            </a:p>
+            <a:p>
+              <a:pPr algn="ctr" defTabSz="3135313"/>
+              <a:endParaRPr lang="en-US" dirty="0" smtClean="0">
+                <a:latin typeface="+mn-lt"/>
+              </a:endParaRPr>
+            </a:p>
+            <a:p>
+              <a:pPr algn="ctr" defTabSz="3135313"/>
+              <a:endParaRPr lang="en-US" dirty="0" smtClean="0">
+                <a:latin typeface="+mn-lt"/>
+              </a:endParaRPr>
+            </a:p>
+            <a:p>
+              <a:pPr algn="ctr" defTabSz="3135313"/>
+              <a:endParaRPr lang="en-US" dirty="0">
+                <a:latin typeface="+mn-lt"/>
+              </a:endParaRPr>
+            </a:p>
+            <a:p>
+              <a:pPr algn="ctr" defTabSz="3135313"/>
+              <a:endParaRPr lang="en-US" dirty="0">
+                <a:latin typeface="+mn-lt"/>
+              </a:endParaRPr>
+            </a:p>
+            <a:p>
+              <a:pPr algn="ctr" defTabSz="3135313"/>
+              <a:endParaRPr lang="en-US" dirty="0" smtClean="0">
+                <a:latin typeface="+mn-lt"/>
+              </a:endParaRPr>
+            </a:p>
+            <a:p>
+              <a:pPr algn="ctr" defTabSz="3135313"/>
+              <a:endParaRPr lang="en-US" sz="2000" dirty="0" smtClean="0">
+                <a:latin typeface="+mn-lt"/>
+                <a:cs typeface="Arial"/>
+              </a:endParaRPr>
+            </a:p>
+            <a:p>
+              <a:pPr algn="ctr" defTabSz="3135313"/>
+              <a:endParaRPr lang="en-US" sz="2000" dirty="0">
+                <a:latin typeface="+mn-lt"/>
+                <a:cs typeface="Arial"/>
+              </a:endParaRPr>
+            </a:p>
+            <a:p>
+              <a:pPr algn="ctr" defTabSz="3135313"/>
+              <a:endParaRPr lang="en-US" sz="2000" dirty="0" smtClean="0">
+                <a:latin typeface="+mn-lt"/>
+                <a:cs typeface="Arial"/>
+              </a:endParaRPr>
+            </a:p>
+            <a:p>
+              <a:pPr algn="ctr" defTabSz="3135313"/>
+              <a:endParaRPr lang="en-US" sz="2000" dirty="0">
+                <a:latin typeface="+mn-lt"/>
+                <a:cs typeface="Arial"/>
+              </a:endParaRPr>
+            </a:p>
+            <a:p>
+              <a:pPr algn="ctr" defTabSz="3135313"/>
+              <a:endParaRPr lang="en-US" sz="2000" dirty="0" smtClean="0">
+                <a:latin typeface="+mn-lt"/>
+                <a:cs typeface="Arial"/>
+              </a:endParaRPr>
+            </a:p>
+            <a:p>
+              <a:pPr algn="ctr" defTabSz="3135313"/>
+              <a:endParaRPr lang="en-US" sz="2000" dirty="0">
+                <a:latin typeface="+mn-lt"/>
+                <a:cs typeface="Arial"/>
+              </a:endParaRPr>
+            </a:p>
+            <a:p>
+              <a:pPr algn="ctr" defTabSz="3135313"/>
+              <a:endParaRPr lang="en-US" sz="2000" dirty="0" smtClean="0">
+                <a:latin typeface="+mn-lt"/>
+                <a:cs typeface="Arial"/>
+              </a:endParaRPr>
+            </a:p>
+            <a:p>
+              <a:pPr algn="ctr" defTabSz="3135313"/>
+              <a:endParaRPr lang="en-US" sz="2000" dirty="0">
+                <a:latin typeface="+mn-lt"/>
+                <a:cs typeface="Arial"/>
+              </a:endParaRPr>
+            </a:p>
+            <a:p>
+              <a:pPr algn="ctr" defTabSz="3135313"/>
+              <a:endParaRPr lang="en-US" sz="2000" dirty="0" smtClean="0">
+                <a:latin typeface="+mn-lt"/>
+                <a:cs typeface="Arial"/>
+              </a:endParaRPr>
+            </a:p>
+            <a:p>
+              <a:pPr algn="ctr" defTabSz="3135313"/>
+              <a:endParaRPr lang="en-US" sz="1400" dirty="0" smtClean="0">
+                <a:latin typeface="+mn-lt"/>
+                <a:cs typeface="Arial"/>
+              </a:endParaRPr>
+            </a:p>
+            <a:p>
+              <a:pPr algn="ctr" defTabSz="3135313"/>
+              <a:r>
+                <a:rPr lang="en-US" sz="1400" dirty="0" smtClean="0">
+                  <a:latin typeface="+mn-lt"/>
+                  <a:cs typeface="Arial"/>
+                </a:rPr>
+                <a:t>This figure shows the output of the use case workflow. It shows </a:t>
+              </a:r>
+              <a:r>
+                <a:rPr lang="en-US" sz="1400" dirty="0">
+                  <a:latin typeface="+mn-lt"/>
+                  <a:cs typeface="Arial"/>
+                </a:rPr>
+                <a:t>Muon </a:t>
+              </a:r>
+              <a:r>
+                <a:rPr lang="en-US" sz="1400" dirty="0" smtClean="0">
+                  <a:latin typeface="+mn-lt"/>
+                  <a:cs typeface="Arial"/>
+                </a:rPr>
+                <a:t>transverse momentum </a:t>
+              </a:r>
+              <a:r>
+                <a:rPr lang="en-US" sz="1400" dirty="0">
+                  <a:latin typeface="+mn-lt"/>
+                  <a:cs typeface="Arial"/>
+                </a:rPr>
+                <a:t>distributions for di-boson </a:t>
+              </a:r>
+              <a:r>
+                <a:rPr lang="en-US" sz="1400" dirty="0" smtClean="0">
+                  <a:latin typeface="+mn-lt"/>
+                  <a:cs typeface="Arial"/>
+                </a:rPr>
+                <a:t>simulated samples.</a:t>
+              </a:r>
+            </a:p>
+          </p:txBody>
+        </p:sp>
+        <p:pic>
+          <p:nvPicPr>
+            <p:cNvPr id="2" name="Picture 1"/>
+            <p:cNvPicPr>
+              <a:picLocks noChangeAspect="1"/>
+            </p:cNvPicPr>
+            <p:nvPr/>
+          </p:nvPicPr>
+          <p:blipFill>
+            <a:blip r:embed="rId12"/>
+            <a:stretch>
+              <a:fillRect/>
+            </a:stretch>
+          </p:blipFill>
+          <p:spPr>
+            <a:xfrm>
+              <a:off x="38688101" y="15350887"/>
+              <a:ext cx="2984500" cy="6921500"/>
+            </a:xfrm>
+            <a:prstGeom prst="rect">
+              <a:avLst/>
+            </a:prstGeom>
+          </p:spPr>
+        </p:pic>
+      </p:grpSp>
     </p:spTree>
   </p:cSld>
   <p:clrMapOvr>

</xml_diff>

<commit_message>
800 word summary and ready version of poster
</commit_message>
<xml_diff>
--- a/poster/cmsbigdataSCposter.pptx
+++ b/poster/cmsbigdataSCposter.pptx
@@ -141,7 +141,7 @@
   </p:defaultTextStyle>
   <p:extLst>
     <p:ext uri="{EFAFB233-063F-42B5-8137-9DF3F51BA10A}">
-      <p15:sldGuideLst xmlns="" xmlns:p15="http://schemas.microsoft.com/office/powerpoint/2012/main">
+      <p15:sldGuideLst xmlns:p15="http://schemas.microsoft.com/office/powerpoint/2012/main" xmlns="">
         <p15:guide id="1" orient="horz" pos="3552">
           <p15:clr>
             <a:srgbClr val="A4A3A4"/>
@@ -1266,6 +1266,59 @@
 </file>
 
 <file path=ppt/slideLayouts/slideLayout12.xml><?xml version="1.0" encoding="utf-8"?>
+<p:sldLayout xmlns:a="http://schemas.openxmlformats.org/drawingml/2006/main" xmlns:r="http://schemas.openxmlformats.org/officeDocument/2006/relationships" xmlns:p="http://schemas.openxmlformats.org/presentationml/2006/main" preserve="1">
+  <p:cSld name="Custom Layout">
+    <p:spTree>
+      <p:nvGrpSpPr>
+        <p:cNvPr id="1" name=""/>
+        <p:cNvGrpSpPr/>
+        <p:nvPr/>
+      </p:nvGrpSpPr>
+      <p:grpSpPr>
+        <a:xfrm>
+          <a:off x="0" y="0"/>
+          <a:ext cx="0" cy="0"/>
+          <a:chOff x="0" y="0"/>
+          <a:chExt cx="0" cy="0"/>
+        </a:xfrm>
+      </p:grpSpPr>
+      <p:sp>
+        <p:nvSpPr>
+          <p:cNvPr id="2" name="Title 1"/>
+          <p:cNvSpPr>
+            <a:spLocks noGrp="1"/>
+          </p:cNvSpPr>
+          <p:nvPr>
+            <p:ph type="title"/>
+          </p:nvPr>
+        </p:nvSpPr>
+        <p:spPr/>
+        <p:txBody>
+          <a:bodyPr/>
+          <a:lstStyle/>
+          <a:p>
+            <a:r>
+              <a:rPr lang="en-US" smtClean="0"/>
+              <a:t>Click to edit Master title style</a:t>
+            </a:r>
+            <a:endParaRPr lang="en-US"/>
+          </a:p>
+        </p:txBody>
+      </p:sp>
+    </p:spTree>
+    <p:extLst>
+      <p:ext uri="{BB962C8B-B14F-4D97-AF65-F5344CB8AC3E}">
+        <p14:creationId xmlns:p14="http://schemas.microsoft.com/office/powerpoint/2010/main" val="2695109537"/>
+      </p:ext>
+    </p:extLst>
+  </p:cSld>
+  <p:clrMapOvr>
+    <a:masterClrMapping/>
+  </p:clrMapOvr>
+</p:sldLayout>
+</file>
+
+<file path=ppt/slideLayouts/slideLayout13.xml><?xml version="1.0" encoding="utf-8"?>
 <p:sldLayout xmlns:a="http://schemas.openxmlformats.org/drawingml/2006/main" xmlns:r="http://schemas.openxmlformats.org/officeDocument/2006/relationships" xmlns:p="http://schemas.openxmlformats.org/presentationml/2006/main" type="title" preserve="1">
   <p:cSld name="Title Slide">
     <p:spTree>
@@ -1388,7 +1441,7 @@
 </p:sldLayout>
 </file>
 
-<file path=ppt/slideLayouts/slideLayout13.xml><?xml version="1.0" encoding="utf-8"?>
+<file path=ppt/slideLayouts/slideLayout14.xml><?xml version="1.0" encoding="utf-8"?>
 <p:sldLayout xmlns:a="http://schemas.openxmlformats.org/drawingml/2006/main" xmlns:r="http://schemas.openxmlformats.org/officeDocument/2006/relationships" xmlns:p="http://schemas.openxmlformats.org/presentationml/2006/main" type="obj" preserve="1">
   <p:cSld name="Title and Content">
     <p:spTree>
@@ -1493,7 +1546,7 @@
 </p:sldLayout>
 </file>
 
-<file path=ppt/slideLayouts/slideLayout14.xml><?xml version="1.0" encoding="utf-8"?>
+<file path=ppt/slideLayouts/slideLayout15.xml><?xml version="1.0" encoding="utf-8"?>
 <p:sldLayout xmlns:a="http://schemas.openxmlformats.org/drawingml/2006/main" xmlns:r="http://schemas.openxmlformats.org/officeDocument/2006/relationships" xmlns:p="http://schemas.openxmlformats.org/presentationml/2006/main" type="secHead" preserve="1">
   <p:cSld name="Section Header">
     <p:spTree>
@@ -1620,7 +1673,7 @@
 </p:sldLayout>
 </file>
 
-<file path=ppt/slideLayouts/slideLayout15.xml><?xml version="1.0" encoding="utf-8"?>
+<file path=ppt/slideLayouts/slideLayout16.xml><?xml version="1.0" encoding="utf-8"?>
 <p:sldLayout xmlns:a="http://schemas.openxmlformats.org/drawingml/2006/main" xmlns:r="http://schemas.openxmlformats.org/officeDocument/2006/relationships" xmlns:p="http://schemas.openxmlformats.org/presentationml/2006/main" type="twoObj" preserve="1">
   <p:cSld name="Two Content">
     <p:spTree>
@@ -1843,7 +1896,7 @@
 </p:sldLayout>
 </file>
 
-<file path=ppt/slideLayouts/slideLayout16.xml><?xml version="1.0" encoding="utf-8"?>
+<file path=ppt/slideLayouts/slideLayout17.xml><?xml version="1.0" encoding="utf-8"?>
 <p:sldLayout xmlns:a="http://schemas.openxmlformats.org/drawingml/2006/main" xmlns:r="http://schemas.openxmlformats.org/officeDocument/2006/relationships" xmlns:p="http://schemas.openxmlformats.org/presentationml/2006/main" type="twoTxTwoObj" preserve="1">
   <p:cSld name="Comparison">
     <p:spTree>
@@ -2205,7 +2258,7 @@
 </p:sldLayout>
 </file>
 
-<file path=ppt/slideLayouts/slideLayout17.xml><?xml version="1.0" encoding="utf-8"?>
+<file path=ppt/slideLayouts/slideLayout18.xml><?xml version="1.0" encoding="utf-8"?>
 <p:sldLayout xmlns:a="http://schemas.openxmlformats.org/drawingml/2006/main" xmlns:r="http://schemas.openxmlformats.org/officeDocument/2006/relationships" xmlns:p="http://schemas.openxmlformats.org/presentationml/2006/main" type="titleOnly" preserve="1">
   <p:cSld name="Title Only">
     <p:spTree>
@@ -2258,7 +2311,7 @@
 </p:sldLayout>
 </file>
 
-<file path=ppt/slideLayouts/slideLayout18.xml><?xml version="1.0" encoding="utf-8"?>
+<file path=ppt/slideLayouts/slideLayout19.xml><?xml version="1.0" encoding="utf-8"?>
 <p:sldLayout xmlns:a="http://schemas.openxmlformats.org/drawingml/2006/main" xmlns:r="http://schemas.openxmlformats.org/officeDocument/2006/relationships" xmlns:p="http://schemas.openxmlformats.org/presentationml/2006/main" type="blank" preserve="1">
   <p:cSld name="Blank">
     <p:spTree>
@@ -2288,7 +2341,120 @@
 </p:sldLayout>
 </file>
 
-<file path=ppt/slideLayouts/slideLayout19.xml><?xml version="1.0" encoding="utf-8"?>
+<file path=ppt/slideLayouts/slideLayout2.xml><?xml version="1.0" encoding="utf-8"?>
+<p:sldLayout xmlns:a="http://schemas.openxmlformats.org/drawingml/2006/main" xmlns:r="http://schemas.openxmlformats.org/officeDocument/2006/relationships" xmlns:p="http://schemas.openxmlformats.org/presentationml/2006/main" type="obj" preserve="1">
+  <p:cSld name="Title and Content">
+    <p:spTree>
+      <p:nvGrpSpPr>
+        <p:cNvPr id="1" name=""/>
+        <p:cNvGrpSpPr/>
+        <p:nvPr/>
+      </p:nvGrpSpPr>
+      <p:grpSpPr>
+        <a:xfrm>
+          <a:off x="0" y="0"/>
+          <a:ext cx="0" cy="0"/>
+          <a:chOff x="0" y="0"/>
+          <a:chExt cx="0" cy="0"/>
+        </a:xfrm>
+      </p:grpSpPr>
+      <p:sp>
+        <p:nvSpPr>
+          <p:cNvPr id="2" name="Title 1"/>
+          <p:cNvSpPr>
+            <a:spLocks noGrp="1"/>
+          </p:cNvSpPr>
+          <p:nvPr>
+            <p:ph type="title"/>
+          </p:nvPr>
+        </p:nvSpPr>
+        <p:spPr/>
+        <p:txBody>
+          <a:bodyPr/>
+          <a:lstStyle/>
+          <a:p>
+            <a:r>
+              <a:rPr lang="en-US" smtClean="0"/>
+              <a:t>Click to edit Master title style</a:t>
+            </a:r>
+            <a:endParaRPr lang="en-US"/>
+          </a:p>
+        </p:txBody>
+      </p:sp>
+      <p:sp>
+        <p:nvSpPr>
+          <p:cNvPr id="3" name="Content Placeholder 2"/>
+          <p:cNvSpPr>
+            <a:spLocks noGrp="1"/>
+          </p:cNvSpPr>
+          <p:nvPr>
+            <p:ph idx="1"/>
+          </p:nvPr>
+        </p:nvSpPr>
+        <p:spPr>
+          <a:xfrm>
+            <a:off x="693738" y="5638800"/>
+            <a:ext cx="9974262" cy="26563638"/>
+          </a:xfrm>
+          <a:prstGeom prst="rect">
+            <a:avLst/>
+          </a:prstGeom>
+        </p:spPr>
+        <p:txBody>
+          <a:bodyPr/>
+          <a:lstStyle/>
+          <a:p>
+            <a:pPr lvl="0"/>
+            <a:r>
+              <a:rPr lang="en-US" smtClean="0"/>
+              <a:t>Click to edit Master text styles</a:t>
+            </a:r>
+          </a:p>
+          <a:p>
+            <a:pPr lvl="1"/>
+            <a:r>
+              <a:rPr lang="en-US" smtClean="0"/>
+              <a:t>Second level</a:t>
+            </a:r>
+          </a:p>
+          <a:p>
+            <a:pPr lvl="2"/>
+            <a:r>
+              <a:rPr lang="en-US" smtClean="0"/>
+              <a:t>Third level</a:t>
+            </a:r>
+          </a:p>
+          <a:p>
+            <a:pPr lvl="3"/>
+            <a:r>
+              <a:rPr lang="en-US" smtClean="0"/>
+              <a:t>Fourth level</a:t>
+            </a:r>
+          </a:p>
+          <a:p>
+            <a:pPr lvl="4"/>
+            <a:r>
+              <a:rPr lang="en-US" smtClean="0"/>
+              <a:t>Fifth level</a:t>
+            </a:r>
+            <a:endParaRPr lang="en-US"/>
+          </a:p>
+        </p:txBody>
+      </p:sp>
+    </p:spTree>
+    <p:extLst>
+      <p:ext uri="{BB962C8B-B14F-4D97-AF65-F5344CB8AC3E}">
+        <p14:creationId xmlns:p14="http://schemas.microsoft.com/office/powerpoint/2010/main" val="515571683"/>
+      </p:ext>
+    </p:extLst>
+  </p:cSld>
+  <p:clrMapOvr>
+    <a:masterClrMapping/>
+  </p:clrMapOvr>
+</p:sldLayout>
+</file>
+
+<file path=ppt/slideLayouts/slideLayout20.xml><?xml version="1.0" encoding="utf-8"?>
 <p:sldLayout xmlns:a="http://schemas.openxmlformats.org/drawingml/2006/main" xmlns:r="http://schemas.openxmlformats.org/officeDocument/2006/relationships" xmlns:p="http://schemas.openxmlformats.org/presentationml/2006/main" type="objTx" preserve="1">
   <p:cSld name="Content with Caption">
     <p:spTree>
@@ -2500,120 +2666,7 @@
 </p:sldLayout>
 </file>
 
-<file path=ppt/slideLayouts/slideLayout2.xml><?xml version="1.0" encoding="utf-8"?>
-<p:sldLayout xmlns:a="http://schemas.openxmlformats.org/drawingml/2006/main" xmlns:r="http://schemas.openxmlformats.org/officeDocument/2006/relationships" xmlns:p="http://schemas.openxmlformats.org/presentationml/2006/main" type="obj" preserve="1">
-  <p:cSld name="Title and Content">
-    <p:spTree>
-      <p:nvGrpSpPr>
-        <p:cNvPr id="1" name=""/>
-        <p:cNvGrpSpPr/>
-        <p:nvPr/>
-      </p:nvGrpSpPr>
-      <p:grpSpPr>
-        <a:xfrm>
-          <a:off x="0" y="0"/>
-          <a:ext cx="0" cy="0"/>
-          <a:chOff x="0" y="0"/>
-          <a:chExt cx="0" cy="0"/>
-        </a:xfrm>
-      </p:grpSpPr>
-      <p:sp>
-        <p:nvSpPr>
-          <p:cNvPr id="2" name="Title 1"/>
-          <p:cNvSpPr>
-            <a:spLocks noGrp="1"/>
-          </p:cNvSpPr>
-          <p:nvPr>
-            <p:ph type="title"/>
-          </p:nvPr>
-        </p:nvSpPr>
-        <p:spPr/>
-        <p:txBody>
-          <a:bodyPr/>
-          <a:lstStyle/>
-          <a:p>
-            <a:r>
-              <a:rPr lang="en-US" smtClean="0"/>
-              <a:t>Click to edit Master title style</a:t>
-            </a:r>
-            <a:endParaRPr lang="en-US"/>
-          </a:p>
-        </p:txBody>
-      </p:sp>
-      <p:sp>
-        <p:nvSpPr>
-          <p:cNvPr id="3" name="Content Placeholder 2"/>
-          <p:cNvSpPr>
-            <a:spLocks noGrp="1"/>
-          </p:cNvSpPr>
-          <p:nvPr>
-            <p:ph idx="1"/>
-          </p:nvPr>
-        </p:nvSpPr>
-        <p:spPr>
-          <a:xfrm>
-            <a:off x="693738" y="5638800"/>
-            <a:ext cx="9974262" cy="26563638"/>
-          </a:xfrm>
-          <a:prstGeom prst="rect">
-            <a:avLst/>
-          </a:prstGeom>
-        </p:spPr>
-        <p:txBody>
-          <a:bodyPr/>
-          <a:lstStyle/>
-          <a:p>
-            <a:pPr lvl="0"/>
-            <a:r>
-              <a:rPr lang="en-US" smtClean="0"/>
-              <a:t>Click to edit Master text styles</a:t>
-            </a:r>
-          </a:p>
-          <a:p>
-            <a:pPr lvl="1"/>
-            <a:r>
-              <a:rPr lang="en-US" smtClean="0"/>
-              <a:t>Second level</a:t>
-            </a:r>
-          </a:p>
-          <a:p>
-            <a:pPr lvl="2"/>
-            <a:r>
-              <a:rPr lang="en-US" smtClean="0"/>
-              <a:t>Third level</a:t>
-            </a:r>
-          </a:p>
-          <a:p>
-            <a:pPr lvl="3"/>
-            <a:r>
-              <a:rPr lang="en-US" smtClean="0"/>
-              <a:t>Fourth level</a:t>
-            </a:r>
-          </a:p>
-          <a:p>
-            <a:pPr lvl="4"/>
-            <a:r>
-              <a:rPr lang="en-US" smtClean="0"/>
-              <a:t>Fifth level</a:t>
-            </a:r>
-            <a:endParaRPr lang="en-US"/>
-          </a:p>
-        </p:txBody>
-      </p:sp>
-    </p:spTree>
-    <p:extLst>
-      <p:ext uri="{BB962C8B-B14F-4D97-AF65-F5344CB8AC3E}">
-        <p14:creationId xmlns:p14="http://schemas.microsoft.com/office/powerpoint/2010/main" val="515571683"/>
-      </p:ext>
-    </p:extLst>
-  </p:cSld>
-  <p:clrMapOvr>
-    <a:masterClrMapping/>
-  </p:clrMapOvr>
-</p:sldLayout>
-</file>
-
-<file path=ppt/slideLayouts/slideLayout20.xml><?xml version="1.0" encoding="utf-8"?>
+<file path=ppt/slideLayouts/slideLayout21.xml><?xml version="1.0" encoding="utf-8"?>
 <p:sldLayout xmlns:a="http://schemas.openxmlformats.org/drawingml/2006/main" xmlns:r="http://schemas.openxmlformats.org/officeDocument/2006/relationships" xmlns:p="http://schemas.openxmlformats.org/presentationml/2006/main" type="picTx" preserve="1">
   <p:cSld name="Picture with Caption">
     <p:spTree>
@@ -2801,7 +2854,7 @@
 </p:sldLayout>
 </file>
 
-<file path=ppt/slideLayouts/slideLayout21.xml><?xml version="1.0" encoding="utf-8"?>
+<file path=ppt/slideLayouts/slideLayout22.xml><?xml version="1.0" encoding="utf-8"?>
 <p:sldLayout xmlns:a="http://schemas.openxmlformats.org/drawingml/2006/main" xmlns:r="http://schemas.openxmlformats.org/officeDocument/2006/relationships" xmlns:p="http://schemas.openxmlformats.org/presentationml/2006/main" type="vertTx" preserve="1">
   <p:cSld name="Title and Vertical Text">
     <p:spTree>
@@ -2906,7 +2959,7 @@
 </p:sldLayout>
 </file>
 
-<file path=ppt/slideLayouts/slideLayout22.xml><?xml version="1.0" encoding="utf-8"?>
+<file path=ppt/slideLayouts/slideLayout23.xml><?xml version="1.0" encoding="utf-8"?>
 <p:sldLayout xmlns:a="http://schemas.openxmlformats.org/drawingml/2006/main" xmlns:r="http://schemas.openxmlformats.org/officeDocument/2006/relationships" xmlns:p="http://schemas.openxmlformats.org/presentationml/2006/main" type="vertTitleAndTx" preserve="1">
   <p:cSld name="Vertical Title and Text">
     <p:spTree>
@@ -3021,7 +3074,7 @@
 </p:sldLayout>
 </file>
 
-<file path=ppt/slideLayouts/slideLayout23.xml><?xml version="1.0" encoding="utf-8"?>
+<file path=ppt/slideLayouts/slideLayout24.xml><?xml version="1.0" encoding="utf-8"?>
 <p:sldLayout xmlns:a="http://schemas.openxmlformats.org/drawingml/2006/main" xmlns:r="http://schemas.openxmlformats.org/officeDocument/2006/relationships" xmlns:p="http://schemas.openxmlformats.org/presentationml/2006/main" type="title" preserve="1">
   <p:cSld name="Title Slide">
     <p:spTree>
@@ -3144,7 +3197,7 @@
 </p:sldLayout>
 </file>
 
-<file path=ppt/slideLayouts/slideLayout24.xml><?xml version="1.0" encoding="utf-8"?>
+<file path=ppt/slideLayouts/slideLayout25.xml><?xml version="1.0" encoding="utf-8"?>
 <p:sldLayout xmlns:a="http://schemas.openxmlformats.org/drawingml/2006/main" xmlns:r="http://schemas.openxmlformats.org/officeDocument/2006/relationships" xmlns:p="http://schemas.openxmlformats.org/presentationml/2006/main" type="obj" preserve="1">
   <p:cSld name="Title and Content">
     <p:spTree>
@@ -3249,7 +3302,7 @@
 </p:sldLayout>
 </file>
 
-<file path=ppt/slideLayouts/slideLayout25.xml><?xml version="1.0" encoding="utf-8"?>
+<file path=ppt/slideLayouts/slideLayout26.xml><?xml version="1.0" encoding="utf-8"?>
 <p:sldLayout xmlns:a="http://schemas.openxmlformats.org/drawingml/2006/main" xmlns:r="http://schemas.openxmlformats.org/officeDocument/2006/relationships" xmlns:p="http://schemas.openxmlformats.org/presentationml/2006/main" type="secHead" preserve="1">
   <p:cSld name="Section Header">
     <p:spTree>
@@ -3376,7 +3429,7 @@
 </p:sldLayout>
 </file>
 
-<file path=ppt/slideLayouts/slideLayout26.xml><?xml version="1.0" encoding="utf-8"?>
+<file path=ppt/slideLayouts/slideLayout27.xml><?xml version="1.0" encoding="utf-8"?>
 <p:sldLayout xmlns:a="http://schemas.openxmlformats.org/drawingml/2006/main" xmlns:r="http://schemas.openxmlformats.org/officeDocument/2006/relationships" xmlns:p="http://schemas.openxmlformats.org/presentationml/2006/main" type="twoObj" preserve="1">
   <p:cSld name="Two Content">
     <p:spTree>
@@ -3599,7 +3652,7 @@
 </p:sldLayout>
 </file>
 
-<file path=ppt/slideLayouts/slideLayout27.xml><?xml version="1.0" encoding="utf-8"?>
+<file path=ppt/slideLayouts/slideLayout28.xml><?xml version="1.0" encoding="utf-8"?>
 <p:sldLayout xmlns:a="http://schemas.openxmlformats.org/drawingml/2006/main" xmlns:r="http://schemas.openxmlformats.org/officeDocument/2006/relationships" xmlns:p="http://schemas.openxmlformats.org/presentationml/2006/main" type="twoTxTwoObj" preserve="1">
   <p:cSld name="Comparison">
     <p:spTree>
@@ -3961,7 +4014,7 @@
 </p:sldLayout>
 </file>
 
-<file path=ppt/slideLayouts/slideLayout28.xml><?xml version="1.0" encoding="utf-8"?>
+<file path=ppt/slideLayouts/slideLayout29.xml><?xml version="1.0" encoding="utf-8"?>
 <p:sldLayout xmlns:a="http://schemas.openxmlformats.org/drawingml/2006/main" xmlns:r="http://schemas.openxmlformats.org/officeDocument/2006/relationships" xmlns:p="http://schemas.openxmlformats.org/presentationml/2006/main" type="titleOnly" preserve="1">
   <p:cSld name="Title Only">
     <p:spTree>
@@ -4005,36 +4058,6 @@
     <p:extLst>
       <p:ext uri="{BB962C8B-B14F-4D97-AF65-F5344CB8AC3E}">
         <p14:creationId xmlns:p14="http://schemas.microsoft.com/office/powerpoint/2010/main" val="505141871"/>
-      </p:ext>
-    </p:extLst>
-  </p:cSld>
-  <p:clrMapOvr>
-    <a:masterClrMapping/>
-  </p:clrMapOvr>
-</p:sldLayout>
-</file>
-
-<file path=ppt/slideLayouts/slideLayout29.xml><?xml version="1.0" encoding="utf-8"?>
-<p:sldLayout xmlns:a="http://schemas.openxmlformats.org/drawingml/2006/main" xmlns:r="http://schemas.openxmlformats.org/officeDocument/2006/relationships" xmlns:p="http://schemas.openxmlformats.org/presentationml/2006/main" type="blank" preserve="1">
-  <p:cSld name="Blank">
-    <p:spTree>
-      <p:nvGrpSpPr>
-        <p:cNvPr id="1" name=""/>
-        <p:cNvGrpSpPr/>
-        <p:nvPr/>
-      </p:nvGrpSpPr>
-      <p:grpSpPr>
-        <a:xfrm>
-          <a:off x="0" y="0"/>
-          <a:ext cx="0" cy="0"/>
-          <a:chOff x="0" y="0"/>
-          <a:chExt cx="0" cy="0"/>
-        </a:xfrm>
-      </p:grpSpPr>
-    </p:spTree>
-    <p:extLst>
-      <p:ext uri="{BB962C8B-B14F-4D97-AF65-F5344CB8AC3E}">
-        <p14:creationId xmlns:p14="http://schemas.microsoft.com/office/powerpoint/2010/main" val="1835129911"/>
       </p:ext>
     </p:extLst>
   </p:cSld>
@@ -4175,6 +4198,36 @@
 </file>
 
 <file path=ppt/slideLayouts/slideLayout30.xml><?xml version="1.0" encoding="utf-8"?>
+<p:sldLayout xmlns:a="http://schemas.openxmlformats.org/drawingml/2006/main" xmlns:r="http://schemas.openxmlformats.org/officeDocument/2006/relationships" xmlns:p="http://schemas.openxmlformats.org/presentationml/2006/main" type="blank" preserve="1">
+  <p:cSld name="Blank">
+    <p:spTree>
+      <p:nvGrpSpPr>
+        <p:cNvPr id="1" name=""/>
+        <p:cNvGrpSpPr/>
+        <p:nvPr/>
+      </p:nvGrpSpPr>
+      <p:grpSpPr>
+        <a:xfrm>
+          <a:off x="0" y="0"/>
+          <a:ext cx="0" cy="0"/>
+          <a:chOff x="0" y="0"/>
+          <a:chExt cx="0" cy="0"/>
+        </a:xfrm>
+      </p:grpSpPr>
+    </p:spTree>
+    <p:extLst>
+      <p:ext uri="{BB962C8B-B14F-4D97-AF65-F5344CB8AC3E}">
+        <p14:creationId xmlns:p14="http://schemas.microsoft.com/office/powerpoint/2010/main" val="1835129911"/>
+      </p:ext>
+    </p:extLst>
+  </p:cSld>
+  <p:clrMapOvr>
+    <a:masterClrMapping/>
+  </p:clrMapOvr>
+</p:sldLayout>
+</file>
+
+<file path=ppt/slideLayouts/slideLayout31.xml><?xml version="1.0" encoding="utf-8"?>
 <p:sldLayout xmlns:a="http://schemas.openxmlformats.org/drawingml/2006/main" xmlns:r="http://schemas.openxmlformats.org/officeDocument/2006/relationships" xmlns:p="http://schemas.openxmlformats.org/presentationml/2006/main" type="objTx" preserve="1">
   <p:cSld name="Content with Caption">
     <p:spTree>
@@ -4386,7 +4439,7 @@
 </p:sldLayout>
 </file>
 
-<file path=ppt/slideLayouts/slideLayout31.xml><?xml version="1.0" encoding="utf-8"?>
+<file path=ppt/slideLayouts/slideLayout32.xml><?xml version="1.0" encoding="utf-8"?>
 <p:sldLayout xmlns:a="http://schemas.openxmlformats.org/drawingml/2006/main" xmlns:r="http://schemas.openxmlformats.org/officeDocument/2006/relationships" xmlns:p="http://schemas.openxmlformats.org/presentationml/2006/main" type="picTx" preserve="1">
   <p:cSld name="Picture with Caption">
     <p:spTree>
@@ -4574,7 +4627,7 @@
 </p:sldLayout>
 </file>
 
-<file path=ppt/slideLayouts/slideLayout32.xml><?xml version="1.0" encoding="utf-8"?>
+<file path=ppt/slideLayouts/slideLayout33.xml><?xml version="1.0" encoding="utf-8"?>
 <p:sldLayout xmlns:a="http://schemas.openxmlformats.org/drawingml/2006/main" xmlns:r="http://schemas.openxmlformats.org/officeDocument/2006/relationships" xmlns:p="http://schemas.openxmlformats.org/presentationml/2006/main" type="vertTx" preserve="1">
   <p:cSld name="Title and Vertical Text">
     <p:spTree>
@@ -4679,7 +4732,7 @@
 </p:sldLayout>
 </file>
 
-<file path=ppt/slideLayouts/slideLayout33.xml><?xml version="1.0" encoding="utf-8"?>
+<file path=ppt/slideLayouts/slideLayout34.xml><?xml version="1.0" encoding="utf-8"?>
 <p:sldLayout xmlns:a="http://schemas.openxmlformats.org/drawingml/2006/main" xmlns:r="http://schemas.openxmlformats.org/officeDocument/2006/relationships" xmlns:p="http://schemas.openxmlformats.org/presentationml/2006/main" type="vertTitleAndTx" preserve="1">
   <p:cSld name="Vertical Title and Text">
     <p:spTree>
@@ -5898,10 +5951,7 @@
     <p:bg>
       <p:bgPr>
         <a:solidFill>
-          <a:schemeClr val="tx2">
-            <a:lumMod val="60000"/>
-            <a:lumOff val="40000"/>
-          </a:schemeClr>
+          <a:schemeClr val="tx2"/>
         </a:solidFill>
         <a:effectLst/>
       </p:bgPr>
@@ -5920,56 +5970,6 @@
           <a:chExt cx="0" cy="0"/>
         </a:xfrm>
       </p:grpSpPr>
-      <p:sp>
-        <p:nvSpPr>
-          <p:cNvPr id="86052" name="Rectangle 36"/>
-          <p:cNvSpPr>
-            <a:spLocks noChangeArrowheads="1"/>
-          </p:cNvSpPr>
-          <p:nvPr userDrawn="1"/>
-        </p:nvSpPr>
-        <p:spPr bwMode="auto">
-          <a:xfrm>
-            <a:off x="0" y="0"/>
-            <a:ext cx="43891200" cy="4800600"/>
-          </a:xfrm>
-          <a:prstGeom prst="rect">
-            <a:avLst/>
-          </a:prstGeom>
-          <a:solidFill>
-            <a:schemeClr val="accent1"/>
-          </a:solidFill>
-          <a:ln w="9525">
-            <a:solidFill>
-              <a:schemeClr val="tx1"/>
-            </a:solidFill>
-            <a:miter lim="800000"/>
-            <a:headEnd/>
-            <a:tailEnd/>
-          </a:ln>
-          <a:effectLst/>
-          <a:extLst>
-            <a:ext uri="{AF507438-7753-43e0-B8FC-AC1667EBCBE1}">
-              <a14:hiddenEffects xmlns:a14="http://schemas.microsoft.com/office/drawing/2010/main">
-                <a:effectLst>
-                  <a:outerShdw blurRad="63500" dist="38099" dir="2700000" algn="ctr" rotWithShape="0">
-                    <a:schemeClr val="bg2">
-                      <a:alpha val="74998"/>
-                    </a:schemeClr>
-                  </a:outerShdw>
-                </a:effectLst>
-              </a14:hiddenEffects>
-            </a:ext>
-          </a:extLst>
-        </p:spPr>
-        <p:txBody>
-          <a:bodyPr wrap="none" anchor="ctr"/>
-          <a:lstStyle/>
-          <a:p>
-            <a:endParaRPr lang="en-US"/>
-          </a:p>
-        </p:txBody>
-      </p:sp>
       <p:sp>
         <p:nvSpPr>
           <p:cNvPr id="86025" name="Rectangle 9"/>
@@ -6201,7 +6201,7 @@
         </p:nvSpPr>
         <p:spPr bwMode="auto">
           <a:xfrm>
-            <a:off x="960438" y="21294356"/>
+            <a:off x="960438" y="20871032"/>
             <a:ext cx="19867562" cy="10947769"/>
           </a:xfrm>
           <a:prstGeom prst="rect">
@@ -6277,7 +6277,7 @@
         </p:nvSpPr>
         <p:spPr bwMode="auto">
           <a:xfrm>
-            <a:off x="960438" y="10243681"/>
+            <a:off x="960438" y="10012777"/>
             <a:ext cx="19867562" cy="10566914"/>
           </a:xfrm>
           <a:prstGeom prst="rect">
@@ -6315,8 +6315,8 @@
         </p:nvSpPr>
         <p:spPr bwMode="auto">
           <a:xfrm>
-            <a:off x="21508003" y="24014124"/>
-            <a:ext cx="10918004" cy="8228002"/>
+            <a:off x="21437600" y="23744736"/>
+            <a:ext cx="21548725" cy="8074065"/>
           </a:xfrm>
           <a:prstGeom prst="rect">
             <a:avLst/>
@@ -6343,44 +6343,6 @@
           </a:p>
         </p:txBody>
       </p:sp>
-      <p:sp>
-        <p:nvSpPr>
-          <p:cNvPr id="19" name="Rectangle 32"/>
-          <p:cNvSpPr>
-            <a:spLocks noChangeArrowheads="1"/>
-          </p:cNvSpPr>
-          <p:nvPr userDrawn="1"/>
-        </p:nvSpPr>
-        <p:spPr bwMode="auto">
-          <a:xfrm>
-            <a:off x="32743519" y="24014124"/>
-            <a:ext cx="10275651" cy="8228001"/>
-          </a:xfrm>
-          <a:prstGeom prst="rect">
-            <a:avLst/>
-          </a:prstGeom>
-          <a:solidFill>
-            <a:schemeClr val="bg1"/>
-          </a:solidFill>
-          <a:ln w="9525">
-            <a:solidFill>
-              <a:schemeClr val="tx1"/>
-            </a:solidFill>
-            <a:miter lim="800000"/>
-            <a:headEnd/>
-            <a:tailEnd/>
-          </a:ln>
-          <a:effectLst/>
-          <a:extLst/>
-        </p:spPr>
-        <p:txBody>
-          <a:bodyPr wrap="none" anchor="ctr"/>
-          <a:lstStyle/>
-          <a:p>
-            <a:endParaRPr lang="en-US"/>
-          </a:p>
-        </p:txBody>
-      </p:sp>
     </p:spTree>
   </p:cSld>
   <p:clrMap bg1="lt1" tx1="dk1" bg2="lt2" tx2="dk2" accent1="accent1" accent2="accent2" accent3="accent3" accent4="accent4" accent5="accent5" accent6="accent6" hlink="hlink" folHlink="folHlink"/>
@@ -6396,6 +6358,7 @@
     <p:sldLayoutId id="2147483660" r:id="rId9"/>
     <p:sldLayoutId id="2147483661" r:id="rId10"/>
     <p:sldLayoutId id="2147483662" r:id="rId11"/>
+    <p:sldLayoutId id="2147483685" r:id="rId12"/>
   </p:sldLayoutIdLst>
   <p:txStyles>
     <p:titleStyle>
@@ -8735,15 +8698,81 @@
               </a:spcBef>
             </a:pPr>
             <a:r>
+              <a:rPr lang="en-US" sz="8000" b="1" dirty="0" smtClean="0">
+                <a:solidFill>
+                  <a:schemeClr val="bg1"/>
+                </a:solidFill>
+                <a:latin typeface="+mn-lt"/>
+                <a:cs typeface="Arial"/>
+              </a:rPr>
+              <a:t>Big </a:t>
+            </a:r>
+            <a:r>
               <a:rPr lang="en-US" sz="8000" b="1" dirty="0">
-                <a:latin typeface="Arial"/>
-                <a:cs typeface="Arial"/>
-              </a:rPr>
-              <a:t>How Big Data allows particle physicists to concentrate on </a:t>
+                <a:solidFill>
+                  <a:schemeClr val="bg1"/>
+                </a:solidFill>
+                <a:latin typeface="+mn-lt"/>
+                <a:cs typeface="Arial"/>
+              </a:rPr>
+              <a:t>Data </a:t>
             </a:r>
             <a:r>
               <a:rPr lang="en-US" sz="8000" b="1" dirty="0" smtClean="0">
-                <a:latin typeface="Arial"/>
+                <a:solidFill>
+                  <a:schemeClr val="bg1"/>
+                </a:solidFill>
+                <a:latin typeface="+mn-lt"/>
+                <a:cs typeface="Arial"/>
+              </a:rPr>
+              <a:t>helps</a:t>
+            </a:r>
+            <a:r>
+              <a:rPr lang="en-US" sz="8000" b="1" dirty="0" smtClean="0">
+                <a:solidFill>
+                  <a:schemeClr val="bg1"/>
+                </a:solidFill>
+                <a:latin typeface="+mn-lt"/>
+                <a:cs typeface="Arial"/>
+              </a:rPr>
+              <a:t> </a:t>
+            </a:r>
+            <a:r>
+              <a:rPr lang="en-US" sz="8000" b="1" dirty="0">
+                <a:solidFill>
+                  <a:schemeClr val="bg1"/>
+                </a:solidFill>
+                <a:latin typeface="+mn-lt"/>
+                <a:cs typeface="Arial"/>
+              </a:rPr>
+              <a:t>p</a:t>
+            </a:r>
+            <a:r>
+              <a:rPr lang="en-US" sz="8000" b="1" dirty="0" smtClean="0">
+                <a:solidFill>
+                  <a:schemeClr val="bg1"/>
+                </a:solidFill>
+                <a:latin typeface="+mn-lt"/>
+                <a:cs typeface="Arial"/>
+              </a:rPr>
+              <a:t>article </a:t>
+            </a:r>
+            <a:r>
+              <a:rPr lang="en-US" sz="8000" b="1" dirty="0">
+                <a:solidFill>
+                  <a:schemeClr val="bg1"/>
+                </a:solidFill>
+                <a:latin typeface="+mn-lt"/>
+                <a:cs typeface="Arial"/>
+              </a:rPr>
+              <a:t>physicists to concentrate on </a:t>
+            </a:r>
+            <a:r>
+              <a:rPr lang="en-US" sz="8000" b="1" dirty="0" smtClean="0">
+                <a:solidFill>
+                  <a:schemeClr val="bg1"/>
+                </a:solidFill>
+                <a:latin typeface="+mn-lt"/>
                 <a:cs typeface="Arial"/>
               </a:rPr>
               <a:t>science</a:t>
@@ -8757,54 +8786,81 @@
             </a:pPr>
             <a:r>
               <a:rPr lang="en-US" sz="4800" dirty="0" smtClean="0">
+                <a:solidFill>
+                  <a:schemeClr val="bg1"/>
+                </a:solidFill>
                 <a:latin typeface="+mn-lt"/>
               </a:rPr>
               <a:t>Matteo </a:t>
             </a:r>
             <a:r>
               <a:rPr lang="en-US" sz="4800" dirty="0">
+                <a:solidFill>
+                  <a:schemeClr val="bg1"/>
+                </a:solidFill>
                 <a:latin typeface="+mn-lt"/>
               </a:rPr>
               <a:t>Cremonesi(**), Oliver Gutsche(**), Bo </a:t>
             </a:r>
             <a:r>
               <a:rPr lang="en-US" sz="4800" dirty="0" err="1">
+                <a:solidFill>
+                  <a:schemeClr val="bg1"/>
+                </a:solidFill>
                 <a:latin typeface="+mn-lt"/>
               </a:rPr>
               <a:t>Jayatilaka</a:t>
             </a:r>
             <a:r>
               <a:rPr lang="en-US" sz="4800" dirty="0">
+                <a:solidFill>
+                  <a:schemeClr val="bg1"/>
+                </a:solidFill>
                 <a:latin typeface="+mn-lt"/>
               </a:rPr>
               <a:t> (**), Jim </a:t>
             </a:r>
             <a:r>
               <a:rPr lang="en-US" sz="4800" dirty="0" err="1">
+                <a:solidFill>
+                  <a:schemeClr val="bg1"/>
+                </a:solidFill>
                 <a:latin typeface="+mn-lt"/>
               </a:rPr>
               <a:t>Kowalkowski</a:t>
             </a:r>
             <a:r>
               <a:rPr lang="en-US" sz="4800" dirty="0">
+                <a:solidFill>
+                  <a:schemeClr val="bg1"/>
+                </a:solidFill>
                 <a:latin typeface="+mn-lt"/>
               </a:rPr>
               <a:t>(**), Cristina Mantilla</a:t>
             </a:r>
             <a:r>
               <a:rPr lang="en-US" sz="4800" dirty="0" smtClean="0">
+                <a:solidFill>
+                  <a:schemeClr val="bg1"/>
+                </a:solidFill>
                 <a:latin typeface="+mn-lt"/>
               </a:rPr>
               <a:t>(**), Jim </a:t>
             </a:r>
             <a:r>
               <a:rPr lang="en-US" sz="4800" dirty="0" err="1" smtClean="0">
+                <a:solidFill>
+                  <a:schemeClr val="bg1"/>
+                </a:solidFill>
                 <a:latin typeface="+mn-lt"/>
               </a:rPr>
               <a:t>Pivarski</a:t>
             </a:r>
             <a:r>
               <a:rPr lang="en-US" sz="4800" dirty="0" smtClean="0">
+                <a:solidFill>
+                  <a:schemeClr val="bg1"/>
+                </a:solidFill>
                 <a:latin typeface="+mn-lt"/>
               </a:rPr>
               <a:t>(*), </a:t>
@@ -8814,30 +8870,45 @@
             <a:pPr algn="ctr" eaLnBrk="0" hangingPunct="0"/>
             <a:r>
               <a:rPr lang="en-US" sz="4800" u="sng" dirty="0" smtClean="0">
+                <a:solidFill>
+                  <a:schemeClr val="bg1"/>
+                </a:solidFill>
                 <a:latin typeface="+mn-lt"/>
               </a:rPr>
               <a:t>Saba </a:t>
             </a:r>
             <a:r>
               <a:rPr lang="en-US" sz="4800" u="sng" dirty="0" err="1" smtClean="0">
+                <a:solidFill>
+                  <a:schemeClr val="bg1"/>
+                </a:solidFill>
                 <a:latin typeface="+mn-lt"/>
               </a:rPr>
               <a:t>Sehrish</a:t>
             </a:r>
             <a:r>
               <a:rPr lang="en-US" sz="4800" dirty="0" smtClean="0">
+                <a:solidFill>
+                  <a:schemeClr val="bg1"/>
+                </a:solidFill>
                 <a:latin typeface="+mn-lt"/>
               </a:rPr>
               <a:t>(**), Alexey </a:t>
             </a:r>
             <a:r>
               <a:rPr lang="en-US" sz="4800" dirty="0" err="1" smtClean="0">
+                <a:solidFill>
+                  <a:schemeClr val="bg1"/>
+                </a:solidFill>
                 <a:latin typeface="+mn-lt"/>
               </a:rPr>
               <a:t>Svyatkovskiy</a:t>
             </a:r>
             <a:r>
               <a:rPr lang="en-US" sz="4800" dirty="0" smtClean="0">
+                <a:solidFill>
+                  <a:schemeClr val="bg1"/>
+                </a:solidFill>
                 <a:latin typeface="+mn-lt"/>
               </a:rPr>
               <a:t>(*)</a:t>
@@ -8847,23 +8918,44 @@
             <a:pPr algn="ctr" eaLnBrk="0" hangingPunct="0"/>
             <a:r>
               <a:rPr lang="en-US" sz="4800" dirty="0" smtClean="0">
-                <a:latin typeface="+mn-lt"/>
-              </a:rPr>
-              <a:t>(*) Princeton </a:t>
+                <a:solidFill>
+                  <a:schemeClr val="bg1"/>
+                </a:solidFill>
+                <a:latin typeface="+mn-lt"/>
+              </a:rPr>
+              <a:t>(*) </a:t>
+            </a:r>
+            <a:r>
+              <a:rPr lang="en-US" sz="4800" dirty="0" smtClean="0">
+                <a:solidFill>
+                  <a:schemeClr val="bg1"/>
+                </a:solidFill>
+                <a:latin typeface="+mn-lt"/>
+              </a:rPr>
+              <a:t>Princeton University </a:t>
             </a:r>
             <a:r>
               <a:rPr lang="en-US" sz="4800" dirty="0">
+                <a:solidFill>
+                  <a:schemeClr val="bg1"/>
+                </a:solidFill>
                 <a:latin typeface="+mn-lt"/>
               </a:rPr>
               <a:t>(**) </a:t>
             </a:r>
             <a:r>
               <a:rPr lang="en-US" sz="4800" dirty="0" smtClean="0">
+                <a:solidFill>
+                  <a:schemeClr val="bg1"/>
+                </a:solidFill>
                 <a:latin typeface="+mn-lt"/>
               </a:rPr>
               <a:t>Fermilab</a:t>
             </a:r>
             <a:endParaRPr lang="en-US" sz="3600" b="1" dirty="0">
+              <a:solidFill>
+                <a:schemeClr val="bg1"/>
+              </a:solidFill>
               <a:latin typeface="+mn-lt"/>
             </a:endParaRPr>
           </a:p>
@@ -8880,7 +8972,7 @@
         <p:spPr bwMode="auto">
           <a:xfrm>
             <a:off x="962024" y="5232400"/>
-            <a:ext cx="19835071" cy="584582"/>
+            <a:ext cx="19869912" cy="584582"/>
           </a:xfrm>
           <a:prstGeom prst="rect">
             <a:avLst/>
@@ -8955,8 +9047,8 @@
         </p:nvSpPr>
         <p:spPr bwMode="auto">
           <a:xfrm>
-            <a:off x="21432122" y="5219182"/>
-            <a:ext cx="21628815" cy="597799"/>
+            <a:off x="21440588" y="5219182"/>
+            <a:ext cx="21552408" cy="597799"/>
           </a:xfrm>
           <a:prstGeom prst="rect">
             <a:avLst/>
@@ -9023,30 +9115,6 @@
       </p:sp>
       <p:pic>
         <p:nvPicPr>
-          <p:cNvPr id="18" name="image04.png"/>
-          <p:cNvPicPr/>
-          <p:nvPr/>
-        </p:nvPicPr>
-        <p:blipFill>
-          <a:blip r:embed="rId3"/>
-          <a:srcRect/>
-          <a:stretch>
-            <a:fillRect/>
-          </a:stretch>
-        </p:blipFill>
-        <p:spPr>
-          <a:xfrm>
-            <a:off x="14339514" y="22210163"/>
-            <a:ext cx="6219429" cy="9629380"/>
-          </a:xfrm>
-          <a:prstGeom prst="rect">
-            <a:avLst/>
-          </a:prstGeom>
-          <a:ln/>
-        </p:spPr>
-      </p:pic>
-      <p:pic>
-        <p:nvPicPr>
           <p:cNvPr id="6" name="Picture 5" descr="darkmatter_piechart.png"/>
           <p:cNvPicPr>
             <a:picLocks noChangeAspect="1"/>
@@ -9054,7 +9122,7 @@
           <p:nvPr/>
         </p:nvPicPr>
         <p:blipFill>
-          <a:blip r:embed="rId4">
+          <a:blip r:embed="rId3">
             <a:extLst>
               <a:ext uri="{28A0092B-C50C-407E-A947-70E740481C1C}">
                 <a14:useLocalDpi xmlns:a14="http://schemas.microsoft.com/office/drawing/2010/main" val="0"/>
@@ -9085,8 +9153,8 @@
         </p:nvSpPr>
         <p:spPr bwMode="auto">
           <a:xfrm>
-            <a:off x="962024" y="10238250"/>
-            <a:ext cx="19835071" cy="584582"/>
+            <a:off x="962024" y="10035050"/>
+            <a:ext cx="19869912" cy="584582"/>
           </a:xfrm>
           <a:prstGeom prst="rect">
             <a:avLst/>
@@ -9161,8 +9229,8 @@
         </p:nvSpPr>
         <p:spPr bwMode="auto">
           <a:xfrm>
-            <a:off x="962024" y="21303923"/>
-            <a:ext cx="19835071" cy="584582"/>
+            <a:off x="965200" y="20890790"/>
+            <a:ext cx="19869912" cy="584582"/>
           </a:xfrm>
           <a:prstGeom prst="rect">
             <a:avLst/>
@@ -9282,35 +9350,35 @@
             </a:pPr>
             <a:r>
               <a:rPr lang="en-US" b="1" i="1" dirty="0" smtClean="0">
-                <a:latin typeface="Arial"/>
+                <a:latin typeface="+mn-lt"/>
                 <a:cs typeface="Arial"/>
               </a:rPr>
               <a:t>  </a:t>
             </a:r>
             <a:r>
               <a:rPr lang="en-US" b="1" dirty="0" smtClean="0">
-                <a:latin typeface="Arial"/>
+                <a:latin typeface="+mn-lt"/>
                 <a:cs typeface="Arial"/>
               </a:rPr>
               <a:t>Spark</a:t>
             </a:r>
             <a:r>
               <a:rPr lang="en-US" b="1" i="1" dirty="0" smtClean="0">
-                <a:latin typeface="Arial"/>
+                <a:latin typeface="+mn-lt"/>
                 <a:cs typeface="Arial"/>
               </a:rPr>
               <a:t> on </a:t>
             </a:r>
             <a:r>
               <a:rPr lang="en-US" b="1" dirty="0" smtClean="0">
-                <a:latin typeface="Arial"/>
+                <a:latin typeface="+mn-lt"/>
                 <a:cs typeface="Arial"/>
               </a:rPr>
               <a:t>Hadoop</a:t>
             </a:r>
             <a:r>
               <a:rPr lang="en-US" b="1" i="1" dirty="0" smtClean="0">
-                <a:latin typeface="Arial"/>
+                <a:latin typeface="+mn-lt"/>
                 <a:cs typeface="Arial"/>
               </a:rPr>
               <a:t> </a:t>
@@ -9322,123 +9390,96 @@
             </a:pPr>
             <a:r>
               <a:rPr lang="en-US" dirty="0" smtClean="0">
-                <a:latin typeface="Arial"/>
+                <a:latin typeface="+mn-lt"/>
                 <a:cs typeface="Arial"/>
               </a:rPr>
               <a:t>Apache </a:t>
             </a:r>
             <a:r>
               <a:rPr lang="en-US" dirty="0">
-                <a:latin typeface="Arial"/>
+                <a:latin typeface="+mn-lt"/>
                 <a:cs typeface="Arial"/>
               </a:rPr>
               <a:t>Spark on an SGI Hadoop Linux cluster consisting of 6 data nodes and 4 </a:t>
             </a:r>
             <a:r>
               <a:rPr lang="en-US" dirty="0" smtClean="0">
-                <a:latin typeface="Arial"/>
+                <a:latin typeface="+mn-lt"/>
                 <a:cs typeface="Arial"/>
               </a:rPr>
               <a:t>service </a:t>
             </a:r>
             <a:br>
               <a:rPr lang="en-US" dirty="0" smtClean="0">
-                <a:latin typeface="Arial"/>
+                <a:latin typeface="+mn-lt"/>
                 <a:cs typeface="Arial"/>
               </a:rPr>
             </a:br>
             <a:r>
               <a:rPr lang="en-US" dirty="0" smtClean="0">
-                <a:latin typeface="Arial"/>
+                <a:latin typeface="+mn-lt"/>
                 <a:cs typeface="Arial"/>
               </a:rPr>
               <a:t>nodes </a:t>
             </a:r>
             <a:r>
               <a:rPr lang="en-US" dirty="0">
-                <a:latin typeface="Arial"/>
-                <a:cs typeface="Arial"/>
-              </a:rPr>
-              <a:t>all with Intel Xeon CPU E5-2680 v2 @ 2.80GHz, each CPU processor core </a:t>
+                <a:latin typeface="+mn-lt"/>
+                <a:cs typeface="Arial"/>
+              </a:rPr>
+              <a:t>all with Intel Xeon CPU E5-2680 v2 @ 2.80GHz, </a:t>
             </a:r>
             <a:r>
               <a:rPr lang="en-US" dirty="0" smtClean="0">
-                <a:latin typeface="Arial"/>
-                <a:cs typeface="Arial"/>
-              </a:rPr>
-              <a:t>on </a:t>
+                <a:latin typeface="+mn-lt"/>
+                <a:cs typeface="Arial"/>
+              </a:rPr>
+              <a:t>each worker </a:t>
             </a:r>
             <a:r>
               <a:rPr lang="en-US" dirty="0">
-                <a:latin typeface="Arial"/>
-                <a:cs typeface="Arial"/>
-              </a:rPr>
-              <a:t>a </a:t>
-            </a:r>
-            <a:r>
-              <a:rPr lang="en-US" dirty="0" smtClean="0">
-                <a:latin typeface="Arial"/>
-                <a:cs typeface="Arial"/>
-              </a:rPr>
-              <a:t/>
-            </a:r>
-            <a:br>
-              <a:rPr lang="en-US" dirty="0" smtClean="0">
-                <a:latin typeface="Arial"/>
-                <a:cs typeface="Arial"/>
-              </a:rPr>
-            </a:br>
-            <a:r>
-              <a:rPr lang="en-US" dirty="0" smtClean="0">
-                <a:latin typeface="Arial"/>
-                <a:cs typeface="Arial"/>
-              </a:rPr>
-              <a:t>worker </a:t>
-            </a:r>
-            <a:r>
-              <a:rPr lang="en-US" dirty="0">
-                <a:latin typeface="Arial"/>
+                <a:latin typeface="+mn-lt"/>
                 <a:cs typeface="Arial"/>
               </a:rPr>
               <a:t>node having 256 GB of memory. Configure the Hadoop cluster without single </a:t>
             </a:r>
             <a:endParaRPr lang="en-US" dirty="0" smtClean="0">
-              <a:latin typeface="Arial"/>
+              <a:latin typeface="+mn-lt"/>
               <a:cs typeface="Arial"/>
             </a:endParaRPr>
           </a:p>
           <a:p>
             <a:r>
               <a:rPr lang="en-US" dirty="0" smtClean="0">
-                <a:latin typeface="Arial"/>
+                <a:latin typeface="+mn-lt"/>
                 <a:cs typeface="Arial"/>
               </a:rPr>
               <a:t>points </a:t>
             </a:r>
             <a:r>
               <a:rPr lang="en-US" dirty="0">
-                <a:latin typeface="Arial"/>
+                <a:latin typeface="+mn-lt"/>
                 <a:cs typeface="Arial"/>
               </a:rPr>
               <a:t>of failure using two separate machines as </a:t>
             </a:r>
             <a:r>
               <a:rPr lang="en-US" dirty="0" smtClean="0">
-                <a:latin typeface="Arial"/>
+                <a:latin typeface="+mn-lt"/>
                 <a:cs typeface="Arial"/>
               </a:rPr>
               <a:t>name nodes</a:t>
             </a:r>
             <a:r>
               <a:rPr lang="en-US" dirty="0">
-                <a:latin typeface="Arial"/>
+                <a:latin typeface="+mn-lt"/>
                 <a:cs typeface="Arial"/>
               </a:rPr>
               <a:t>. Deploy Spark </a:t>
             </a:r>
             <a:r>
               <a:rPr lang="en-US" dirty="0" smtClean="0">
-                <a:latin typeface="Arial"/>
+                <a:latin typeface="+mn-lt"/>
                 <a:cs typeface="Arial"/>
               </a:rPr>
               <a:t>applications</a:t>
@@ -9447,27 +9488,27 @@
           <a:p>
             <a:r>
               <a:rPr lang="en-US" dirty="0" smtClean="0">
-                <a:latin typeface="Arial"/>
+                <a:latin typeface="+mn-lt"/>
                 <a:cs typeface="Arial"/>
               </a:rPr>
               <a:t>using </a:t>
             </a:r>
             <a:r>
               <a:rPr lang="en-US" dirty="0">
-                <a:latin typeface="Arial"/>
+                <a:latin typeface="+mn-lt"/>
                 <a:cs typeface="Arial"/>
               </a:rPr>
               <a:t>YARN resource manager, store data in HDFS</a:t>
             </a:r>
             <a:r>
               <a:rPr lang="en-US" dirty="0" smtClean="0">
-                <a:latin typeface="Arial"/>
+                <a:latin typeface="+mn-lt"/>
                 <a:cs typeface="Arial"/>
               </a:rPr>
               <a:t>.</a:t>
             </a:r>
             <a:endParaRPr lang="en-US" b="1" i="1" dirty="0" smtClean="0">
-              <a:latin typeface="Arial"/>
+              <a:latin typeface="+mn-lt"/>
               <a:cs typeface="Arial"/>
             </a:endParaRPr>
           </a:p>
@@ -9477,7 +9518,7 @@
                 <a:solidFill>
                   <a:srgbClr val="0070C0"/>
                 </a:solidFill>
-                <a:latin typeface="Arial"/>
+                <a:latin typeface="+mn-lt"/>
                 <a:cs typeface="Arial"/>
               </a:rPr>
               <a:t>Input </a:t>
@@ -9487,76 +9528,76 @@
                 <a:solidFill>
                   <a:srgbClr val="0070C0"/>
                 </a:solidFill>
-                <a:latin typeface="Arial"/>
+                <a:latin typeface="+mn-lt"/>
                 <a:cs typeface="Arial"/>
               </a:rPr>
               <a:t>data: </a:t>
             </a:r>
             <a:r>
               <a:rPr lang="en-US" dirty="0" smtClean="0">
-                <a:latin typeface="Arial"/>
+                <a:latin typeface="+mn-lt"/>
                 <a:cs typeface="Arial"/>
               </a:rPr>
               <a:t>Develop </a:t>
             </a:r>
             <a:r>
               <a:rPr lang="en-US" dirty="0">
-                <a:latin typeface="Arial"/>
+                <a:latin typeface="+mn-lt"/>
                 <a:cs typeface="Arial"/>
               </a:rPr>
               <a:t>a library to </a:t>
             </a:r>
             <a:r>
               <a:rPr lang="en-US" dirty="0" smtClean="0">
-                <a:latin typeface="Arial"/>
+                <a:latin typeface="+mn-lt"/>
                 <a:cs typeface="Arial"/>
               </a:rPr>
               <a:t>convert ROOT </a:t>
             </a:r>
             <a:r>
               <a:rPr lang="en-US" dirty="0" err="1" smtClean="0">
-                <a:latin typeface="Arial"/>
+                <a:latin typeface="+mn-lt"/>
                 <a:cs typeface="Arial"/>
               </a:rPr>
               <a:t>Ttrees</a:t>
             </a:r>
             <a:r>
               <a:rPr lang="en-US" dirty="0" smtClean="0">
-                <a:latin typeface="Arial"/>
+                <a:latin typeface="+mn-lt"/>
                 <a:cs typeface="Arial"/>
               </a:rPr>
               <a:t> (</a:t>
             </a:r>
             <a:r>
               <a:rPr lang="en-US" dirty="0">
-                <a:latin typeface="Arial"/>
+                <a:latin typeface="+mn-lt"/>
                 <a:cs typeface="Arial"/>
               </a:rPr>
               <a:t>the most common format in HEP </a:t>
             </a:r>
             <a:r>
               <a:rPr lang="en-US" dirty="0" smtClean="0">
-                <a:latin typeface="Arial"/>
+                <a:latin typeface="+mn-lt"/>
                 <a:cs typeface="Arial"/>
               </a:rPr>
               <a:t>) </a:t>
             </a:r>
             <a:r>
               <a:rPr lang="en-US" dirty="0">
-                <a:latin typeface="Arial"/>
+                <a:latin typeface="+mn-lt"/>
                 <a:cs typeface="Arial"/>
               </a:rPr>
               <a:t>to Apache Avro row-based format readable by </a:t>
             </a:r>
             <a:r>
               <a:rPr lang="en-US" dirty="0" smtClean="0">
-                <a:latin typeface="Arial"/>
+                <a:latin typeface="+mn-lt"/>
                 <a:cs typeface="Arial"/>
               </a:rPr>
               <a:t>Spark and stored in HDFS</a:t>
             </a:r>
             <a:endParaRPr lang="en-US" dirty="0">
-              <a:latin typeface="Arial"/>
+              <a:latin typeface="+mn-lt"/>
               <a:cs typeface="Arial"/>
             </a:endParaRPr>
           </a:p>
@@ -9566,21 +9607,21 @@
                 <a:solidFill>
                   <a:srgbClr val="0070C0"/>
                 </a:solidFill>
-                <a:latin typeface="Arial"/>
+                <a:latin typeface="+mn-lt"/>
                 <a:cs typeface="Arial"/>
               </a:rPr>
               <a:t>Spark operations and APIs: </a:t>
             </a:r>
             <a:r>
               <a:rPr lang="en-US" dirty="0">
-                <a:latin typeface="Arial"/>
+                <a:latin typeface="+mn-lt"/>
                 <a:cs typeface="Arial"/>
               </a:rPr>
               <a:t>perform skimming and slimming </a:t>
             </a:r>
             <a:r>
               <a:rPr lang="en-US" dirty="0" smtClean="0">
-                <a:latin typeface="Arial"/>
+                <a:latin typeface="+mn-lt"/>
                 <a:cs typeface="Arial"/>
               </a:rPr>
               <a:t>on RDDs</a:t>
@@ -9593,20 +9634,20 @@
             </a:pPr>
             <a:r>
               <a:rPr lang="en-US" dirty="0" smtClean="0">
-                <a:latin typeface="Arial"/>
+                <a:latin typeface="+mn-lt"/>
                 <a:cs typeface="Arial"/>
               </a:rPr>
               <a:t>Use </a:t>
             </a:r>
             <a:r>
               <a:rPr lang="en-US" dirty="0">
-                <a:latin typeface="Arial"/>
+                <a:latin typeface="+mn-lt"/>
                 <a:cs typeface="Arial"/>
               </a:rPr>
               <a:t>Spark’s map, flatMap and filter transformations. </a:t>
             </a:r>
             <a:endParaRPr lang="en-US" dirty="0" smtClean="0">
-              <a:latin typeface="Arial"/>
+              <a:latin typeface="+mn-lt"/>
               <a:cs typeface="Arial"/>
             </a:endParaRPr>
           </a:p>
@@ -9617,77 +9658,77 @@
             </a:pPr>
             <a:r>
               <a:rPr lang="en-US" dirty="0" smtClean="0">
-                <a:latin typeface="Arial"/>
+                <a:latin typeface="+mn-lt"/>
                 <a:cs typeface="Arial"/>
               </a:rPr>
               <a:t>Use </a:t>
             </a:r>
             <a:r>
               <a:rPr lang="en-US" dirty="0">
-                <a:latin typeface="Arial"/>
+                <a:latin typeface="+mn-lt"/>
                 <a:cs typeface="Arial"/>
               </a:rPr>
               <a:t>modern Dataset and </a:t>
             </a:r>
             <a:r>
               <a:rPr lang="en-US" dirty="0" err="1">
-                <a:latin typeface="Arial"/>
+                <a:latin typeface="+mn-lt"/>
                 <a:cs typeface="Arial"/>
               </a:rPr>
               <a:t>Dataframe</a:t>
             </a:r>
             <a:r>
               <a:rPr lang="en-US" dirty="0">
-                <a:latin typeface="Arial"/>
+                <a:latin typeface="+mn-lt"/>
                 <a:cs typeface="Arial"/>
               </a:rPr>
               <a:t> </a:t>
             </a:r>
             <a:r>
               <a:rPr lang="en-US" dirty="0" smtClean="0">
-                <a:latin typeface="Arial"/>
+                <a:latin typeface="+mn-lt"/>
                 <a:cs typeface="Arial"/>
               </a:rPr>
               <a:t>APIs </a:t>
             </a:r>
             <a:r>
               <a:rPr lang="en-US" dirty="0">
-                <a:latin typeface="Arial"/>
+                <a:latin typeface="+mn-lt"/>
                 <a:cs typeface="Arial"/>
               </a:rPr>
               <a:t>taking </a:t>
             </a:r>
             <a:r>
               <a:rPr lang="en-US" dirty="0" smtClean="0">
-                <a:latin typeface="Arial"/>
+                <a:latin typeface="+mn-lt"/>
                 <a:cs typeface="Arial"/>
               </a:rPr>
               <a:t>advantage </a:t>
             </a:r>
             <a:r>
               <a:rPr lang="en-US" dirty="0">
-                <a:latin typeface="Arial"/>
+                <a:latin typeface="+mn-lt"/>
                 <a:cs typeface="Arial"/>
               </a:rPr>
               <a:t>of advanced Catalyst query optimizer and direct operations on </a:t>
             </a:r>
             <a:r>
               <a:rPr lang="en-US" dirty="0" smtClean="0">
-                <a:latin typeface="Arial"/>
+                <a:latin typeface="+mn-lt"/>
                 <a:cs typeface="Arial"/>
               </a:rPr>
               <a:t>serialized </a:t>
             </a:r>
             <a:r>
               <a:rPr lang="en-US" dirty="0">
-                <a:latin typeface="Arial"/>
+                <a:latin typeface="+mn-lt"/>
                 <a:cs typeface="Arial"/>
               </a:rPr>
               <a:t>data, available in Spark </a:t>
             </a:r>
             <a:r>
               <a:rPr lang="en-US" dirty="0" smtClean="0">
-                <a:latin typeface="Arial"/>
+                <a:latin typeface="+mn-lt"/>
                 <a:cs typeface="Arial"/>
               </a:rPr>
               <a:t>2.0.</a:t>
@@ -9700,42 +9741,42 @@
             </a:pPr>
             <a:r>
               <a:rPr lang="en-US" dirty="0" smtClean="0">
-                <a:latin typeface="Arial"/>
+                <a:latin typeface="+mn-lt"/>
                 <a:cs typeface="Arial"/>
               </a:rPr>
               <a:t>Use </a:t>
             </a:r>
             <a:r>
               <a:rPr lang="en-US" dirty="0">
-                <a:latin typeface="Arial"/>
+                <a:latin typeface="+mn-lt"/>
                 <a:cs typeface="Arial"/>
               </a:rPr>
               <a:t>Apache Parquet columnar format to store </a:t>
             </a:r>
             <a:r>
               <a:rPr lang="en-US" dirty="0" smtClean="0">
-                <a:latin typeface="Arial"/>
+                <a:latin typeface="+mn-lt"/>
                 <a:cs typeface="Arial"/>
               </a:rPr>
               <a:t>intermediate </a:t>
             </a:r>
             <a:r>
               <a:rPr lang="en-US" dirty="0">
-                <a:latin typeface="Arial"/>
+                <a:latin typeface="+mn-lt"/>
                 <a:cs typeface="Arial"/>
               </a:rPr>
               <a:t>results between stages of the calculation in HDFS, allowing to easily ingest </a:t>
             </a:r>
             <a:r>
               <a:rPr lang="en-US" dirty="0" smtClean="0">
-                <a:latin typeface="Arial"/>
+                <a:latin typeface="+mn-lt"/>
                 <a:cs typeface="Arial"/>
               </a:rPr>
               <a:t>data </a:t>
             </a:r>
             <a:r>
               <a:rPr lang="en-US" dirty="0">
-                <a:latin typeface="Arial"/>
+                <a:latin typeface="+mn-lt"/>
                 <a:cs typeface="Arial"/>
               </a:rPr>
               <a:t>into Dataframes and Datasets  </a:t>
@@ -9747,7 +9788,7 @@
                 <a:solidFill>
                   <a:srgbClr val="0070C0"/>
                 </a:solidFill>
-                <a:latin typeface="Arial"/>
+                <a:latin typeface="+mn-lt"/>
                 <a:cs typeface="Arial"/>
               </a:rPr>
               <a:t>Statistical analysis and plotting</a:t>
@@ -9757,20 +9798,20 @@
                 <a:solidFill>
                   <a:srgbClr val="0070C0"/>
                 </a:solidFill>
-                <a:latin typeface="Arial"/>
+                <a:latin typeface="+mn-lt"/>
                 <a:cs typeface="Arial"/>
               </a:rPr>
               <a:t>: </a:t>
             </a:r>
             <a:r>
               <a:rPr lang="en-US" dirty="0" smtClean="0">
-                <a:latin typeface="Arial"/>
+                <a:latin typeface="+mn-lt"/>
                 <a:cs typeface="Arial"/>
               </a:rPr>
               <a:t>Use the distributed histogrammar package</a:t>
             </a:r>
             <a:endParaRPr lang="en-US" dirty="0">
-              <a:latin typeface="Arial"/>
+              <a:latin typeface="+mn-lt"/>
               <a:cs typeface="Arial"/>
             </a:endParaRPr>
           </a:p>
@@ -9912,13 +9953,7 @@
               <a:rPr lang="en-US" dirty="0" smtClean="0">
                 <a:latin typeface="+mn-lt"/>
               </a:rPr>
-              <a:t>) </a:t>
-            </a:r>
-            <a:r>
-              <a:rPr lang="en-US" dirty="0" smtClean="0">
-                <a:latin typeface="+mn-lt"/>
-              </a:rPr>
-              <a:t>to the HDF5 format. </a:t>
+              <a:t>) to the HDF5 format. </a:t>
             </a:r>
           </a:p>
           <a:p>
@@ -9930,71 +9965,38 @@
               <a:rPr lang="en-US" dirty="0" smtClean="0">
                 <a:latin typeface="+mn-lt"/>
               </a:rPr>
-              <a:t>One HDF5 group per </a:t>
+              <a:t>One HDF5 group per particle type e.g. Tau, electron, </a:t>
+            </a:r>
+            <a:r>
+              <a:rPr lang="en-US" dirty="0" err="1" smtClean="0">
+                <a:latin typeface="+mn-lt"/>
+              </a:rPr>
+              <a:t>Muon</a:t>
+            </a:r>
+            <a:r>
+              <a:rPr lang="en-US" dirty="0">
+                <a:latin typeface="+mn-lt"/>
+              </a:rPr>
+              <a:t> </a:t>
             </a:r>
             <a:r>
               <a:rPr lang="en-US" dirty="0" smtClean="0">
                 <a:latin typeface="+mn-lt"/>
               </a:rPr>
-              <a:t>particle </a:t>
+              <a:t>(ROOT </a:t>
+            </a:r>
+            <a:r>
+              <a:rPr lang="en-US" dirty="0" err="1" smtClean="0">
+                <a:latin typeface="+mn-lt"/>
+              </a:rPr>
+              <a:t>TBranch</a:t>
             </a:r>
             <a:r>
               <a:rPr lang="en-US" dirty="0" smtClean="0">
                 <a:latin typeface="+mn-lt"/>
               </a:rPr>
-              <a:t>type </a:t>
-            </a:r>
-            <a:r>
-              <a:rPr lang="en-US" dirty="0" smtClean="0">
-                <a:latin typeface="+mn-lt"/>
-              </a:rPr>
-              <a:t>e.g. </a:t>
-            </a:r>
-            <a:r>
-              <a:rPr lang="en-US" dirty="0" smtClean="0">
-                <a:latin typeface="+mn-lt"/>
-              </a:rPr>
-              <a:t>Tau</a:t>
-            </a:r>
-            <a:r>
-              <a:rPr lang="en-US" dirty="0" smtClean="0">
-                <a:latin typeface="+mn-lt"/>
-              </a:rPr>
-              <a:t>, electron, </a:t>
-            </a:r>
-            <a:r>
-              <a:rPr lang="en-US" dirty="0" err="1" smtClean="0">
-                <a:latin typeface="+mn-lt"/>
-              </a:rPr>
-              <a:t>Muon</a:t>
-            </a:r>
-            <a:r>
-              <a:rPr lang="en-US" dirty="0">
-                <a:latin typeface="+mn-lt"/>
-              </a:rPr>
-              <a:t> </a:t>
-            </a:r>
-            <a:r>
-              <a:rPr lang="en-US" dirty="0" smtClean="0">
-                <a:latin typeface="+mn-lt"/>
-              </a:rPr>
-              <a:t>(ROOT </a:t>
-            </a:r>
-            <a:r>
-              <a:rPr lang="en-US" dirty="0" err="1" smtClean="0">
-                <a:latin typeface="+mn-lt"/>
-              </a:rPr>
-              <a:t>TBranch</a:t>
-            </a:r>
-            <a:r>
-              <a:rPr lang="en-US" dirty="0" smtClean="0">
-                <a:latin typeface="+mn-lt"/>
-              </a:rPr>
               <a:t>)</a:t>
             </a:r>
-            <a:endParaRPr lang="en-US" dirty="0" smtClean="0">
-              <a:latin typeface="+mn-lt"/>
-            </a:endParaRPr>
           </a:p>
           <a:p>
             <a:pPr marL="914400" lvl="1" indent="-457200" defTabSz="3135313">
@@ -10005,59 +10007,38 @@
               <a:rPr lang="en-US" dirty="0" smtClean="0">
                 <a:latin typeface="+mn-lt"/>
               </a:rPr>
-              <a:t>One HDF5 dataset per </a:t>
+              <a:t>One HDF5 dataset per particle property in each group e.g. phi, </a:t>
+            </a:r>
+            <a:r>
+              <a:rPr lang="en-US" dirty="0" err="1" smtClean="0">
+                <a:latin typeface="+mn-lt"/>
+              </a:rPr>
+              <a:t>pt</a:t>
+            </a:r>
+            <a:r>
+              <a:rPr lang="en-US" dirty="0">
+                <a:latin typeface="+mn-lt"/>
+              </a:rPr>
+              <a:t> </a:t>
             </a:r>
             <a:r>
               <a:rPr lang="en-US" dirty="0" smtClean="0">
                 <a:latin typeface="+mn-lt"/>
               </a:rPr>
-              <a:t>particle </a:t>
+              <a:t>(ROOT </a:t>
+            </a:r>
+            <a:r>
+              <a:rPr lang="en-US" dirty="0" err="1" smtClean="0">
+                <a:latin typeface="+mn-lt"/>
+              </a:rPr>
+              <a:t>TLeaf</a:t>
             </a:r>
             <a:r>
               <a:rPr lang="en-US" dirty="0" smtClean="0">
                 <a:latin typeface="+mn-lt"/>
               </a:rPr>
-              <a:t>property in each group </a:t>
-            </a:r>
-            <a:r>
-              <a:rPr lang="en-US" dirty="0" smtClean="0">
-                <a:latin typeface="+mn-lt"/>
-              </a:rPr>
-              <a:t>e.g. phi, </a:t>
-            </a:r>
-            <a:r>
-              <a:rPr lang="en-US" dirty="0" err="1" smtClean="0">
-                <a:latin typeface="+mn-lt"/>
-              </a:rPr>
-              <a:t>pt</a:t>
-            </a:r>
-            <a:r>
-              <a:rPr lang="en-US" dirty="0">
-                <a:latin typeface="+mn-lt"/>
-              </a:rPr>
-              <a:t> </a:t>
-            </a:r>
-            <a:r>
-              <a:rPr lang="en-US" dirty="0" smtClean="0">
-                <a:latin typeface="+mn-lt"/>
-              </a:rPr>
-              <a:t>(ROOT </a:t>
-            </a:r>
-            <a:r>
-              <a:rPr lang="en-US" dirty="0" err="1" smtClean="0">
-                <a:latin typeface="+mn-lt"/>
-              </a:rPr>
-              <a:t>TLeaf</a:t>
-            </a:r>
-            <a:r>
-              <a:rPr lang="en-US" dirty="0" smtClean="0">
-                <a:latin typeface="+mn-lt"/>
-              </a:rPr>
               <a:t>)</a:t>
             </a:r>
-            <a:endParaRPr lang="en-US" dirty="0" smtClean="0">
-              <a:latin typeface="+mn-lt"/>
-            </a:endParaRPr>
           </a:p>
           <a:p>
             <a:pPr marL="914400" lvl="1" indent="-457200" defTabSz="3135313">
@@ -10086,25 +10067,7 @@
               <a:rPr lang="en-US" dirty="0" smtClean="0">
                 <a:latin typeface="+mn-lt"/>
               </a:rPr>
-              <a:t>Custom HDF5 reader to read in a </a:t>
-            </a:r>
-            <a:r>
-              <a:rPr lang="en-US" dirty="0" smtClean="0">
-                <a:latin typeface="+mn-lt"/>
-              </a:rPr>
-              <a:t>HDF5 group </a:t>
-            </a:r>
-            <a:r>
-              <a:rPr lang="en-US" dirty="0" smtClean="0">
-                <a:latin typeface="+mn-lt"/>
-              </a:rPr>
-              <a:t>with several 1D datasets into </a:t>
-            </a:r>
-            <a:r>
-              <a:rPr lang="en-US" dirty="0" smtClean="0">
-                <a:latin typeface="+mn-lt"/>
-              </a:rPr>
-              <a:t>Spark </a:t>
+              <a:t>Custom HDF5 reader to read in a HDF5 group with several 1D datasets into Spark </a:t>
             </a:r>
             <a:r>
               <a:rPr lang="en-US" dirty="0" err="1" smtClean="0">
@@ -10254,358 +10217,6 @@
               </a:rPr>
               <a:t> package. </a:t>
             </a:r>
-          </a:p>
-        </p:txBody>
-      </p:sp>
-      <p:sp>
-        <p:nvSpPr>
-          <p:cNvPr id="30" name="Text Box 405"/>
-          <p:cNvSpPr txBox="1">
-            <a:spLocks noChangeArrowheads="1"/>
-          </p:cNvSpPr>
-          <p:nvPr/>
-        </p:nvSpPr>
-        <p:spPr bwMode="auto">
-          <a:xfrm>
-            <a:off x="21513800" y="24016684"/>
-            <a:ext cx="10921999" cy="584582"/>
-          </a:xfrm>
-          <a:prstGeom prst="rect">
-            <a:avLst/>
-          </a:prstGeom>
-          <a:solidFill>
-            <a:schemeClr val="accent2"/>
-          </a:solidFill>
-          <a:ln>
-            <a:noFill/>
-          </a:ln>
-          <a:effectLst/>
-          <a:extLst>
-            <a:ext uri="{91240B29-F687-4f45-9708-019B960494DF}">
-              <a14:hiddenLine xmlns:a14="http://schemas.microsoft.com/office/drawing/2010/main" w="9525">
-                <a:solidFill>
-                  <a:schemeClr val="tx1"/>
-                </a:solidFill>
-                <a:miter lim="800000"/>
-                <a:headEnd/>
-                <a:tailEnd/>
-              </a14:hiddenLine>
-            </a:ext>
-            <a:ext uri="{AF507438-7753-43e0-B8FC-AC1667EBCBE1}">
-              <a14:hiddenEffects xmlns:a14="http://schemas.microsoft.com/office/drawing/2010/main">
-                <a:effectLst>
-                  <a:outerShdw blurRad="63500" dist="38099" dir="2700000" algn="ctr" rotWithShape="0">
-                    <a:schemeClr val="bg2">
-                      <a:alpha val="74998"/>
-                    </a:schemeClr>
-                  </a:outerShdw>
-                </a:effectLst>
-              </a14:hiddenEffects>
-            </a:ext>
-          </a:extLst>
-        </p:spPr>
-        <p:txBody>
-          <a:bodyPr wrap="square" lIns="91267" tIns="45624" rIns="91267" bIns="45624">
-            <a:spAutoFit/>
-          </a:bodyPr>
-          <a:lstStyle/>
-          <a:p>
-            <a:pPr algn="ctr" eaLnBrk="0" hangingPunct="0">
-              <a:spcBef>
-                <a:spcPct val="50000"/>
-              </a:spcBef>
-            </a:pPr>
-            <a:r>
-              <a:rPr lang="en-US" sz="3200" b="1" dirty="0" smtClean="0">
-                <a:solidFill>
-                  <a:srgbClr val="F8F8F8"/>
-                </a:solidFill>
-                <a:latin typeface="+mn-lt"/>
-              </a:rPr>
-              <a:t>Results </a:t>
-            </a:r>
-            <a:endParaRPr lang="en-US" sz="3200" b="1" dirty="0">
-              <a:solidFill>
-                <a:srgbClr val="F8F8F8"/>
-              </a:solidFill>
-              <a:latin typeface="+mn-lt"/>
-            </a:endParaRPr>
-          </a:p>
-        </p:txBody>
-      </p:sp>
-      <p:sp>
-        <p:nvSpPr>
-          <p:cNvPr id="31" name="Text Box 405"/>
-          <p:cNvSpPr txBox="1">
-            <a:spLocks noChangeArrowheads="1"/>
-          </p:cNvSpPr>
-          <p:nvPr/>
-        </p:nvSpPr>
-        <p:spPr bwMode="auto">
-          <a:xfrm>
-            <a:off x="32749068" y="24016684"/>
-            <a:ext cx="10244665" cy="584582"/>
-          </a:xfrm>
-          <a:prstGeom prst="rect">
-            <a:avLst/>
-          </a:prstGeom>
-          <a:solidFill>
-            <a:schemeClr val="accent2"/>
-          </a:solidFill>
-          <a:ln>
-            <a:noFill/>
-          </a:ln>
-          <a:effectLst/>
-          <a:extLst>
-            <a:ext uri="{91240B29-F687-4f45-9708-019B960494DF}">
-              <a14:hiddenLine xmlns:a14="http://schemas.microsoft.com/office/drawing/2010/main" w="9525">
-                <a:solidFill>
-                  <a:schemeClr val="tx1"/>
-                </a:solidFill>
-                <a:miter lim="800000"/>
-                <a:headEnd/>
-                <a:tailEnd/>
-              </a14:hiddenLine>
-            </a:ext>
-            <a:ext uri="{AF507438-7753-43e0-B8FC-AC1667EBCBE1}">
-              <a14:hiddenEffects xmlns:a14="http://schemas.microsoft.com/office/drawing/2010/main">
-                <a:effectLst>
-                  <a:outerShdw blurRad="63500" dist="38099" dir="2700000" algn="ctr" rotWithShape="0">
-                    <a:schemeClr val="bg2">
-                      <a:alpha val="74998"/>
-                    </a:schemeClr>
-                  </a:outerShdw>
-                </a:effectLst>
-              </a14:hiddenEffects>
-            </a:ext>
-          </a:extLst>
-        </p:spPr>
-        <p:txBody>
-          <a:bodyPr wrap="square" lIns="91267" tIns="45624" rIns="91267" bIns="45624">
-            <a:spAutoFit/>
-          </a:bodyPr>
-          <a:lstStyle/>
-          <a:p>
-            <a:pPr algn="ctr" eaLnBrk="0" hangingPunct="0">
-              <a:spcBef>
-                <a:spcPct val="50000"/>
-              </a:spcBef>
-            </a:pPr>
-            <a:r>
-              <a:rPr lang="en-US" sz="3200" b="1" dirty="0" smtClean="0">
-                <a:solidFill>
-                  <a:srgbClr val="F8F8F8"/>
-                </a:solidFill>
-                <a:latin typeface="+mn-lt"/>
-              </a:rPr>
-              <a:t>Conclusion and Future Work</a:t>
-            </a:r>
-            <a:endParaRPr lang="en-US" sz="3200" b="1" dirty="0">
-              <a:solidFill>
-                <a:srgbClr val="F8F8F8"/>
-              </a:solidFill>
-              <a:latin typeface="+mn-lt"/>
-            </a:endParaRPr>
-          </a:p>
-        </p:txBody>
-      </p:sp>
-      <p:sp>
-        <p:nvSpPr>
-          <p:cNvPr id="32" name="AutoShape 508"/>
-          <p:cNvSpPr>
-            <a:spLocks noChangeArrowheads="1"/>
-          </p:cNvSpPr>
-          <p:nvPr/>
-        </p:nvSpPr>
-        <p:spPr bwMode="auto">
-          <a:xfrm>
-            <a:off x="21855954" y="24719182"/>
-            <a:ext cx="10164979" cy="7425226"/>
-          </a:xfrm>
-          <a:prstGeom prst="roundRect">
-            <a:avLst>
-              <a:gd name="adj" fmla="val 16667"/>
-            </a:avLst>
-          </a:prstGeom>
-          <a:solidFill>
-            <a:schemeClr val="bg1"/>
-          </a:solidFill>
-          <a:ln w="28575">
-            <a:solidFill>
-              <a:schemeClr val="tx1"/>
-            </a:solidFill>
-            <a:round/>
-            <a:headEnd/>
-            <a:tailEnd/>
-          </a:ln>
-          <a:effectLst/>
-          <a:extLst>
-            <a:ext uri="{AF507438-7753-43e0-B8FC-AC1667EBCBE1}">
-              <a14:hiddenEffects xmlns:a14="http://schemas.microsoft.com/office/drawing/2010/main">
-                <a:effectLst>
-                  <a:outerShdw blurRad="63500" dist="38099" dir="2700000" algn="ctr" rotWithShape="0">
-                    <a:schemeClr val="bg2">
-                      <a:alpha val="74998"/>
-                    </a:schemeClr>
-                  </a:outerShdw>
-                </a:effectLst>
-              </a14:hiddenEffects>
-            </a:ext>
-          </a:extLst>
-        </p:spPr>
-        <p:txBody>
-          <a:bodyPr wrap="square" anchor="ctr">
-            <a:normAutofit/>
-          </a:bodyPr>
-          <a:lstStyle/>
-          <a:p>
-            <a:pPr defTabSz="3135313"/>
-            <a:r>
-              <a:rPr lang="en-US" b="1" dirty="0" smtClean="0">
-                <a:latin typeface="Arial"/>
-                <a:cs typeface="Arial"/>
-              </a:rPr>
-              <a:t>Performance </a:t>
-            </a:r>
-            <a:r>
-              <a:rPr lang="en-US" b="1" dirty="0" smtClean="0">
-                <a:latin typeface="Arial"/>
-                <a:cs typeface="Arial"/>
-              </a:rPr>
-              <a:t>at NERSC </a:t>
-            </a:r>
-            <a:r>
-              <a:rPr lang="en-US" dirty="0" smtClean="0">
-                <a:latin typeface="Arial"/>
-                <a:cs typeface="Arial"/>
-              </a:rPr>
-              <a:t>using 140 cores, and total of 46 GB compressed data in 78 HDF5 files</a:t>
-            </a:r>
-          </a:p>
-          <a:p>
-            <a:pPr marL="457200" indent="-457200" defTabSz="3135313">
-              <a:buFont typeface="Wingdings" charset="2"/>
-              <a:buChar char="Ø"/>
-            </a:pPr>
-            <a:r>
-              <a:rPr lang="en-US" dirty="0" smtClean="0">
-                <a:latin typeface="Arial"/>
-                <a:cs typeface="Arial"/>
-              </a:rPr>
-              <a:t>Count </a:t>
-            </a:r>
-            <a:r>
-              <a:rPr lang="en-US" dirty="0">
-                <a:latin typeface="Arial"/>
-                <a:cs typeface="Arial"/>
-              </a:rPr>
-              <a:t>the number of events =&gt; ~</a:t>
-            </a:r>
-            <a:r>
-              <a:rPr lang="en-US" dirty="0" smtClean="0">
-                <a:latin typeface="Arial"/>
-                <a:cs typeface="Arial"/>
-              </a:rPr>
-              <a:t>1sec, 37 million events</a:t>
-            </a:r>
-          </a:p>
-          <a:p>
-            <a:pPr marL="457200" indent="-457200" defTabSz="3135313">
-              <a:buFont typeface="Wingdings" charset="2"/>
-              <a:buChar char="Ø"/>
-            </a:pPr>
-            <a:r>
-              <a:rPr lang="en-US" dirty="0" smtClean="0">
-                <a:latin typeface="Arial"/>
-                <a:cs typeface="Arial"/>
-              </a:rPr>
-              <a:t>Sum of weights for 37 million events =&gt; 2 sec </a:t>
-            </a:r>
-          </a:p>
-          <a:p>
-            <a:pPr marL="457200" indent="-457200" defTabSz="3135313">
-              <a:buFont typeface="Wingdings" charset="2"/>
-              <a:buChar char="Ø"/>
-            </a:pPr>
-            <a:r>
-              <a:rPr lang="en-US" dirty="0" smtClean="0">
-                <a:latin typeface="Arial"/>
-                <a:cs typeface="Arial"/>
-              </a:rPr>
-              <a:t>Creating and saving files after filtering/cuts =&gt; 1-6 min</a:t>
-            </a:r>
-          </a:p>
-          <a:p>
-            <a:pPr defTabSz="3135313"/>
-            <a:r>
-              <a:rPr lang="en-US" dirty="0" smtClean="0">
-                <a:latin typeface="Arial"/>
-                <a:cs typeface="Arial"/>
-              </a:rPr>
-              <a:t>Similar test was repeated with one uncompressed file with the same data, total 86 GB, initial reading and caching time is twice </a:t>
-            </a:r>
-            <a:r>
-              <a:rPr lang="en-US" dirty="0" smtClean="0">
-                <a:latin typeface="Arial"/>
-                <a:cs typeface="Arial"/>
-              </a:rPr>
-              <a:t>as long. The </a:t>
-            </a:r>
-            <a:r>
-              <a:rPr lang="en-US" dirty="0" smtClean="0">
-                <a:latin typeface="Arial"/>
-                <a:cs typeface="Arial"/>
-              </a:rPr>
-              <a:t>rest of the tests have comparable outcome. </a:t>
-            </a:r>
-          </a:p>
-          <a:p>
-            <a:pPr defTabSz="3135313"/>
-            <a:r>
-              <a:rPr lang="en-US" b="1" dirty="0" smtClean="0">
-                <a:latin typeface="Arial"/>
-                <a:cs typeface="Arial"/>
-              </a:rPr>
-              <a:t>Performance at Princeton BD cluster</a:t>
-            </a:r>
-            <a:r>
-              <a:rPr lang="en-US" dirty="0" smtClean="0">
-                <a:latin typeface="Arial"/>
-                <a:cs typeface="Arial"/>
-              </a:rPr>
-              <a:t> using 140 cores: </a:t>
-            </a:r>
-          </a:p>
-          <a:p>
-            <a:pPr marL="457200" indent="-457200" defTabSz="3135313">
-              <a:buFont typeface="Wingdings" charset="2"/>
-              <a:buChar char="Ø"/>
-            </a:pPr>
-            <a:r>
-              <a:rPr lang="en-US" dirty="0" smtClean="0">
-                <a:latin typeface="Arial"/>
-                <a:cs typeface="Arial"/>
-              </a:rPr>
-              <a:t>Sum </a:t>
-            </a:r>
-            <a:r>
-              <a:rPr lang="en-US" dirty="0">
-                <a:latin typeface="Arial"/>
-                <a:cs typeface="Arial"/>
-              </a:rPr>
-              <a:t>of weights for </a:t>
-            </a:r>
-            <a:r>
-              <a:rPr lang="en-US" dirty="0" smtClean="0">
-                <a:latin typeface="Arial"/>
-                <a:cs typeface="Arial"/>
-              </a:rPr>
-              <a:t>events  =&gt; 14 sec</a:t>
-            </a:r>
-            <a:endParaRPr lang="en-US" dirty="0">
-              <a:latin typeface="Arial"/>
-              <a:cs typeface="Arial"/>
-            </a:endParaRPr>
           </a:p>
         </p:txBody>
       </p:sp>
@@ -10619,8 +10230,8 @@
         </p:nvSpPr>
         <p:spPr bwMode="auto">
           <a:xfrm>
-            <a:off x="32971094" y="24709972"/>
-            <a:ext cx="9766522" cy="6261095"/>
+            <a:off x="32461200" y="24004738"/>
+            <a:ext cx="10174723" cy="6261095"/>
           </a:xfrm>
           <a:prstGeom prst="roundRect">
             <a:avLst>
@@ -10658,50 +10269,36 @@
           <a:lstStyle/>
           <a:p>
             <a:r>
+              <a:rPr lang="en-US" sz="2800" b="1" dirty="0" smtClean="0">
+                <a:latin typeface="+mn-lt"/>
+                <a:cs typeface="Arial"/>
+              </a:rPr>
+              <a:t>Conclusion</a:t>
+            </a:r>
+            <a:r>
               <a:rPr lang="en-US" sz="2800" dirty="0" smtClean="0">
-                <a:latin typeface="Arial"/>
-                <a:cs typeface="Arial"/>
-              </a:rPr>
-              <a:t>The goal of </a:t>
+                <a:latin typeface="+mn-lt"/>
+                <a:cs typeface="Arial"/>
+              </a:rPr>
+              <a:t> The </a:t>
             </a:r>
             <a:r>
               <a:rPr lang="en-US" sz="2800" dirty="0" smtClean="0">
-                <a:latin typeface="Arial"/>
-                <a:cs typeface="Arial"/>
-              </a:rPr>
-              <a:t>our exploratory study is to </a:t>
+                <a:latin typeface="+mn-lt"/>
+                <a:cs typeface="Arial"/>
+              </a:rPr>
+              <a:t>goal of our exploratory study is to shorten </a:t>
+            </a:r>
+            <a:r>
+              <a:rPr lang="en-US" sz="2800" i="1" dirty="0" smtClean="0">
+                <a:latin typeface="+mn-lt"/>
+                <a:cs typeface="Arial"/>
+              </a:rPr>
+              <a:t>time to physics </a:t>
             </a:r>
             <a:r>
               <a:rPr lang="en-US" sz="2800" dirty="0" smtClean="0">
-                <a:latin typeface="Arial"/>
-                <a:cs typeface="Arial"/>
-              </a:rPr>
-              <a:t>shorten </a:t>
-            </a:r>
-            <a:r>
-              <a:rPr lang="en-US" sz="2800" i="1" dirty="0" smtClean="0">
-                <a:latin typeface="Arial"/>
-                <a:cs typeface="Arial"/>
-              </a:rPr>
-              <a:t>time </a:t>
-            </a:r>
-            <a:r>
-              <a:rPr lang="en-US" sz="2800" i="1" dirty="0" smtClean="0">
-                <a:latin typeface="Arial"/>
-                <a:cs typeface="Arial"/>
-              </a:rPr>
-              <a:t>to </a:t>
-            </a:r>
-            <a:r>
-              <a:rPr lang="en-US" sz="2800" i="1" dirty="0" smtClean="0">
-                <a:latin typeface="Arial"/>
-                <a:cs typeface="Arial"/>
-              </a:rPr>
-              <a:t>physics </a:t>
-            </a:r>
-            <a:r>
-              <a:rPr lang="en-US" sz="2800" dirty="0" smtClean="0">
-                <a:latin typeface="Arial"/>
+                <a:latin typeface="+mn-lt"/>
                 <a:cs typeface="Arial"/>
               </a:rPr>
               <a:t>using Spark</a:t>
@@ -10714,14 +10311,14 @@
             </a:pPr>
             <a:r>
               <a:rPr lang="en-US" sz="2800" dirty="0">
-                <a:latin typeface="Arial"/>
+                <a:latin typeface="+mn-lt"/>
                 <a:cs typeface="Arial"/>
               </a:rPr>
               <a:t>We have observed good scalability, </a:t>
             </a:r>
             <a:r>
               <a:rPr lang="en-US" sz="2800" dirty="0" smtClean="0">
-                <a:latin typeface="Arial"/>
+                <a:latin typeface="+mn-lt"/>
                 <a:cs typeface="Arial"/>
               </a:rPr>
               <a:t>task distribution and data partitioning</a:t>
@@ -10734,49 +10331,49 @@
             </a:pPr>
             <a:r>
               <a:rPr lang="en-US" sz="2800" dirty="0" smtClean="0">
-                <a:latin typeface="Arial"/>
+                <a:latin typeface="+mn-lt"/>
                 <a:cs typeface="Arial"/>
               </a:rPr>
               <a:t>Availability </a:t>
             </a:r>
             <a:r>
               <a:rPr lang="en-US" sz="2800" dirty="0">
-                <a:latin typeface="Arial"/>
+                <a:latin typeface="+mn-lt"/>
                 <a:cs typeface="Arial"/>
               </a:rPr>
               <a:t>of </a:t>
             </a:r>
             <a:r>
               <a:rPr lang="en-US" sz="2800" dirty="0" err="1">
-                <a:latin typeface="Arial"/>
+                <a:latin typeface="+mn-lt"/>
                 <a:cs typeface="Arial"/>
               </a:rPr>
               <a:t>pySpark</a:t>
             </a:r>
             <a:r>
               <a:rPr lang="en-US" sz="2800" dirty="0">
-                <a:latin typeface="Arial"/>
+                <a:latin typeface="+mn-lt"/>
                 <a:cs typeface="Arial"/>
               </a:rPr>
               <a:t> and </a:t>
             </a:r>
             <a:r>
               <a:rPr lang="en-US" sz="2800" dirty="0" err="1" smtClean="0">
-                <a:latin typeface="Arial"/>
+                <a:latin typeface="+mn-lt"/>
                 <a:cs typeface="Arial"/>
               </a:rPr>
               <a:t>SparkR</a:t>
             </a:r>
             <a:r>
               <a:rPr lang="en-US" sz="2800" dirty="0" smtClean="0">
-                <a:latin typeface="Arial"/>
+                <a:latin typeface="+mn-lt"/>
                 <a:cs typeface="Arial"/>
               </a:rPr>
               <a:t> high level APIs are </a:t>
             </a:r>
             <a:r>
               <a:rPr lang="en-US" sz="2800" dirty="0">
-                <a:latin typeface="Arial"/>
+                <a:latin typeface="+mn-lt"/>
                 <a:cs typeface="Arial"/>
               </a:rPr>
               <a:t>appealing to the HEP user community </a:t>
@@ -10789,35 +10386,49 @@
             </a:pPr>
             <a:r>
               <a:rPr lang="en-US" sz="2800" dirty="0" smtClean="0">
-                <a:latin typeface="Arial"/>
+                <a:latin typeface="+mn-lt"/>
                 <a:cs typeface="Arial"/>
               </a:rPr>
               <a:t>Encoding skimming workflow using </a:t>
             </a:r>
             <a:r>
               <a:rPr lang="en-US" sz="2800" dirty="0" err="1" smtClean="0">
-                <a:latin typeface="Arial"/>
+                <a:latin typeface="+mn-lt"/>
                 <a:cs typeface="Arial"/>
               </a:rPr>
               <a:t>Scala</a:t>
             </a:r>
             <a:r>
               <a:rPr lang="en-US" sz="2800" dirty="0" smtClean="0">
-                <a:latin typeface="Arial"/>
-                <a:cs typeface="Arial"/>
-              </a:rPr>
-              <a:t> best practices is challenging along with optimal use of Spark </a:t>
+                <a:latin typeface="+mn-lt"/>
+                <a:cs typeface="Arial"/>
+              </a:rPr>
+              <a:t> best practices is challenging along with </a:t>
+            </a:r>
+            <a:r>
+              <a:rPr lang="en-US" sz="2800" dirty="0" smtClean="0">
+                <a:latin typeface="+mn-lt"/>
+                <a:cs typeface="Arial"/>
+              </a:rPr>
+              <a:t>the  optimal </a:t>
+            </a:r>
+            <a:r>
+              <a:rPr lang="en-US" sz="2800" dirty="0" smtClean="0">
+                <a:latin typeface="+mn-lt"/>
+                <a:cs typeface="Arial"/>
+              </a:rPr>
+              <a:t>use of Spark </a:t>
             </a:r>
             <a:r>
               <a:rPr lang="en-US" sz="2800" dirty="0" err="1" smtClean="0">
-                <a:latin typeface="Arial"/>
+                <a:latin typeface="+mn-lt"/>
                 <a:cs typeface="Arial"/>
               </a:rPr>
               <a:t>DataFrame</a:t>
             </a:r>
             <a:r>
               <a:rPr lang="en-US" sz="2800" dirty="0" smtClean="0">
-                <a:latin typeface="Arial"/>
+                <a:latin typeface="+mn-lt"/>
                 <a:cs typeface="Arial"/>
               </a:rPr>
               <a:t> features </a:t>
@@ -10830,61 +10441,33 @@
             </a:pPr>
             <a:r>
               <a:rPr lang="en-US" sz="2800" dirty="0" smtClean="0">
-                <a:latin typeface="Arial"/>
-                <a:cs typeface="Arial"/>
-              </a:rPr>
-              <a:t>Documentation</a:t>
-            </a:r>
-            <a:r>
-              <a:rPr lang="en-US" sz="2800" dirty="0" smtClean="0">
-                <a:latin typeface="Arial"/>
-                <a:cs typeface="Arial"/>
-              </a:rPr>
-              <a:t>, and </a:t>
-            </a:r>
-            <a:r>
-              <a:rPr lang="en-US" sz="2800" dirty="0" smtClean="0">
-                <a:latin typeface="Arial"/>
-                <a:cs typeface="Arial"/>
-              </a:rPr>
-              <a:t>error reporting</a:t>
-            </a:r>
-            <a:r>
-              <a:rPr lang="en-US" sz="2800" dirty="0" smtClean="0">
-                <a:latin typeface="Arial"/>
-                <a:cs typeface="Arial"/>
-              </a:rPr>
-              <a:t> </a:t>
-            </a:r>
-            <a:r>
-              <a:rPr lang="en-US" sz="2800" dirty="0" smtClean="0">
-                <a:latin typeface="Arial"/>
-                <a:cs typeface="Arial"/>
-              </a:rPr>
-              <a:t>needs to be better</a:t>
+                <a:latin typeface="+mn-lt"/>
+                <a:cs typeface="Arial"/>
+              </a:rPr>
+              <a:t>Documentation, and error reporting needs to be better</a:t>
             </a:r>
             <a:endParaRPr lang="en-US" sz="2800" dirty="0">
-              <a:latin typeface="Arial"/>
+              <a:latin typeface="+mn-lt"/>
               <a:cs typeface="Arial"/>
             </a:endParaRPr>
           </a:p>
           <a:p>
             <a:r>
-              <a:rPr lang="en-US" sz="2800" dirty="0" smtClean="0">
-                <a:latin typeface="Arial"/>
-                <a:cs typeface="Arial"/>
-              </a:rPr>
-              <a:t>Future direction</a:t>
-            </a:r>
-            <a:r>
-              <a:rPr lang="en-US" sz="2800" dirty="0" smtClean="0">
-                <a:latin typeface="Arial"/>
-                <a:cs typeface="Arial"/>
-              </a:rPr>
-              <a:t>:</a:t>
-            </a:r>
-            <a:endParaRPr lang="en-US" sz="2800" dirty="0">
-              <a:latin typeface="Arial"/>
+              <a:rPr lang="en-US" sz="2800" b="1" dirty="0" smtClean="0">
+                <a:latin typeface="+mn-lt"/>
+                <a:cs typeface="Arial"/>
+              </a:rPr>
+              <a:t>Future </a:t>
+            </a:r>
+            <a:r>
+              <a:rPr lang="en-US" sz="2800" b="1" dirty="0" smtClean="0">
+                <a:latin typeface="+mn-lt"/>
+                <a:cs typeface="Arial"/>
+              </a:rPr>
+              <a:t>direction</a:t>
+            </a:r>
+            <a:endParaRPr lang="en-US" sz="2800" b="1" dirty="0">
+              <a:latin typeface="+mn-lt"/>
               <a:cs typeface="Arial"/>
             </a:endParaRPr>
           </a:p>
@@ -10895,7 +10478,7 @@
             </a:pPr>
             <a:r>
               <a:rPr lang="en-US" sz="2800" dirty="0" smtClean="0">
-                <a:latin typeface="Arial"/>
+                <a:latin typeface="+mn-lt"/>
                 <a:cs typeface="Arial"/>
               </a:rPr>
               <a:t>Improve the HDF5 reader interface </a:t>
@@ -10908,7 +10491,7 @@
             </a:pPr>
             <a:r>
               <a:rPr lang="en-US" sz="2800" dirty="0" smtClean="0">
-                <a:latin typeface="Arial"/>
+                <a:latin typeface="+mn-lt"/>
                 <a:cs typeface="Arial"/>
               </a:rPr>
               <a:t>Optimize skimming workflow </a:t>
@@ -10921,7 +10504,7 @@
             </a:pPr>
             <a:r>
               <a:rPr lang="en-US" sz="2800" dirty="0" smtClean="0">
-                <a:latin typeface="Arial"/>
+                <a:latin typeface="+mn-lt"/>
                 <a:cs typeface="Arial"/>
               </a:rPr>
               <a:t>Scale up to greater than TB data set</a:t>
@@ -10939,8 +10522,8 @@
         </p:nvSpPr>
         <p:spPr bwMode="auto">
           <a:xfrm>
-            <a:off x="32971094" y="31106533"/>
-            <a:ext cx="9766522" cy="1037874"/>
+            <a:off x="21776268" y="30595461"/>
+            <a:ext cx="21038316" cy="1037874"/>
           </a:xfrm>
           <a:prstGeom prst="roundRect">
             <a:avLst>
@@ -10978,39 +10561,53 @@
           <a:lstStyle/>
           <a:p>
             <a:r>
-              <a:rPr lang="en-US" sz="2000" dirty="0" smtClean="0">
-                <a:latin typeface="Arial"/>
-                <a:cs typeface="Arial"/>
-              </a:rPr>
-              <a:t>This study is supported by the Department of Energy (DOE). The CMS collaboration is supported by DOE</a:t>
-            </a:r>
-            <a:r>
-              <a:rPr lang="en-US" sz="2000" dirty="0">
-                <a:latin typeface="Arial"/>
+              <a:rPr lang="en-US" sz="2400" b="1" dirty="0" smtClean="0">
+                <a:latin typeface="+mn-lt"/>
+                <a:cs typeface="Arial"/>
+              </a:rPr>
+              <a:t>Acknowledgement </a:t>
+            </a:r>
+            <a:r>
+              <a:rPr lang="en-US" sz="2400" dirty="0" smtClean="0">
+                <a:latin typeface="+mn-lt"/>
+                <a:cs typeface="Arial"/>
+              </a:rPr>
+              <a:t>This </a:t>
+            </a:r>
+            <a:r>
+              <a:rPr lang="en-US" sz="2400" dirty="0" smtClean="0">
+                <a:latin typeface="+mn-lt"/>
+                <a:cs typeface="Arial"/>
+              </a:rPr>
+              <a:t>study is supported by the Department of Energy (DOE). The CMS collaboration is supported by DOE</a:t>
+            </a:r>
+            <a:r>
+              <a:rPr lang="en-US" sz="2400" dirty="0">
+                <a:latin typeface="+mn-lt"/>
                 <a:cs typeface="Arial"/>
               </a:rPr>
               <a:t>, NSF, </a:t>
             </a:r>
             <a:r>
-              <a:rPr lang="en-US" sz="2000" dirty="0" smtClean="0">
-                <a:latin typeface="Arial"/>
+              <a:rPr lang="en-US" sz="2400" dirty="0" smtClean="0">
+                <a:latin typeface="+mn-lt"/>
                 <a:cs typeface="Arial"/>
               </a:rPr>
               <a:t>and international </a:t>
             </a:r>
             <a:r>
-              <a:rPr lang="en-US" sz="2000" dirty="0">
-                <a:latin typeface="Arial"/>
+              <a:rPr lang="en-US" sz="2400" dirty="0">
+                <a:latin typeface="+mn-lt"/>
                 <a:cs typeface="Arial"/>
               </a:rPr>
               <a:t>funding </a:t>
             </a:r>
             <a:r>
-              <a:rPr lang="en-US" sz="2000" dirty="0" smtClean="0">
-                <a:latin typeface="Arial"/>
-                <a:cs typeface="Arial"/>
-              </a:rPr>
-              <a:t>agencies. Histogrammer is supported through the DIANA project by NSF. NERSC is supported by DOE.</a:t>
+              <a:rPr lang="en-US" sz="2400" dirty="0" smtClean="0">
+                <a:latin typeface="+mn-lt"/>
+                <a:cs typeface="Arial"/>
+              </a:rPr>
+              <a:t>agencies. Histogrammer is supported through the DIANA project by NSF. </a:t>
             </a:r>
           </a:p>
         </p:txBody>
@@ -11054,8 +10651,8 @@
         </p:nvSpPr>
         <p:spPr>
           <a:xfrm>
-            <a:off x="1371600" y="22104337"/>
-            <a:ext cx="12809175" cy="10064291"/>
+            <a:off x="1063728" y="21883039"/>
+            <a:ext cx="13846072" cy="9694960"/>
           </a:xfrm>
           <a:prstGeom prst="rect">
             <a:avLst/>
@@ -11068,75 +10665,71 @@
           </a:bodyPr>
           <a:lstStyle/>
           <a:p>
-            <a:pPr marL="457200" indent="-457200">
-              <a:buFont typeface="Arial"/>
-              <a:buChar char="•"/>
-            </a:pPr>
             <a:r>
               <a:rPr lang="en-US" sz="2800" dirty="0" smtClean="0">
-                <a:latin typeface="Arial"/>
+                <a:latin typeface="+mn-lt"/>
                 <a:cs typeface="Arial"/>
               </a:rPr>
               <a:t>Reconstructing and analyzing HEP collisions</a:t>
             </a:r>
             <a:endParaRPr lang="en-US" sz="2800" dirty="0">
-              <a:latin typeface="Arial"/>
+              <a:latin typeface="+mn-lt"/>
               <a:cs typeface="Arial"/>
             </a:endParaRPr>
           </a:p>
           <a:p>
             <a:pPr marL="914400" lvl="1" indent="-457200">
-              <a:buFont typeface="Arial"/>
-              <a:buChar char="•"/>
+              <a:buFont typeface="Wingdings" charset="2"/>
+              <a:buChar char="Ø"/>
             </a:pPr>
             <a:r>
               <a:rPr lang="en-US" sz="2400" dirty="0" smtClean="0">
-                <a:latin typeface="Arial"/>
+                <a:latin typeface="+mn-lt"/>
                 <a:cs typeface="Arial"/>
               </a:rPr>
               <a:t>Physics analyses </a:t>
             </a:r>
             <a:r>
               <a:rPr lang="en-US" sz="2400" dirty="0">
-                <a:latin typeface="Arial"/>
+                <a:latin typeface="+mn-lt"/>
                 <a:cs typeface="Arial"/>
               </a:rPr>
               <a:t>require </a:t>
             </a:r>
             <a:r>
               <a:rPr lang="en-US" sz="2400" dirty="0" smtClean="0">
-                <a:latin typeface="Arial"/>
+                <a:latin typeface="+mn-lt"/>
                 <a:cs typeface="Arial"/>
               </a:rPr>
               <a:t>collisions both recorded </a:t>
             </a:r>
             <a:r>
               <a:rPr lang="en-US" sz="2400" dirty="0">
-                <a:latin typeface="Arial"/>
+                <a:latin typeface="+mn-lt"/>
                 <a:cs typeface="Arial"/>
               </a:rPr>
               <a:t>by the detector and </a:t>
             </a:r>
             <a:r>
               <a:rPr lang="en-US" sz="2400" dirty="0" smtClean="0">
-                <a:latin typeface="Arial"/>
+                <a:latin typeface="+mn-lt"/>
                 <a:cs typeface="Arial"/>
               </a:rPr>
               <a:t>simulated using Monte Carlo techniques</a:t>
             </a:r>
             <a:endParaRPr lang="en-US" sz="2400" dirty="0">
-              <a:latin typeface="Arial"/>
+              <a:latin typeface="+mn-lt"/>
               <a:cs typeface="Arial"/>
             </a:endParaRPr>
           </a:p>
           <a:p>
             <a:pPr marL="914400" lvl="1" indent="-457200">
-              <a:buFont typeface="Arial"/>
-              <a:buChar char="•"/>
+              <a:buFont typeface="Wingdings" charset="2"/>
+              <a:buChar char="Ø"/>
             </a:pPr>
             <a:r>
               <a:rPr lang="en-US" sz="2400" dirty="0" smtClean="0">
-                <a:latin typeface="Arial"/>
+                <a:latin typeface="+mn-lt"/>
                 <a:cs typeface="Arial"/>
               </a:rPr>
               <a:t>A C++ software framework is used to reconstruct recorded and simulated detector signals, based on a statistics toolkit also uses to persist objects in files</a:t>
@@ -11144,413 +10737,498 @@
           </a:p>
           <a:p>
             <a:pPr marL="914400" lvl="1" indent="-457200">
-              <a:buFont typeface="Arial"/>
-              <a:buChar char="•"/>
+              <a:buFont typeface="Wingdings" charset="2"/>
+              <a:buChar char="Ø"/>
             </a:pPr>
             <a:r>
               <a:rPr lang="en-US" sz="2400" dirty="0" smtClean="0">
-                <a:latin typeface="Arial"/>
+                <a:latin typeface="+mn-lt"/>
                 <a:cs typeface="Arial"/>
               </a:rPr>
               <a:t>Reconstructed objects represent particles in a collision (called event) and are used in the analysis step</a:t>
             </a:r>
             <a:endParaRPr lang="en-US" sz="2400" dirty="0">
-              <a:latin typeface="Arial"/>
+              <a:latin typeface="+mn-lt"/>
               <a:cs typeface="Arial"/>
             </a:endParaRPr>
           </a:p>
           <a:p>
             <a:pPr marL="914400" lvl="1" indent="-457200">
-              <a:buFont typeface="Arial"/>
-              <a:buChar char="•"/>
+              <a:buFont typeface="Wingdings" charset="2"/>
+              <a:buChar char="Ø"/>
             </a:pPr>
             <a:r>
               <a:rPr lang="en-US" sz="2400" dirty="0" smtClean="0">
-                <a:latin typeface="Arial"/>
+                <a:latin typeface="+mn-lt"/>
                 <a:cs typeface="Arial"/>
               </a:rPr>
               <a:t>Recorded data and simulations are processed centrally and the output is analyzed by all physicists looking for a wealth of different physics signals</a:t>
             </a:r>
             <a:endParaRPr lang="en-US" sz="2800" dirty="0" smtClean="0">
-              <a:latin typeface="Arial"/>
+              <a:latin typeface="+mn-lt"/>
               <a:cs typeface="Arial"/>
             </a:endParaRPr>
           </a:p>
           <a:p>
-            <a:pPr marL="457200" indent="-457200">
-              <a:buFont typeface="Arial"/>
-              <a:buChar char="•"/>
+            <a:r>
+              <a:rPr lang="en-US" sz="2800" dirty="0" smtClean="0">
+                <a:latin typeface="+mn-lt"/>
+                <a:cs typeface="Arial"/>
+              </a:rPr>
+              <a:t>Dark </a:t>
+            </a:r>
+            <a:r>
+              <a:rPr lang="en-US" sz="2800" dirty="0">
+                <a:latin typeface="+mn-lt"/>
+                <a:cs typeface="Arial"/>
+              </a:rPr>
+              <a:t>Matter analysis use case</a:t>
+            </a:r>
+          </a:p>
+          <a:p>
+            <a:pPr marL="971550" lvl="1" indent="-514350">
+              <a:buFont typeface="+mj-lt"/>
+              <a:buAutoNum type="arabicPeriod"/>
             </a:pPr>
             <a:r>
-              <a:rPr lang="en-US" sz="2800" dirty="0" smtClean="0">
-                <a:latin typeface="Arial"/>
-                <a:cs typeface="Arial"/>
-              </a:rPr>
-              <a:t>Dark </a:t>
-            </a:r>
-            <a:r>
-              <a:rPr lang="en-US" sz="2800" dirty="0">
-                <a:latin typeface="Arial"/>
-                <a:cs typeface="Arial"/>
-              </a:rPr>
-              <a:t>Matter analysis use case</a:t>
-            </a:r>
-          </a:p>
-          <a:p>
-            <a:pPr marL="914400" lvl="1" indent="-457200">
-              <a:buFont typeface="Arial"/>
-              <a:buChar char="•"/>
-            </a:pPr>
-            <a:r>
-              <a:rPr lang="en-US" sz="2800" dirty="0" smtClean="0">
-                <a:latin typeface="Arial"/>
-                <a:cs typeface="Arial"/>
-              </a:rPr>
-              <a:t>Step 1: Ntupling</a:t>
-            </a:r>
-          </a:p>
-          <a:p>
-            <a:pPr marL="1371600" lvl="2" indent="-457200">
-              <a:buFont typeface="Arial"/>
-              <a:buChar char="•"/>
-            </a:pPr>
-            <a:r>
-              <a:rPr lang="en-US" sz="2400" dirty="0" smtClean="0">
-                <a:latin typeface="Arial"/>
-                <a:cs typeface="Arial"/>
-              </a:rPr>
-              <a:t>Input</a:t>
-            </a:r>
-            <a:r>
-              <a:rPr lang="en-US" sz="2400" dirty="0">
-                <a:latin typeface="Arial"/>
-                <a:cs typeface="Arial"/>
-              </a:rPr>
-              <a:t>: </a:t>
-            </a:r>
-            <a:endParaRPr lang="en-US" sz="2400" dirty="0" smtClean="0">
-              <a:latin typeface="Arial"/>
+              <a:rPr lang="en-US" sz="2800" b="1" dirty="0" smtClean="0">
+                <a:latin typeface="+mn-lt"/>
+                <a:cs typeface="Arial"/>
+              </a:rPr>
+              <a:t>N-</a:t>
+            </a:r>
+            <a:r>
+              <a:rPr lang="en-US" sz="2800" b="1" dirty="0" err="1" smtClean="0">
+                <a:latin typeface="+mn-lt"/>
+                <a:cs typeface="Arial"/>
+              </a:rPr>
+              <a:t>tupling</a:t>
+            </a:r>
+            <a:endParaRPr lang="en-US" sz="2800" b="1" dirty="0" smtClean="0">
+              <a:latin typeface="+mn-lt"/>
               <a:cs typeface="Arial"/>
             </a:endParaRPr>
           </a:p>
           <a:p>
-            <a:pPr marL="1828800" lvl="3" indent="-457200">
-              <a:buFont typeface="Arial"/>
-              <a:buChar char="•"/>
-            </a:pPr>
-            <a:r>
-              <a:rPr lang="en-US" sz="2400" dirty="0" smtClean="0">
-                <a:latin typeface="Arial"/>
-                <a:cs typeface="Arial"/>
-              </a:rPr>
-              <a:t>Recorded events: Analysis </a:t>
-            </a:r>
-            <a:r>
-              <a:rPr lang="en-US" sz="2400" dirty="0">
-                <a:latin typeface="Arial"/>
-                <a:cs typeface="Arial"/>
-              </a:rPr>
-              <a:t>Object Data (AOD) event format (400kB/event)</a:t>
-            </a:r>
-          </a:p>
-          <a:p>
-            <a:pPr marL="2286000" lvl="4" indent="-457200">
-              <a:buFont typeface="Arial"/>
-              <a:buChar char="•"/>
-            </a:pPr>
-            <a:r>
-              <a:rPr lang="en-US" sz="2400" dirty="0">
-                <a:latin typeface="Arial"/>
-                <a:cs typeface="Arial"/>
-              </a:rPr>
-              <a:t>C++ objects describing the analysis products</a:t>
-            </a:r>
-          </a:p>
-          <a:p>
-            <a:pPr marL="1828800" lvl="3" indent="-457200">
-              <a:buFont typeface="Arial"/>
-              <a:buChar char="•"/>
-            </a:pPr>
-            <a:r>
-              <a:rPr lang="en-US" sz="2400" dirty="0" smtClean="0">
-                <a:latin typeface="Arial"/>
-                <a:cs typeface="Arial"/>
-              </a:rPr>
-              <a:t>500,000,000 </a:t>
-            </a:r>
-            <a:r>
-              <a:rPr lang="en-US" sz="2400" dirty="0">
-                <a:latin typeface="Arial"/>
-                <a:cs typeface="Arial"/>
-              </a:rPr>
-              <a:t>simulated </a:t>
-            </a:r>
-            <a:r>
-              <a:rPr lang="en-US" sz="2400" dirty="0" smtClean="0">
-                <a:latin typeface="Arial"/>
-                <a:cs typeface="Arial"/>
-              </a:rPr>
-              <a:t>events </a:t>
-            </a:r>
-            <a:r>
-              <a:rPr lang="en-US" sz="2400" dirty="0">
-                <a:latin typeface="Arial"/>
-                <a:cs typeface="Arial"/>
-              </a:rPr>
-              <a:t>for </a:t>
-            </a:r>
-            <a:r>
-              <a:rPr lang="en-US" sz="2400" dirty="0" smtClean="0">
-                <a:latin typeface="Arial"/>
-                <a:cs typeface="Arial"/>
-              </a:rPr>
-              <a:t>backgrounds </a:t>
-            </a:r>
-            <a:r>
-              <a:rPr lang="en-US" sz="2400" dirty="0">
-                <a:latin typeface="Arial"/>
-                <a:cs typeface="Arial"/>
-              </a:rPr>
-              <a:t>and signal (200 TB)</a:t>
-            </a:r>
-          </a:p>
-          <a:p>
-            <a:pPr marL="1371600" lvl="2" indent="-457200">
-              <a:buFont typeface="Arial"/>
-              <a:buChar char="•"/>
-            </a:pPr>
-            <a:r>
-              <a:rPr lang="en-US" sz="2400" dirty="0">
-                <a:latin typeface="Arial"/>
-                <a:cs typeface="Arial"/>
-              </a:rPr>
-              <a:t>Processing </a:t>
-            </a:r>
-            <a:r>
-              <a:rPr lang="en-US" sz="2400" dirty="0" smtClean="0">
-                <a:latin typeface="Arial"/>
-                <a:cs typeface="Arial"/>
-              </a:rPr>
-              <a:t>time: 27,777.7778 </a:t>
-            </a:r>
-            <a:r>
-              <a:rPr lang="en-US" sz="2400" dirty="0">
-                <a:latin typeface="Arial"/>
-                <a:cs typeface="Arial"/>
-              </a:rPr>
-              <a:t>CPU </a:t>
-            </a:r>
-            <a:r>
-              <a:rPr lang="en-US" sz="2400" dirty="0" smtClean="0">
-                <a:latin typeface="Arial"/>
-                <a:cs typeface="Arial"/>
-              </a:rPr>
-              <a:t>hours</a:t>
-            </a:r>
-            <a:endParaRPr lang="en-US" sz="2400" dirty="0">
-              <a:latin typeface="Arial"/>
+            <a:pPr lvl="2"/>
+            <a:r>
+              <a:rPr lang="en-US" sz="2400" b="1" dirty="0" smtClean="0">
+                <a:latin typeface="+mn-lt"/>
+                <a:cs typeface="Arial"/>
+              </a:rPr>
+              <a:t>Input</a:t>
+            </a:r>
+            <a:endParaRPr lang="en-US" sz="2400" b="1" dirty="0" smtClean="0">
+              <a:latin typeface="+mn-lt"/>
               <a:cs typeface="Arial"/>
             </a:endParaRPr>
           </a:p>
           <a:p>
+            <a:pPr marL="1828800" lvl="3" indent="-457200">
+              <a:buFont typeface="Wingdings" charset="2"/>
+              <a:buChar char="Ø"/>
+            </a:pPr>
+            <a:r>
+              <a:rPr lang="en-US" sz="2400" dirty="0" smtClean="0">
+                <a:latin typeface="+mn-lt"/>
+                <a:cs typeface="Arial"/>
+              </a:rPr>
+              <a:t>Recorded events: Analysis </a:t>
+            </a:r>
+            <a:r>
+              <a:rPr lang="en-US" sz="2400" dirty="0">
+                <a:latin typeface="+mn-lt"/>
+                <a:cs typeface="Arial"/>
+              </a:rPr>
+              <a:t>Object Data (AOD) event format (400kB/event</a:t>
+            </a:r>
+            <a:r>
+              <a:rPr lang="en-US" sz="2400" dirty="0" smtClean="0">
+                <a:latin typeface="+mn-lt"/>
+                <a:cs typeface="Arial"/>
+              </a:rPr>
+              <a:t>). C</a:t>
+            </a:r>
+            <a:r>
+              <a:rPr lang="en-US" sz="2400" dirty="0">
+                <a:latin typeface="+mn-lt"/>
+                <a:cs typeface="Arial"/>
+              </a:rPr>
+              <a:t>++ objects describing the analysis products</a:t>
+            </a:r>
+          </a:p>
+          <a:p>
+            <a:pPr marL="1828800" lvl="3" indent="-457200">
+              <a:buFont typeface="Wingdings" charset="2"/>
+              <a:buChar char="Ø"/>
+            </a:pPr>
+            <a:r>
+              <a:rPr lang="en-US" sz="2400" dirty="0" smtClean="0">
+                <a:latin typeface="+mn-lt"/>
+                <a:cs typeface="Arial"/>
+              </a:rPr>
+              <a:t>5 x 10</a:t>
+            </a:r>
+            <a:r>
+              <a:rPr lang="en-US" sz="2400" baseline="30000" dirty="0" smtClean="0">
+                <a:latin typeface="+mn-lt"/>
+                <a:cs typeface="Arial"/>
+              </a:rPr>
+              <a:t>8</a:t>
+            </a:r>
+            <a:r>
+              <a:rPr lang="en-US" sz="2400" dirty="0" smtClean="0">
+                <a:latin typeface="+mn-lt"/>
+                <a:cs typeface="Arial"/>
+              </a:rPr>
+              <a:t> </a:t>
+            </a:r>
+            <a:r>
+              <a:rPr lang="en-US" sz="2400" dirty="0">
+                <a:latin typeface="+mn-lt"/>
+                <a:cs typeface="Arial"/>
+              </a:rPr>
+              <a:t>simulated </a:t>
+            </a:r>
+            <a:r>
+              <a:rPr lang="en-US" sz="2400" dirty="0" smtClean="0">
+                <a:latin typeface="+mn-lt"/>
+                <a:cs typeface="Arial"/>
+              </a:rPr>
+              <a:t>events </a:t>
+            </a:r>
+            <a:r>
+              <a:rPr lang="en-US" sz="2400" dirty="0">
+                <a:latin typeface="+mn-lt"/>
+                <a:cs typeface="Arial"/>
+              </a:rPr>
+              <a:t>for </a:t>
+            </a:r>
+            <a:r>
+              <a:rPr lang="en-US" sz="2400" dirty="0" smtClean="0">
+                <a:latin typeface="+mn-lt"/>
+                <a:cs typeface="Arial"/>
+              </a:rPr>
+              <a:t>backgrounds </a:t>
+            </a:r>
+            <a:r>
+              <a:rPr lang="en-US" sz="2400" dirty="0">
+                <a:latin typeface="+mn-lt"/>
+                <a:cs typeface="Arial"/>
+              </a:rPr>
+              <a:t>and signal (200 TB)</a:t>
+            </a:r>
+          </a:p>
+          <a:p>
             <a:pPr marL="1371600" lvl="2" indent="-457200">
-              <a:buFont typeface="Arial"/>
-              <a:buChar char="•"/>
+              <a:buFont typeface="Wingdings" charset="2"/>
+              <a:buChar char="Ø"/>
             </a:pPr>
             <a:r>
               <a:rPr lang="en-US" sz="2400" dirty="0">
-                <a:latin typeface="Arial"/>
-                <a:cs typeface="Arial"/>
-              </a:rPr>
-              <a:t>Output: </a:t>
-            </a:r>
-            <a:endParaRPr lang="en-US" sz="2400" dirty="0" smtClean="0">
-              <a:latin typeface="Arial"/>
+                <a:latin typeface="+mn-lt"/>
+                <a:cs typeface="Arial"/>
+              </a:rPr>
+              <a:t>Processing </a:t>
+            </a:r>
+            <a:r>
+              <a:rPr lang="en-US" sz="2400" dirty="0" smtClean="0">
+                <a:latin typeface="+mn-lt"/>
+                <a:cs typeface="Arial"/>
+              </a:rPr>
+              <a:t>time: </a:t>
+            </a:r>
+            <a:r>
+              <a:rPr lang="en-US" sz="2400" dirty="0" smtClean="0">
+                <a:latin typeface="+mn-lt"/>
+                <a:cs typeface="Arial"/>
+              </a:rPr>
+              <a:t>2.8 x 10</a:t>
+            </a:r>
+            <a:r>
+              <a:rPr lang="en-US" sz="2400" baseline="30000" dirty="0" smtClean="0">
+                <a:latin typeface="+mn-lt"/>
+                <a:cs typeface="Arial"/>
+              </a:rPr>
+              <a:t>4</a:t>
+            </a:r>
+            <a:r>
+              <a:rPr lang="en-US" sz="2400" dirty="0" smtClean="0">
+                <a:latin typeface="+mn-lt"/>
+                <a:cs typeface="Arial"/>
+              </a:rPr>
+              <a:t> </a:t>
+            </a:r>
+            <a:r>
+              <a:rPr lang="en-US" sz="2400" dirty="0">
+                <a:latin typeface="+mn-lt"/>
+                <a:cs typeface="Arial"/>
+              </a:rPr>
+              <a:t>CPU </a:t>
+            </a:r>
+            <a:r>
+              <a:rPr lang="en-US" sz="2400" dirty="0" smtClean="0">
+                <a:latin typeface="+mn-lt"/>
+                <a:cs typeface="Arial"/>
+              </a:rPr>
+              <a:t>hours</a:t>
+            </a:r>
+            <a:endParaRPr lang="en-US" sz="2400" dirty="0">
+              <a:latin typeface="+mn-lt"/>
               <a:cs typeface="Arial"/>
             </a:endParaRPr>
           </a:p>
           <a:p>
-            <a:pPr marL="1828800" lvl="3" indent="-457200">
-              <a:buFont typeface="Arial"/>
-              <a:buChar char="•"/>
+            <a:pPr lvl="2"/>
+            <a:r>
+              <a:rPr lang="en-US" sz="2400" b="1" dirty="0" smtClean="0">
+                <a:latin typeface="+mn-lt"/>
+                <a:cs typeface="Arial"/>
+              </a:rPr>
+              <a:t>Output</a:t>
+            </a:r>
+            <a:r>
+              <a:rPr lang="en-US" sz="2400" dirty="0" smtClean="0">
+                <a:latin typeface="+mn-lt"/>
+                <a:cs typeface="Arial"/>
+              </a:rPr>
+              <a:t> ROOT </a:t>
+            </a:r>
+            <a:r>
+              <a:rPr lang="en-US" sz="2400" dirty="0">
+                <a:latin typeface="+mn-lt"/>
+                <a:cs typeface="Arial"/>
+              </a:rPr>
+              <a:t>files in </a:t>
+            </a:r>
+            <a:r>
+              <a:rPr lang="en-US" sz="2400" dirty="0" smtClean="0">
+                <a:latin typeface="+mn-lt"/>
+                <a:cs typeface="Arial"/>
+              </a:rPr>
+              <a:t>custom </a:t>
+            </a:r>
+            <a:r>
+              <a:rPr lang="en-US" sz="2400" dirty="0" smtClean="0">
+                <a:latin typeface="+mn-lt"/>
+                <a:cs typeface="Arial"/>
+              </a:rPr>
+              <a:t>Bacon </a:t>
+            </a:r>
+            <a:r>
+              <a:rPr lang="en-US" sz="2400" dirty="0">
+                <a:latin typeface="+mn-lt"/>
+                <a:cs typeface="Arial"/>
+              </a:rPr>
+              <a:t>format (2 TB</a:t>
+            </a:r>
+            <a:r>
+              <a:rPr lang="en-US" sz="2400" dirty="0" smtClean="0">
+                <a:latin typeface="+mn-lt"/>
+                <a:cs typeface="Arial"/>
+              </a:rPr>
+              <a:t>), event </a:t>
+            </a:r>
+            <a:r>
+              <a:rPr lang="en-US" sz="2400" dirty="0">
+                <a:latin typeface="+mn-lt"/>
+                <a:cs typeface="Arial"/>
+              </a:rPr>
+              <a:t>and physics </a:t>
+            </a:r>
+            <a:r>
+              <a:rPr lang="en-US" sz="2400" dirty="0" smtClean="0">
+                <a:latin typeface="+mn-lt"/>
+                <a:cs typeface="Arial"/>
+              </a:rPr>
+              <a:t>objects </a:t>
+            </a:r>
+            <a:r>
+              <a:rPr lang="en-US" sz="2400" dirty="0">
+                <a:latin typeface="+mn-lt"/>
+                <a:cs typeface="Arial"/>
+              </a:rPr>
+              <a:t>information stored in vectors and float </a:t>
+            </a:r>
+            <a:r>
+              <a:rPr lang="en-US" sz="2400" dirty="0" smtClean="0">
+                <a:latin typeface="+mn-lt"/>
+                <a:cs typeface="Arial"/>
+              </a:rPr>
+              <a:t>types, and </a:t>
+            </a:r>
+            <a:r>
+              <a:rPr lang="en-US" sz="2400" dirty="0">
+                <a:latin typeface="+mn-lt"/>
+                <a:cs typeface="Arial"/>
+              </a:rPr>
+              <a:t>f</a:t>
+            </a:r>
+            <a:r>
+              <a:rPr lang="en-US" sz="2400" dirty="0" smtClean="0">
+                <a:latin typeface="+mn-lt"/>
+                <a:cs typeface="Arial"/>
+              </a:rPr>
+              <a:t>ixed types of particles per event (Electron, </a:t>
+            </a:r>
+            <a:r>
+              <a:rPr lang="en-US" sz="2400" dirty="0" err="1" smtClean="0">
+                <a:latin typeface="+mn-lt"/>
+                <a:cs typeface="Arial"/>
+              </a:rPr>
+              <a:t>Muon</a:t>
+            </a:r>
+            <a:r>
+              <a:rPr lang="en-US" sz="2400" dirty="0" smtClean="0">
+                <a:latin typeface="+mn-lt"/>
+                <a:cs typeface="Arial"/>
+              </a:rPr>
+              <a:t>, Tau, </a:t>
+            </a:r>
+            <a:r>
+              <a:rPr lang="en-US" sz="2400" dirty="0" err="1" smtClean="0">
+                <a:latin typeface="+mn-lt"/>
+                <a:cs typeface="Arial"/>
+              </a:rPr>
+              <a:t>etc</a:t>
+            </a:r>
+            <a:r>
+              <a:rPr lang="en-US" sz="2400" dirty="0" smtClean="0">
+                <a:latin typeface="+mn-lt"/>
+                <a:cs typeface="Arial"/>
+              </a:rPr>
+              <a:t>)</a:t>
+            </a:r>
+          </a:p>
+          <a:p>
+            <a:pPr marL="971550" lvl="1" indent="-514350">
+              <a:buFont typeface="+mj-lt"/>
+              <a:buAutoNum type="arabicPeriod"/>
             </a:pPr>
             <a:r>
+              <a:rPr lang="en-US" sz="2800" b="1" dirty="0" smtClean="0">
+                <a:latin typeface="+mn-lt"/>
+                <a:cs typeface="Arial"/>
+              </a:rPr>
+              <a:t>Skimming (reduce </a:t>
+            </a:r>
+            <a:r>
+              <a:rPr lang="en-US" sz="2800" b="1" dirty="0">
+                <a:latin typeface="+mn-lt"/>
+                <a:cs typeface="Arial"/>
+              </a:rPr>
+              <a:t>number of </a:t>
+            </a:r>
+            <a:r>
+              <a:rPr lang="en-US" sz="2800" b="1" dirty="0" smtClean="0">
+                <a:latin typeface="+mn-lt"/>
+                <a:cs typeface="Arial"/>
+              </a:rPr>
+              <a:t>events) and Slimming </a:t>
+            </a:r>
+            <a:r>
+              <a:rPr lang="en-US" sz="2800" b="1" dirty="0" smtClean="0">
+                <a:latin typeface="+mn-lt"/>
+                <a:cs typeface="Arial"/>
+              </a:rPr>
+              <a:t>(reduce </a:t>
+            </a:r>
+            <a:r>
+              <a:rPr lang="en-US" sz="2800" b="1" dirty="0">
+                <a:latin typeface="+mn-lt"/>
+                <a:cs typeface="Arial"/>
+              </a:rPr>
+              <a:t>event content)</a:t>
+            </a:r>
+          </a:p>
+          <a:p>
+            <a:pPr marL="1371600" lvl="2" indent="-457200">
+              <a:buFont typeface="Wingdings" charset="2"/>
+              <a:buChar char="Ø"/>
+            </a:pPr>
+            <a:r>
+              <a:rPr lang="en-US" sz="2400" dirty="0">
+                <a:latin typeface="+mn-lt"/>
+                <a:cs typeface="Arial"/>
+              </a:rPr>
+              <a:t>Apply analysis pre-selection</a:t>
+            </a:r>
+          </a:p>
+          <a:p>
+            <a:pPr marL="1371600" lvl="2" indent="-457200">
+              <a:buFont typeface="Wingdings" charset="2"/>
+              <a:buChar char="Ø"/>
+            </a:pPr>
+            <a:r>
+              <a:rPr lang="en-US" sz="2400" dirty="0">
+                <a:latin typeface="+mn-lt"/>
+                <a:cs typeface="Arial"/>
+              </a:rPr>
+              <a:t>Output: flat ROOT </a:t>
+            </a:r>
+            <a:r>
               <a:rPr lang="en-US" sz="2400" dirty="0" smtClean="0">
-                <a:latin typeface="Arial"/>
-                <a:cs typeface="Arial"/>
-              </a:rPr>
-              <a:t>ROOT </a:t>
+                <a:latin typeface="+mn-lt"/>
+                <a:cs typeface="Arial"/>
+              </a:rPr>
+              <a:t>n-tuples with </a:t>
             </a:r>
             <a:r>
               <a:rPr lang="en-US" sz="2400" dirty="0">
-                <a:latin typeface="Arial"/>
-                <a:cs typeface="Arial"/>
-              </a:rPr>
-              <a:t>files in </a:t>
-            </a:r>
+                <a:latin typeface="+mn-lt"/>
+                <a:cs typeface="Arial"/>
+              </a:rPr>
+              <a:t>only necessary information</a:t>
+            </a:r>
+          </a:p>
+          <a:p>
+            <a:pPr marL="971550" lvl="1" indent="-514350">
+              <a:buFont typeface="+mj-lt"/>
+              <a:buAutoNum type="arabicPeriod"/>
+            </a:pPr>
+            <a:r>
+              <a:rPr lang="en-US" sz="2800" b="1" dirty="0" smtClean="0">
+                <a:latin typeface="+mn-lt"/>
+                <a:cs typeface="Arial"/>
+              </a:rPr>
+              <a:t>Final </a:t>
+            </a:r>
+            <a:r>
+              <a:rPr lang="en-US" sz="2800" b="1" dirty="0" smtClean="0">
+                <a:latin typeface="+mn-lt"/>
+                <a:cs typeface="Arial"/>
+              </a:rPr>
+              <a:t>analysis </a:t>
+            </a:r>
+            <a:r>
+              <a:rPr lang="en-US" sz="2800" b="1" dirty="0">
+                <a:latin typeface="+mn-lt"/>
+                <a:cs typeface="Arial"/>
+              </a:rPr>
+              <a:t>is performed using the flat ROOT </a:t>
+            </a:r>
+            <a:r>
+              <a:rPr lang="en-US" sz="2800" b="1" dirty="0" smtClean="0">
+                <a:latin typeface="+mn-lt"/>
+                <a:cs typeface="Arial"/>
+              </a:rPr>
+              <a:t>ntuples</a:t>
+            </a:r>
+          </a:p>
+          <a:p>
+            <a:pPr marL="1371600" lvl="2" indent="-457200">
+              <a:buFont typeface="Wingdings" charset="2"/>
+              <a:buChar char="Ø"/>
+            </a:pPr>
             <a:r>
               <a:rPr lang="en-US" sz="2400" dirty="0" smtClean="0">
-                <a:latin typeface="Arial"/>
-                <a:cs typeface="Arial"/>
-              </a:rPr>
-              <a:t>custom ``</a:t>
-            </a:r>
-            <a:r>
-              <a:rPr lang="en-US" sz="2400" dirty="0">
-                <a:latin typeface="Arial"/>
-                <a:cs typeface="Arial"/>
-              </a:rPr>
-              <a:t>Bacon'' format (2 TB)</a:t>
-            </a:r>
-          </a:p>
-          <a:p>
-            <a:pPr marL="2286000" lvl="4" indent="-457200">
-              <a:buFont typeface="Arial"/>
-              <a:buChar char="•"/>
-            </a:pPr>
-            <a:r>
-              <a:rPr lang="en-US" sz="2400" dirty="0">
-                <a:latin typeface="Arial"/>
-                <a:cs typeface="Arial"/>
-              </a:rPr>
-              <a:t>Event and physics objects information stored in vectors and float </a:t>
-            </a:r>
-            <a:r>
-              <a:rPr lang="en-US" sz="2400" dirty="0" smtClean="0">
-                <a:latin typeface="Arial"/>
-                <a:cs typeface="Arial"/>
-              </a:rPr>
-              <a:t>types</a:t>
-            </a:r>
-          </a:p>
-          <a:p>
-            <a:pPr marL="2743200" lvl="5" indent="-457200">
-              <a:buFont typeface="Arial"/>
-              <a:buChar char="•"/>
-            </a:pPr>
-            <a:r>
-              <a:rPr lang="en-US" sz="2400" dirty="0" smtClean="0">
-                <a:latin typeface="Arial"/>
-                <a:cs typeface="Arial"/>
-              </a:rPr>
-              <a:t>Fixed types of particles per event (Electron, </a:t>
-            </a:r>
-            <a:r>
-              <a:rPr lang="en-US" sz="2400" dirty="0" err="1" smtClean="0">
-                <a:latin typeface="Arial"/>
-                <a:cs typeface="Arial"/>
-              </a:rPr>
-              <a:t>Muon</a:t>
-            </a:r>
-            <a:r>
-              <a:rPr lang="en-US" sz="2400" dirty="0" smtClean="0">
-                <a:latin typeface="Arial"/>
-                <a:cs typeface="Arial"/>
-              </a:rPr>
-              <a:t>, Tau, Photon, Jets)</a:t>
-            </a:r>
-          </a:p>
-          <a:p>
-            <a:pPr marL="914400" lvl="1" indent="-457200">
-              <a:buFont typeface="Arial"/>
-              <a:buChar char="•"/>
-            </a:pPr>
-            <a:r>
-              <a:rPr lang="en-US" sz="2800" dirty="0" smtClean="0">
-                <a:latin typeface="Arial"/>
-                <a:cs typeface="Arial"/>
-              </a:rPr>
-              <a:t>Step 2: Skimming </a:t>
-            </a:r>
-            <a:r>
-              <a:rPr lang="en-US" sz="2800" dirty="0">
-                <a:latin typeface="Arial"/>
-                <a:cs typeface="Arial"/>
-              </a:rPr>
-              <a:t>( reduce number of </a:t>
-            </a:r>
-            <a:r>
-              <a:rPr lang="en-US" sz="2800" dirty="0" smtClean="0">
-                <a:latin typeface="Arial"/>
-                <a:cs typeface="Arial"/>
-              </a:rPr>
-              <a:t>events) and Slimming </a:t>
-            </a:r>
-            <a:r>
-              <a:rPr lang="en-US" sz="2800" dirty="0">
-                <a:latin typeface="Arial"/>
-                <a:cs typeface="Arial"/>
-              </a:rPr>
-              <a:t>( reduce event content)</a:t>
-            </a:r>
-          </a:p>
-          <a:p>
-            <a:pPr marL="1371600" lvl="2" indent="-457200">
-              <a:buFont typeface="Arial"/>
-              <a:buChar char="•"/>
-            </a:pPr>
-            <a:r>
-              <a:rPr lang="en-US" sz="2400" dirty="0">
-                <a:latin typeface="Arial"/>
-                <a:cs typeface="Arial"/>
-              </a:rPr>
-              <a:t>Apply analysis pre-selection</a:t>
-            </a:r>
-          </a:p>
-          <a:p>
-            <a:pPr marL="1371600" lvl="2" indent="-457200">
-              <a:buFont typeface="Arial"/>
-              <a:buChar char="•"/>
-            </a:pPr>
-            <a:r>
-              <a:rPr lang="en-US" sz="2400" dirty="0">
-                <a:latin typeface="Arial"/>
-                <a:cs typeface="Arial"/>
-              </a:rPr>
-              <a:t>Output: flat ROOT ntuples with only necessary information</a:t>
-            </a:r>
-          </a:p>
-          <a:p>
-            <a:pPr marL="914400" lvl="1" indent="-457200">
-              <a:buFont typeface="Arial"/>
-              <a:buChar char="•"/>
-            </a:pPr>
-            <a:r>
-              <a:rPr lang="en-US" sz="2800" dirty="0" smtClean="0">
-                <a:latin typeface="Arial"/>
-                <a:cs typeface="Arial"/>
-              </a:rPr>
-              <a:t>Step 3: Final analysis </a:t>
-            </a:r>
-            <a:r>
-              <a:rPr lang="en-US" sz="2800" dirty="0">
-                <a:latin typeface="Arial"/>
-                <a:cs typeface="Arial"/>
-              </a:rPr>
-              <a:t>is performed using the flat ROOT </a:t>
-            </a:r>
-            <a:r>
-              <a:rPr lang="en-US" sz="2800" dirty="0" smtClean="0">
-                <a:latin typeface="Arial"/>
-                <a:cs typeface="Arial"/>
-              </a:rPr>
-              <a:t>ntuples</a:t>
-            </a:r>
-          </a:p>
-          <a:p>
-            <a:pPr marL="1371600" lvl="2" indent="-457200">
-              <a:buFont typeface="Arial"/>
-              <a:buChar char="•"/>
-            </a:pPr>
-            <a:r>
-              <a:rPr lang="en-US" sz="2400" dirty="0" smtClean="0">
-                <a:latin typeface="Arial"/>
+                <a:latin typeface="+mn-lt"/>
                 <a:cs typeface="Arial"/>
               </a:rPr>
               <a:t>Output: publication grade plots and tables</a:t>
             </a:r>
             <a:endParaRPr lang="en-US" sz="2400" dirty="0">
-              <a:latin typeface="Arial"/>
+              <a:latin typeface="+mn-lt"/>
               <a:cs typeface="Arial"/>
             </a:endParaRPr>
           </a:p>
@@ -11565,7 +11243,7 @@
         <p:spPr>
           <a:xfrm>
             <a:off x="1016000" y="10873632"/>
-            <a:ext cx="9440089" cy="10187404"/>
+            <a:ext cx="9708980" cy="9387183"/>
           </a:xfrm>
           <a:prstGeom prst="rect">
             <a:avLst/>
@@ -11594,10 +11272,8 @@
               <a:rPr lang="en-US" sz="2800" dirty="0">
                 <a:latin typeface="+mn-lt"/>
               </a:rPr>
-              <a:t>, Dark Matter would be produced in association with visible particles. Dark Matter particle(s) would propagate through the detector undetected while visible particles would leave signals in the CMS detector.</a:t>
-            </a:r>
-          </a:p>
-          <a:p>
+              <a:t>, Dark Matter would be produced in association with visible particles. </a:t>
+            </a:r>
             <a:endParaRPr lang="en-US" sz="2800" dirty="0" smtClean="0">
               <a:latin typeface="+mn-lt"/>
             </a:endParaRPr>
@@ -11607,40 +11283,97 @@
               <a:rPr lang="en-US" sz="2800" dirty="0" smtClean="0">
                 <a:latin typeface="+mn-lt"/>
               </a:rPr>
+              <a:t>Dark </a:t>
+            </a:r>
+            <a:r>
+              <a:rPr lang="en-US" sz="2800" dirty="0">
+                <a:latin typeface="+mn-lt"/>
+              </a:rPr>
+              <a:t>Matter particle(s) would propagate through the detector undetected while visible particles would leave signals in the CMS detector</a:t>
+            </a:r>
+            <a:r>
+              <a:rPr lang="en-US" sz="2800" dirty="0" smtClean="0">
+                <a:latin typeface="+mn-lt"/>
+              </a:rPr>
+              <a:t>.</a:t>
+            </a:r>
+            <a:endParaRPr lang="en-US" sz="2800" dirty="0" smtClean="0">
+              <a:latin typeface="+mn-lt"/>
+            </a:endParaRPr>
+          </a:p>
+          <a:p>
+            <a:r>
+              <a:rPr lang="en-US" sz="2800" dirty="0" smtClean="0">
+                <a:latin typeface="+mn-lt"/>
+              </a:rPr>
               <a:t>The </a:t>
             </a:r>
             <a:r>
               <a:rPr lang="en-US" sz="2800" dirty="0">
                 <a:latin typeface="+mn-lt"/>
               </a:rPr>
-              <a:t>signature we search for in Dark Matter production at CMS is an energy imbalance, or “missing transverse energy” associated with detectable particles. </a:t>
+              <a:t>signature we search for in Dark Matter production at CMS is an energy imbalance, or “missing transverse energy” associated with detectable </a:t>
+            </a:r>
+            <a:r>
+              <a:rPr lang="en-US" sz="2800" dirty="0" smtClean="0">
+                <a:latin typeface="+mn-lt"/>
+              </a:rPr>
+              <a:t>particles.</a:t>
             </a:r>
           </a:p>
           <a:p>
             <a:pPr marL="342900" indent="-342900">
-              <a:buFont typeface="Arial" charset="0"/>
-              <a:buChar char="•"/>
+              <a:buFont typeface="Wingdings" charset="2"/>
+              <a:buChar char="Ø"/>
             </a:pPr>
             <a:r>
+              <a:rPr lang="en-US" sz="2400" dirty="0" smtClean="0">
+                <a:latin typeface="+mn-lt"/>
+              </a:rPr>
+              <a:t>This </a:t>
+            </a:r>
+            <a:r>
               <a:rPr lang="en-US" sz="2400" dirty="0">
                 <a:latin typeface="+mn-lt"/>
               </a:rPr>
-              <a:t>This signature is commonly referred to as “monoX” where “X” can be a light quark or gluon, a vector boson, or a heavy quark such as a bottom or top quark. </a:t>
+              <a:t>signature is commonly referred to as “monoX” where “X” can be a light quark or gluon, a vector boson, or a heavy quark such as a bottom or top </a:t>
+            </a:r>
+            <a:r>
+              <a:rPr lang="en-US" sz="2400" dirty="0" smtClean="0">
+                <a:latin typeface="+mn-lt"/>
+              </a:rPr>
+              <a:t>quark. </a:t>
             </a:r>
           </a:p>
           <a:p>
             <a:pPr marL="342900" indent="-342900">
-              <a:buFont typeface="Arial" charset="0"/>
-              <a:buChar char="•"/>
+              <a:buFont typeface="Wingdings" charset="2"/>
+              <a:buChar char="Ø"/>
             </a:pPr>
             <a:r>
               <a:rPr lang="en-US" sz="2400" dirty="0">
                 <a:latin typeface="+mn-lt"/>
               </a:rPr>
-              <a:t>We focus our search on the “monoTop” signature, where the detectable particle is a top quark</a:t>
-            </a:r>
-          </a:p>
-          <a:p>
+              <a:t>F</a:t>
+            </a:r>
+            <a:r>
+              <a:rPr lang="en-US" sz="2400" dirty="0" smtClean="0">
+                <a:latin typeface="+mn-lt"/>
+              </a:rPr>
+              <a:t>ocus </a:t>
+            </a:r>
+            <a:r>
+              <a:rPr lang="en-US" sz="2400" dirty="0">
+                <a:latin typeface="+mn-lt"/>
+              </a:rPr>
+              <a:t>our search on the “monoTop” signature, where the detectable particle is a top </a:t>
+            </a:r>
+            <a:r>
+              <a:rPr lang="en-US" sz="2400" dirty="0" smtClean="0">
+                <a:latin typeface="+mn-lt"/>
+              </a:rPr>
+              <a:t>quark.</a:t>
+            </a:r>
             <a:endParaRPr lang="en-US" sz="2400" dirty="0" smtClean="0">
               <a:latin typeface="+mn-lt"/>
             </a:endParaRPr>
@@ -11656,15 +11389,23 @@
               <a:rPr lang="en-US" sz="2800" dirty="0">
                 <a:latin typeface="+mn-lt"/>
               </a:rPr>
-              <a:t>of the analysis:</a:t>
-            </a:r>
-          </a:p>
-          <a:p>
+              <a:t>of the analysis</a:t>
+            </a:r>
+            <a:r>
+              <a:rPr lang="en-US" sz="2800" dirty="0" smtClean="0">
+                <a:latin typeface="+mn-lt"/>
+              </a:rPr>
+              <a:t>:</a:t>
+            </a:r>
             <a:endParaRPr lang="en-US" sz="2800" dirty="0" smtClean="0">
               <a:latin typeface="+mn-lt"/>
             </a:endParaRPr>
           </a:p>
           <a:p>
+            <a:pPr marL="457200" indent="-457200">
+              <a:buFont typeface="Wingdings" charset="2"/>
+              <a:buChar char="Ø"/>
+            </a:pPr>
             <a:r>
               <a:rPr lang="en-US" sz="2800" dirty="0" smtClean="0">
                 <a:latin typeface="+mn-lt"/>
@@ -11675,39 +11416,97 @@
               <a:rPr lang="en-US" sz="2800" dirty="0">
                 <a:latin typeface="+mn-lt"/>
               </a:rPr>
-              <a:t>quarks are relatively rare: we need to identify collisions producing top quarks with high efficiency</a:t>
+              <a:t>quarks are relatively </a:t>
+            </a:r>
+            <a:r>
+              <a:rPr lang="en-US" sz="2800" dirty="0" smtClean="0">
+                <a:latin typeface="+mn-lt"/>
+              </a:rPr>
+              <a:t>rare, </a:t>
+            </a:r>
+            <a:r>
+              <a:rPr lang="en-US" sz="2800" dirty="0">
+                <a:latin typeface="+mn-lt"/>
+              </a:rPr>
+              <a:t>we need to identify collisions producing top quarks with high </a:t>
+            </a:r>
+            <a:r>
+              <a:rPr lang="en-US" sz="2800" dirty="0" smtClean="0">
+                <a:latin typeface="+mn-lt"/>
+              </a:rPr>
+              <a:t>efficiency</a:t>
+            </a:r>
+          </a:p>
+          <a:p>
+            <a:pPr marL="800100" lvl="1" indent="-342900">
+              <a:buFont typeface="Wingdings" charset="2"/>
+              <a:buChar char="Ø"/>
+            </a:pPr>
+            <a:r>
+              <a:rPr lang="en-US" sz="2400" dirty="0" smtClean="0">
+                <a:latin typeface="+mn-lt"/>
+              </a:rPr>
+              <a:t>Advanced </a:t>
+            </a:r>
+            <a:r>
+              <a:rPr lang="en-US" sz="2400" dirty="0">
+                <a:latin typeface="+mn-lt"/>
+              </a:rPr>
+              <a:t>computational techniques such as artificial neural networks and boosted decision trees can greatly improve the efficiency of the top identification </a:t>
+            </a:r>
+            <a:r>
+              <a:rPr lang="en-US" sz="2400" dirty="0" smtClean="0">
+                <a:latin typeface="+mn-lt"/>
+              </a:rPr>
+              <a:t>process</a:t>
             </a:r>
           </a:p>
           <a:p>
             <a:pPr marL="342900" indent="-342900">
-              <a:buFont typeface="Arial" charset="0"/>
-              <a:buChar char="•"/>
+              <a:buFont typeface="Wingdings" charset="2"/>
+              <a:buChar char="Ø"/>
             </a:pPr>
             <a:r>
-              <a:rPr lang="en-US" sz="2000" dirty="0">
-                <a:latin typeface="+mn-lt"/>
-              </a:rPr>
-              <a:t>Advanced computational techniques such as artificial neural networks and boosted decision trees can greatly improve the efficiency of the top identification process</a:t>
-            </a:r>
-          </a:p>
-          <a:p>
+              <a:rPr lang="en-US" sz="2800" dirty="0" smtClean="0">
+                <a:latin typeface="+mn-lt"/>
+              </a:rPr>
+              <a:t>Large </a:t>
+            </a:r>
             <a:r>
               <a:rPr lang="en-US" sz="2800" dirty="0">
                 <a:latin typeface="+mn-lt"/>
               </a:rPr>
-              <a:t>Large backgrounds stemming from known processes will still dominate any present signal</a:t>
-            </a:r>
-          </a:p>
-          <a:p>
-            <a:pPr marL="342900" indent="-342900">
-              <a:buFont typeface="Arial" charset="0"/>
-              <a:buChar char="•"/>
+              <a:t>backgrounds stemming from known processes will still dominate any present </a:t>
+            </a:r>
+            <a:r>
+              <a:rPr lang="en-US" sz="2800" dirty="0" smtClean="0">
+                <a:latin typeface="+mn-lt"/>
+              </a:rPr>
+              <a:t>signal</a:t>
+            </a:r>
+          </a:p>
+          <a:p>
+            <a:pPr marL="800100" lvl="1" indent="-342900">
+              <a:buFont typeface="Wingdings" charset="2"/>
+              <a:buChar char="Ø"/>
             </a:pPr>
             <a:r>
-              <a:rPr lang="en-US" sz="2000" dirty="0">
-                <a:latin typeface="+mn-lt"/>
-              </a:rPr>
-              <a:t>Further enhancement of any potential signal can be achieved by optimizing the collision selection via advanced computational techniques</a:t>
+              <a:rPr lang="en-US" sz="2400" dirty="0" smtClean="0">
+                <a:latin typeface="+mn-lt"/>
+              </a:rPr>
+              <a:t>O</a:t>
+            </a:r>
+            <a:r>
+              <a:rPr lang="en-US" sz="2400" dirty="0" smtClean="0">
+                <a:latin typeface="+mn-lt"/>
+              </a:rPr>
+              <a:t>ptimize </a:t>
+            </a:r>
+            <a:r>
+              <a:rPr lang="en-US" sz="2400" dirty="0">
+                <a:latin typeface="+mn-lt"/>
+              </a:rPr>
+              <a:t>the collision selection via advanced computational techniques</a:t>
             </a:r>
           </a:p>
         </p:txBody>
@@ -11721,39 +11520,15 @@
           <p:nvPr/>
         </p:nvPicPr>
         <p:blipFill>
-          <a:blip r:embed="rId5"/>
+          <a:blip r:embed="rId4"/>
           <a:stretch>
             <a:fillRect/>
           </a:stretch>
         </p:blipFill>
         <p:spPr>
-          <a:xfrm>
-            <a:off x="41325800" y="1066800"/>
-            <a:ext cx="2032000" cy="2032000"/>
-          </a:xfrm>
-          <a:prstGeom prst="rect">
-            <a:avLst/>
-          </a:prstGeom>
-        </p:spPr>
-      </p:pic>
-      <p:pic>
-        <p:nvPicPr>
-          <p:cNvPr id="2055" name="Picture 2054"/>
-          <p:cNvPicPr>
-            <a:picLocks noChangeAspect="1"/>
-          </p:cNvPicPr>
-          <p:nvPr/>
-        </p:nvPicPr>
-        <p:blipFill>
-          <a:blip r:embed="rId6"/>
-          <a:stretch>
-            <a:fillRect/>
-          </a:stretch>
-        </p:blipFill>
-        <p:spPr>
-          <a:xfrm>
-            <a:off x="38480224" y="3225800"/>
-            <a:ext cx="5410976" cy="1495548"/>
+          <a:xfrm flipV="1">
+            <a:off x="35535242" y="31926635"/>
+            <a:ext cx="1016000" cy="1016000"/>
           </a:xfrm>
           <a:prstGeom prst="rect">
             <a:avLst/>
@@ -11768,10 +11543,10 @@
         </p:nvGrpSpPr>
         <p:grpSpPr>
           <a:xfrm>
-            <a:off x="37530640" y="14869157"/>
-            <a:ext cx="5206976" cy="7985282"/>
-            <a:chOff x="37530640" y="6509696"/>
-            <a:chExt cx="5206976" cy="7985282"/>
+            <a:off x="37428947" y="14942849"/>
+            <a:ext cx="5206976" cy="8062724"/>
+            <a:chOff x="37428947" y="6580700"/>
+            <a:chExt cx="5206976" cy="7768673"/>
           </a:xfrm>
         </p:grpSpPr>
         <p:sp>
@@ -11784,8 +11559,8 @@
           </p:nvSpPr>
           <p:spPr bwMode="auto">
             <a:xfrm>
-              <a:off x="37530640" y="6509696"/>
-              <a:ext cx="5206976" cy="7985282"/>
+              <a:off x="37428947" y="6655318"/>
+              <a:ext cx="5206976" cy="7694055"/>
             </a:xfrm>
             <a:prstGeom prst="roundRect">
               <a:avLst>
@@ -11891,7 +11666,19 @@
                 <a:rPr lang="en-US" sz="2400" dirty="0" smtClean="0">
                   <a:latin typeface="+mn-lt"/>
                 </a:rPr>
-                <a:t>all commutative </a:t>
+                <a:t>all </a:t>
+              </a:r>
+              <a:r>
+                <a:rPr lang="en-US" sz="2400" dirty="0" smtClean="0">
+                  <a:latin typeface="+mn-lt"/>
+                </a:rPr>
+                <a:t>linear</a:t>
+              </a:r>
+              <a:r>
+                <a:rPr lang="en-US" sz="2400" dirty="0" smtClean="0">
+                  <a:latin typeface="+mn-lt"/>
+                </a:rPr>
+                <a:t> </a:t>
               </a:r>
               <a:r>
                 <a:rPr lang="en-US" sz="2400" dirty="0" err="1">
@@ -11966,21 +11753,21 @@
               <a:r>
                 <a:rPr lang="en-US" sz="2400" dirty="0" smtClean="0">
                   <a:latin typeface="+mn-lt"/>
-                  <a:hlinkClick r:id="rId7"/>
+                  <a:hlinkClick r:id="rId5"/>
                 </a:rPr>
                 <a:t>http</a:t>
               </a:r>
               <a:r>
                 <a:rPr lang="en-US" sz="2400" dirty="0">
                   <a:latin typeface="+mn-lt"/>
-                  <a:hlinkClick r:id="rId7"/>
+                  <a:hlinkClick r:id="rId5"/>
                 </a:rPr>
                 <a:t>://</a:t>
               </a:r>
               <a:r>
                 <a:rPr lang="en-US" sz="2400" dirty="0" smtClean="0">
                   <a:latin typeface="+mn-lt"/>
-                  <a:hlinkClick r:id="rId7"/>
+                  <a:hlinkClick r:id="rId5"/>
                 </a:rPr>
                 <a:t>histogrammar.org</a:t>
               </a:r>
@@ -12020,7 +11807,7 @@
             <p:nvPr/>
           </p:nvPicPr>
           <p:blipFill>
-            <a:blip r:embed="rId8"/>
+            <a:blip r:embed="rId6"/>
             <a:stretch>
               <a:fillRect/>
             </a:stretch>
@@ -12045,14 +11832,14 @@
           <p:nvPr/>
         </p:nvPicPr>
         <p:blipFill>
-          <a:blip r:embed="rId9"/>
+          <a:blip r:embed="rId7"/>
           <a:stretch>
             <a:fillRect/>
           </a:stretch>
         </p:blipFill>
         <p:spPr>
           <a:xfrm>
-            <a:off x="10724980" y="15794367"/>
+            <a:off x="10724980" y="15658903"/>
             <a:ext cx="5560600" cy="4380698"/>
           </a:xfrm>
           <a:prstGeom prst="rect">
@@ -12069,14 +11856,14 @@
           <p:nvPr/>
         </p:nvPicPr>
         <p:blipFill>
-          <a:blip r:embed="rId10"/>
+          <a:blip r:embed="rId8"/>
           <a:stretch>
             <a:fillRect/>
           </a:stretch>
         </p:blipFill>
         <p:spPr>
           <a:xfrm>
-            <a:off x="16554471" y="15740345"/>
+            <a:off x="16402074" y="15638747"/>
             <a:ext cx="4113786" cy="4434720"/>
           </a:xfrm>
           <a:prstGeom prst="rect">
@@ -12093,7 +11880,7 @@
           <p:nvPr/>
         </p:nvPicPr>
         <p:blipFill>
-          <a:blip r:embed="rId11">
+          <a:blip r:embed="rId9">
             <a:extLst>
               <a:ext uri="{28A0092B-C50C-407E-A947-70E740481C1C}">
                 <a14:useLocalDpi xmlns:a14="http://schemas.microsoft.com/office/drawing/2010/main" val="0"/>
@@ -12122,7 +11909,7 @@
         </p:nvSpPr>
         <p:spPr>
           <a:xfrm>
-            <a:off x="10667469" y="14889222"/>
+            <a:off x="10887598" y="14821490"/>
             <a:ext cx="4331559" cy="830997"/>
           </a:xfrm>
           <a:prstGeom prst="rect">
@@ -12227,7 +12014,7 @@
         </p:nvSpPr>
         <p:spPr>
           <a:xfrm>
-            <a:off x="10889615" y="20214226"/>
+            <a:off x="10889615" y="20129561"/>
             <a:ext cx="5554022" cy="461665"/>
           </a:xfrm>
           <a:prstGeom prst="rect">
@@ -12297,7 +12084,7 @@
         </p:nvSpPr>
         <p:spPr>
           <a:xfrm>
-            <a:off x="16751279" y="20208028"/>
+            <a:off x="16751279" y="20123363"/>
             <a:ext cx="3807664" cy="461665"/>
           </a:xfrm>
           <a:prstGeom prst="rect">
@@ -12316,13 +12103,7 @@
               <a:rPr lang="en-US" sz="2400" dirty="0" smtClean="0">
                 <a:latin typeface="+mn-lt"/>
               </a:rPr>
-              <a:t>Publication </a:t>
-            </a:r>
-            <a:r>
-              <a:rPr lang="en-US" sz="2400" smtClean="0">
-                <a:latin typeface="+mn-lt"/>
-              </a:rPr>
-              <a:t>physics plot</a:t>
+              <a:t>Publication physics plot</a:t>
             </a:r>
             <a:endParaRPr lang="en-US" sz="2400" dirty="0">
               <a:latin typeface="+mn-lt"/>
@@ -12338,8 +12119,8 @@
         </p:nvGrpSpPr>
         <p:grpSpPr>
           <a:xfrm>
-            <a:off x="37464801" y="6305595"/>
-            <a:ext cx="5196415" cy="7865309"/>
+            <a:off x="37464801" y="6158253"/>
+            <a:ext cx="5196415" cy="8495942"/>
             <a:chOff x="37541201" y="15185084"/>
             <a:chExt cx="5196415" cy="7865309"/>
           </a:xfrm>
@@ -12395,124 +12176,173 @@
             <a:lstStyle/>
             <a:p>
               <a:pPr algn="ctr" defTabSz="3135313"/>
-              <a:endParaRPr lang="en-US" dirty="0" smtClean="0">
+              <a:endParaRPr lang="en-US" sz="1800" dirty="0" smtClean="0">
                 <a:latin typeface="+mn-lt"/>
               </a:endParaRPr>
             </a:p>
             <a:p>
               <a:pPr algn="ctr" defTabSz="3135313"/>
-              <a:endParaRPr lang="en-US" dirty="0">
+              <a:endParaRPr lang="en-US" sz="1800" dirty="0">
                 <a:latin typeface="+mn-lt"/>
               </a:endParaRPr>
             </a:p>
             <a:p>
               <a:pPr algn="ctr" defTabSz="3135313"/>
-              <a:endParaRPr lang="en-US" dirty="0" smtClean="0">
+              <a:endParaRPr lang="en-US" sz="1800" dirty="0" smtClean="0">
                 <a:latin typeface="+mn-lt"/>
               </a:endParaRPr>
             </a:p>
             <a:p>
               <a:pPr algn="ctr" defTabSz="3135313"/>
-              <a:endParaRPr lang="en-US" dirty="0">
+              <a:endParaRPr lang="en-US" sz="1800" dirty="0">
                 <a:latin typeface="+mn-lt"/>
               </a:endParaRPr>
             </a:p>
             <a:p>
               <a:pPr algn="ctr" defTabSz="3135313"/>
-              <a:endParaRPr lang="en-US" dirty="0" smtClean="0">
+              <a:endParaRPr lang="en-US" sz="1800" dirty="0" smtClean="0">
                 <a:latin typeface="+mn-lt"/>
               </a:endParaRPr>
             </a:p>
             <a:p>
               <a:pPr algn="ctr" defTabSz="3135313"/>
-              <a:endParaRPr lang="en-US" dirty="0" smtClean="0">
+              <a:endParaRPr lang="en-US" sz="1800" dirty="0" smtClean="0">
                 <a:latin typeface="+mn-lt"/>
               </a:endParaRPr>
             </a:p>
             <a:p>
               <a:pPr algn="ctr" defTabSz="3135313"/>
-              <a:endParaRPr lang="en-US" dirty="0">
+              <a:endParaRPr lang="en-US" sz="1800" dirty="0">
                 <a:latin typeface="+mn-lt"/>
               </a:endParaRPr>
             </a:p>
             <a:p>
               <a:pPr algn="ctr" defTabSz="3135313"/>
-              <a:endParaRPr lang="en-US" dirty="0">
+              <a:endParaRPr lang="en-US" sz="1800" dirty="0">
                 <a:latin typeface="+mn-lt"/>
               </a:endParaRPr>
             </a:p>
             <a:p>
               <a:pPr algn="ctr" defTabSz="3135313"/>
-              <a:endParaRPr lang="en-US" dirty="0" smtClean="0">
+              <a:endParaRPr lang="en-US" sz="1800" dirty="0" smtClean="0">
                 <a:latin typeface="+mn-lt"/>
               </a:endParaRPr>
             </a:p>
             <a:p>
               <a:pPr algn="ctr" defTabSz="3135313"/>
-              <a:endParaRPr lang="en-US" sz="2000" dirty="0" smtClean="0">
+              <a:endParaRPr lang="en-US" sz="1800" dirty="0" smtClean="0">
                 <a:latin typeface="+mn-lt"/>
                 <a:cs typeface="Arial"/>
               </a:endParaRPr>
             </a:p>
             <a:p>
               <a:pPr algn="ctr" defTabSz="3135313"/>
-              <a:endParaRPr lang="en-US" sz="2000" dirty="0">
+              <a:endParaRPr lang="en-US" sz="1800" dirty="0">
                 <a:latin typeface="+mn-lt"/>
                 <a:cs typeface="Arial"/>
               </a:endParaRPr>
             </a:p>
             <a:p>
               <a:pPr algn="ctr" defTabSz="3135313"/>
-              <a:endParaRPr lang="en-US" sz="2000" dirty="0" smtClean="0">
+              <a:endParaRPr lang="en-US" sz="1800" dirty="0" smtClean="0">
                 <a:latin typeface="+mn-lt"/>
                 <a:cs typeface="Arial"/>
               </a:endParaRPr>
             </a:p>
             <a:p>
               <a:pPr algn="ctr" defTabSz="3135313"/>
-              <a:endParaRPr lang="en-US" sz="2000" dirty="0">
+              <a:endParaRPr lang="en-US" sz="1800" dirty="0">
                 <a:latin typeface="+mn-lt"/>
                 <a:cs typeface="Arial"/>
               </a:endParaRPr>
             </a:p>
             <a:p>
               <a:pPr algn="ctr" defTabSz="3135313"/>
-              <a:endParaRPr lang="en-US" sz="2000" dirty="0" smtClean="0">
+              <a:endParaRPr lang="en-US" sz="1800" dirty="0" smtClean="0">
                 <a:latin typeface="+mn-lt"/>
                 <a:cs typeface="Arial"/>
               </a:endParaRPr>
             </a:p>
             <a:p>
               <a:pPr algn="ctr" defTabSz="3135313"/>
-              <a:endParaRPr lang="en-US" sz="2000" dirty="0">
+              <a:endParaRPr lang="en-US" sz="1800" dirty="0">
                 <a:latin typeface="+mn-lt"/>
                 <a:cs typeface="Arial"/>
               </a:endParaRPr>
             </a:p>
             <a:p>
               <a:pPr algn="ctr" defTabSz="3135313"/>
-              <a:endParaRPr lang="en-US" sz="2000" dirty="0" smtClean="0">
+              <a:endParaRPr lang="en-US" sz="1800" dirty="0" smtClean="0">
                 <a:latin typeface="+mn-lt"/>
                 <a:cs typeface="Arial"/>
               </a:endParaRPr>
             </a:p>
             <a:p>
               <a:pPr algn="ctr" defTabSz="3135313"/>
-              <a:endParaRPr lang="en-US" sz="2000" dirty="0">
+              <a:endParaRPr lang="en-US" sz="1800" dirty="0">
                 <a:latin typeface="+mn-lt"/>
                 <a:cs typeface="Arial"/>
               </a:endParaRPr>
             </a:p>
             <a:p>
               <a:pPr algn="ctr" defTabSz="3135313"/>
-              <a:endParaRPr lang="en-US" sz="2000" dirty="0" smtClean="0">
+              <a:endParaRPr lang="en-US" sz="1800" dirty="0" smtClean="0">
                 <a:latin typeface="+mn-lt"/>
                 <a:cs typeface="Arial"/>
               </a:endParaRPr>
             </a:p>
             <a:p>
               <a:pPr algn="ctr" defTabSz="3135313"/>
-              <a:endParaRPr lang="en-US" sz="1400" dirty="0" smtClean="0">
+              <a:endParaRPr lang="en-US" sz="1800" dirty="0" smtClean="0">
+                <a:latin typeface="+mn-lt"/>
+                <a:cs typeface="Arial"/>
+              </a:endParaRPr>
+            </a:p>
+            <a:p>
+              <a:pPr algn="ctr" defTabSz="3135313"/>
+              <a:endParaRPr lang="en-US" sz="1800" dirty="0" smtClean="0">
+                <a:latin typeface="+mn-lt"/>
+                <a:cs typeface="Arial"/>
+              </a:endParaRPr>
+            </a:p>
+            <a:p>
+              <a:pPr algn="ctr" defTabSz="3135313"/>
+              <a:endParaRPr lang="en-US" sz="1800" dirty="0">
+                <a:latin typeface="+mn-lt"/>
+                <a:cs typeface="Arial"/>
+              </a:endParaRPr>
+            </a:p>
+            <a:p>
+              <a:pPr algn="ctr" defTabSz="3135313"/>
+              <a:endParaRPr lang="en-US" sz="1800" dirty="0" smtClean="0">
+                <a:latin typeface="+mn-lt"/>
+                <a:cs typeface="Arial"/>
+              </a:endParaRPr>
+            </a:p>
+            <a:p>
+              <a:pPr algn="ctr" defTabSz="3135313"/>
+              <a:endParaRPr lang="en-US" sz="1800" dirty="0">
+                <a:latin typeface="+mn-lt"/>
+                <a:cs typeface="Arial"/>
+              </a:endParaRPr>
+            </a:p>
+            <a:p>
+              <a:pPr algn="ctr" defTabSz="3135313"/>
+              <a:endParaRPr lang="en-US" sz="1800" dirty="0" smtClean="0">
+                <a:latin typeface="+mn-lt"/>
+                <a:cs typeface="Arial"/>
+              </a:endParaRPr>
+            </a:p>
+            <a:p>
+              <a:pPr algn="ctr" defTabSz="3135313"/>
+              <a:endParaRPr lang="en-US" sz="1800" dirty="0">
+                <a:latin typeface="+mn-lt"/>
+                <a:cs typeface="Arial"/>
+              </a:endParaRPr>
+            </a:p>
+            <a:p>
+              <a:pPr algn="ctr" defTabSz="3135313"/>
+              <a:endParaRPr lang="en-US" sz="1800" dirty="0" smtClean="0">
                 <a:latin typeface="+mn-lt"/>
                 <a:cs typeface="Arial"/>
               </a:endParaRPr>
@@ -12520,35 +12350,42 @@
             <a:p>
               <a:pPr algn="ctr" defTabSz="3135313"/>
               <a:r>
-                <a:rPr lang="en-US" sz="1400" dirty="0" smtClean="0">
+                <a:rPr lang="en-US" sz="1800" dirty="0" smtClean="0">
                   <a:latin typeface="+mn-lt"/>
                   <a:cs typeface="Arial"/>
                 </a:rPr>
-                <a:t>This figure shows the output of the use case workflow. It shows </a:t>
+                <a:t>This </a:t>
               </a:r>
               <a:r>
-                <a:rPr lang="en-US" sz="1400" dirty="0">
+                <a:rPr lang="en-US" sz="1800" dirty="0" smtClean="0">
+                  <a:latin typeface="+mn-lt"/>
+                  <a:cs typeface="Arial"/>
+                </a:rPr>
+                <a:t>figure shows the output of the use case workflow. It shows </a:t>
+              </a:r>
+              <a:r>
+                <a:rPr lang="en-US" sz="1800" dirty="0">
                   <a:latin typeface="+mn-lt"/>
                   <a:cs typeface="Arial"/>
                 </a:rPr>
                 <a:t>Muon </a:t>
               </a:r>
               <a:r>
-                <a:rPr lang="en-US" sz="1400" dirty="0" smtClean="0">
+                <a:rPr lang="en-US" sz="1800" dirty="0" smtClean="0">
                   <a:latin typeface="+mn-lt"/>
                   <a:cs typeface="Arial"/>
                 </a:rPr>
                 <a:t>transverse momentum </a:t>
               </a:r>
               <a:r>
-                <a:rPr lang="en-US" sz="1400" dirty="0">
+                <a:rPr lang="en-US" sz="1800" dirty="0">
                   <a:latin typeface="+mn-lt"/>
                   <a:cs typeface="Arial"/>
                 </a:rPr>
                 <a:t>distributions for di-boson </a:t>
               </a:r>
               <a:r>
-                <a:rPr lang="en-US" sz="1400" dirty="0" smtClean="0">
+                <a:rPr lang="en-US" sz="1800" dirty="0" smtClean="0">
                   <a:latin typeface="+mn-lt"/>
                   <a:cs typeface="Arial"/>
                 </a:rPr>
@@ -12566,7 +12403,7 @@
             <p:nvPr/>
           </p:nvPicPr>
           <p:blipFill>
-            <a:blip r:embed="rId12"/>
+            <a:blip r:embed="rId10"/>
             <a:stretch>
               <a:fillRect/>
             </a:stretch>
@@ -12582,6 +12419,269 @@
           </p:spPr>
         </p:pic>
       </p:grpSp>
+      <p:pic>
+        <p:nvPicPr>
+          <p:cNvPr id="41" name="Picture 40" descr="FermilabBarDOE_TextInBar_36inches-05.eps"/>
+          <p:cNvPicPr>
+            <a:picLocks noChangeAspect="1"/>
+          </p:cNvPicPr>
+          <p:nvPr/>
+        </p:nvPicPr>
+        <p:blipFill>
+          <a:blip r:embed="rId11">
+            <a:extLst>
+              <a:ext uri="{28A0092B-C50C-407E-A947-70E740481C1C}">
+                <a14:useLocalDpi xmlns:a14="http://schemas.microsoft.com/office/drawing/2010/main" val="0"/>
+              </a:ext>
+            </a:extLst>
+          </a:blip>
+          <a:stretch>
+            <a:fillRect/>
+          </a:stretch>
+        </p:blipFill>
+        <p:spPr>
+          <a:xfrm>
+            <a:off x="3232586" y="31497983"/>
+            <a:ext cx="32918400" cy="1828800"/>
+          </a:xfrm>
+          <a:prstGeom prst="rect">
+            <a:avLst/>
+          </a:prstGeom>
+        </p:spPr>
+      </p:pic>
+      <p:sp>
+        <p:nvSpPr>
+          <p:cNvPr id="44" name="AutoShape 508"/>
+          <p:cNvSpPr>
+            <a:spLocks noChangeArrowheads="1"/>
+          </p:cNvSpPr>
+          <p:nvPr/>
+        </p:nvSpPr>
+        <p:spPr bwMode="auto">
+          <a:xfrm>
+            <a:off x="21776268" y="24004738"/>
+            <a:ext cx="10278532" cy="6261095"/>
+          </a:xfrm>
+          <a:prstGeom prst="roundRect">
+            <a:avLst>
+              <a:gd name="adj" fmla="val 16667"/>
+            </a:avLst>
+          </a:prstGeom>
+          <a:solidFill>
+            <a:schemeClr val="bg1"/>
+          </a:solidFill>
+          <a:ln w="28575">
+            <a:solidFill>
+              <a:schemeClr val="tx1"/>
+            </a:solidFill>
+            <a:round/>
+            <a:headEnd/>
+            <a:tailEnd/>
+          </a:ln>
+          <a:effectLst/>
+          <a:extLst>
+            <a:ext uri="{AF507438-7753-43e0-B8FC-AC1667EBCBE1}">
+              <a14:hiddenEffects xmlns:a14="http://schemas.microsoft.com/office/drawing/2010/main">
+                <a:effectLst>
+                  <a:outerShdw blurRad="63500" dist="38099" dir="2700000" algn="ctr" rotWithShape="0">
+                    <a:schemeClr val="bg2">
+                      <a:alpha val="74998"/>
+                    </a:schemeClr>
+                  </a:outerShdw>
+                </a:effectLst>
+              </a14:hiddenEffects>
+            </a:ext>
+          </a:extLst>
+        </p:spPr>
+        <p:txBody>
+          <a:bodyPr wrap="square" anchor="ctr"/>
+          <a:lstStyle/>
+          <a:p>
+            <a:pPr defTabSz="3135313"/>
+            <a:r>
+              <a:rPr lang="en-US" sz="2800" b="1" dirty="0">
+                <a:latin typeface="+mn-lt"/>
+                <a:cs typeface="Arial"/>
+              </a:rPr>
+              <a:t>Performance at NERSC </a:t>
+            </a:r>
+            <a:r>
+              <a:rPr lang="en-US" sz="2800" dirty="0">
+                <a:latin typeface="+mn-lt"/>
+                <a:cs typeface="Arial"/>
+              </a:rPr>
+              <a:t>using 140 cores, and total of 46 GB compressed data in 78 HDF5 files</a:t>
+            </a:r>
+          </a:p>
+          <a:p>
+            <a:pPr marL="457200" indent="-457200" defTabSz="3135313">
+              <a:buFont typeface="Wingdings" charset="2"/>
+              <a:buChar char="Ø"/>
+            </a:pPr>
+            <a:r>
+              <a:rPr lang="en-US" sz="2800" dirty="0">
+                <a:latin typeface="+mn-lt"/>
+                <a:cs typeface="Arial"/>
+              </a:rPr>
+              <a:t>Count the number of events =&gt; ~1sec, </a:t>
+            </a:r>
+            <a:r>
+              <a:rPr lang="en-US" sz="2800" dirty="0" smtClean="0">
+                <a:latin typeface="+mn-lt"/>
+                <a:cs typeface="Arial"/>
+              </a:rPr>
+              <a:t>3.7 </a:t>
+            </a:r>
+            <a:r>
+              <a:rPr lang="en-US" sz="2800" dirty="0">
+                <a:latin typeface="+mn-lt"/>
+                <a:cs typeface="Arial"/>
+              </a:rPr>
+              <a:t>million events</a:t>
+            </a:r>
+          </a:p>
+          <a:p>
+            <a:pPr marL="457200" indent="-457200" defTabSz="3135313">
+              <a:buFont typeface="Wingdings" charset="2"/>
+              <a:buChar char="Ø"/>
+            </a:pPr>
+            <a:r>
+              <a:rPr lang="en-US" sz="2800" dirty="0">
+                <a:latin typeface="+mn-lt"/>
+                <a:cs typeface="Arial"/>
+              </a:rPr>
+              <a:t>Sum of weights for </a:t>
+            </a:r>
+            <a:r>
+              <a:rPr lang="en-US" sz="2800" dirty="0" smtClean="0">
+                <a:latin typeface="+mn-lt"/>
+                <a:cs typeface="Arial"/>
+              </a:rPr>
+              <a:t>3.7 </a:t>
+            </a:r>
+            <a:r>
+              <a:rPr lang="en-US" sz="2800" dirty="0">
+                <a:latin typeface="+mn-lt"/>
+                <a:cs typeface="Arial"/>
+              </a:rPr>
+              <a:t>million events =&gt; 2 sec </a:t>
+            </a:r>
+          </a:p>
+          <a:p>
+            <a:pPr marL="457200" indent="-457200" defTabSz="3135313">
+              <a:buFont typeface="Wingdings" charset="2"/>
+              <a:buChar char="Ø"/>
+            </a:pPr>
+            <a:r>
+              <a:rPr lang="en-US" sz="2800" dirty="0">
+                <a:latin typeface="+mn-lt"/>
+                <a:cs typeface="Arial"/>
+              </a:rPr>
+              <a:t>Creating and saving files after filtering/cuts =&gt; 1-6 </a:t>
+            </a:r>
+            <a:r>
+              <a:rPr lang="en-US" sz="2800" dirty="0" smtClean="0">
+                <a:latin typeface="+mn-lt"/>
+                <a:cs typeface="Arial"/>
+              </a:rPr>
+              <a:t>min</a:t>
+            </a:r>
+          </a:p>
+          <a:p>
+            <a:pPr defTabSz="3135313"/>
+            <a:endParaRPr lang="en-US" sz="2800" dirty="0">
+              <a:latin typeface="+mn-lt"/>
+              <a:cs typeface="Arial"/>
+            </a:endParaRPr>
+          </a:p>
+          <a:p>
+            <a:pPr defTabSz="3135313"/>
+            <a:r>
+              <a:rPr lang="en-US" sz="2800" dirty="0">
+                <a:latin typeface="+mn-lt"/>
+                <a:cs typeface="Arial"/>
+              </a:rPr>
+              <a:t>Similar test was repeated with one uncompressed file with the same data, total 86 GB, initial reading and caching time is twice as long. The rest of the tests have comparable outcome. </a:t>
+            </a:r>
+            <a:endParaRPr lang="en-US" sz="2800" dirty="0" smtClean="0">
+              <a:latin typeface="+mn-lt"/>
+              <a:cs typeface="Arial"/>
+            </a:endParaRPr>
+          </a:p>
+          <a:p>
+            <a:pPr defTabSz="3135313"/>
+            <a:endParaRPr lang="en-US" sz="2800" dirty="0">
+              <a:latin typeface="+mn-lt"/>
+              <a:cs typeface="Arial"/>
+            </a:endParaRPr>
+          </a:p>
+          <a:p>
+            <a:pPr defTabSz="3135313"/>
+            <a:r>
+              <a:rPr lang="en-US" sz="2800" b="1" dirty="0">
+                <a:latin typeface="+mn-lt"/>
+                <a:cs typeface="Arial"/>
+              </a:rPr>
+              <a:t>Performance at Princeton BD cluster</a:t>
+            </a:r>
+            <a:r>
+              <a:rPr lang="en-US" sz="2800" dirty="0">
+                <a:latin typeface="+mn-lt"/>
+                <a:cs typeface="Arial"/>
+              </a:rPr>
+              <a:t> using 140 </a:t>
+            </a:r>
+            <a:r>
+              <a:rPr lang="en-US" sz="2800" dirty="0" smtClean="0">
+                <a:latin typeface="+mn-lt"/>
+                <a:cs typeface="Arial"/>
+              </a:rPr>
+              <a:t>cores</a:t>
+            </a:r>
+            <a:endParaRPr lang="en-US" sz="2800" dirty="0">
+              <a:latin typeface="+mn-lt"/>
+              <a:cs typeface="Arial"/>
+            </a:endParaRPr>
+          </a:p>
+          <a:p>
+            <a:pPr marL="457200" indent="-457200" defTabSz="3135313">
+              <a:buFont typeface="Wingdings" charset="2"/>
+              <a:buChar char="Ø"/>
+            </a:pPr>
+            <a:r>
+              <a:rPr lang="en-US" sz="2800" dirty="0">
+                <a:latin typeface="+mn-lt"/>
+                <a:cs typeface="Arial"/>
+              </a:rPr>
+              <a:t>Sum of weights for events  =&gt; 14 sec</a:t>
+            </a:r>
+          </a:p>
+        </p:txBody>
+      </p:sp>
+      <p:pic>
+        <p:nvPicPr>
+          <p:cNvPr id="14" name="Picture 13"/>
+          <p:cNvPicPr>
+            <a:picLocks noChangeAspect="1"/>
+          </p:cNvPicPr>
+          <p:nvPr/>
+        </p:nvPicPr>
+        <p:blipFill>
+          <a:blip r:embed="rId12"/>
+          <a:stretch>
+            <a:fillRect/>
+          </a:stretch>
+        </p:blipFill>
+        <p:spPr>
+          <a:xfrm>
+            <a:off x="15133473" y="22209212"/>
+            <a:ext cx="4888521" cy="8597901"/>
+          </a:xfrm>
+          <a:prstGeom prst="rect">
+            <a:avLst/>
+          </a:prstGeom>
+        </p:spPr>
+      </p:pic>
     </p:spTree>
   </p:cSld>
   <p:clrMapOvr>

</xml_diff>